<commit_message>
Update 5. Learning Graph Representations.pptx
</commit_message>
<xml_diff>
--- a/5. Learning Graph Representations.pptx
+++ b/5. Learning Graph Representations.pptx
@@ -5,7 +5,7 @@
     <p:sldMasterId id="2147483660" r:id="rId1"/>
   </p:sldMasterIdLst>
   <p:notesMasterIdLst>
-    <p:notesMasterId r:id="rId15"/>
+    <p:notesMasterId r:id="rId16"/>
   </p:notesMasterIdLst>
   <p:sldIdLst>
     <p:sldId id="257" r:id="rId2"/>
@@ -16,11 +16,12 @@
     <p:sldId id="379" r:id="rId7"/>
     <p:sldId id="382" r:id="rId8"/>
     <p:sldId id="383" r:id="rId9"/>
-    <p:sldId id="384" r:id="rId10"/>
-    <p:sldId id="386" r:id="rId11"/>
-    <p:sldId id="377" r:id="rId12"/>
-    <p:sldId id="385" r:id="rId13"/>
-    <p:sldId id="300" r:id="rId14"/>
+    <p:sldId id="387" r:id="rId10"/>
+    <p:sldId id="384" r:id="rId11"/>
+    <p:sldId id="386" r:id="rId12"/>
+    <p:sldId id="377" r:id="rId13"/>
+    <p:sldId id="385" r:id="rId14"/>
+    <p:sldId id="300" r:id="rId15"/>
   </p:sldIdLst>
   <p:sldSz cx="12192000" cy="6858000"/>
   <p:notesSz cx="6858000" cy="9144000"/>
@@ -136,6 +137,7 @@
         <p14:section name="Untitled Section" id="{264C4183-E4D7-4D46-A95E-381C6902DF63}">
           <p14:sldIdLst>
             <p14:sldId id="383"/>
+            <p14:sldId id="387"/>
             <p14:sldId id="384"/>
             <p14:sldId id="386"/>
             <p14:sldId id="377"/>
@@ -234,7 +236,7 @@
           <a:p>
             <a:fld id="{1B6E2612-5213-4B6B-99A8-BAC5DC9C4481}" type="datetimeFigureOut">
               <a:rPr lang="en-US" smtClean="0"/>
-              <a:t>11/25/2020</a:t>
+              <a:t>11/27/2020</a:t>
             </a:fld>
             <a:endParaRPr lang="en-US"/>
           </a:p>
@@ -2484,7 +2486,7 @@
           <a:p>
             <a:fld id="{D454A11C-5A77-4A08-B879-6DBBFDBBDAFE}" type="datetime1">
               <a:rPr lang="en-US" smtClean="0"/>
-              <a:t>11/25/2020</a:t>
+              <a:t>11/27/2020</a:t>
             </a:fld>
             <a:endParaRPr lang="en-US"/>
           </a:p>
@@ -2773,7 +2775,7 @@
           <a:p>
             <a:fld id="{AC73922D-9081-40A6-8FBE-63670167AD98}" type="datetime1">
               <a:rPr lang="en-US" smtClean="0"/>
-              <a:t>11/25/2020</a:t>
+              <a:t>11/27/2020</a:t>
             </a:fld>
             <a:endParaRPr lang="en-US"/>
           </a:p>
@@ -3062,7 +3064,7 @@
           <a:p>
             <a:fld id="{EC26F5A0-C9D2-4F77-B347-D66BED85257B}" type="datetime1">
               <a:rPr lang="en-US" smtClean="0"/>
-              <a:t>11/25/2020</a:t>
+              <a:t>11/27/2020</a:t>
             </a:fld>
             <a:endParaRPr lang="en-US"/>
           </a:p>
@@ -3351,7 +3353,7 @@
           <a:p>
             <a:fld id="{2B6F2430-900B-4222-905F-EED32BFA1589}" type="datetime1">
               <a:rPr lang="en-US" smtClean="0"/>
-              <a:t>11/25/2020</a:t>
+              <a:t>11/27/2020</a:t>
             </a:fld>
             <a:endParaRPr lang="en-US"/>
           </a:p>
@@ -3588,7 +3590,7 @@
           <a:p>
             <a:fld id="{2CD130E0-640E-4C5D-8D16-DE7F41FBD753}" type="datetime1">
               <a:rPr lang="en-US" smtClean="0"/>
-              <a:t>11/25/2020</a:t>
+              <a:t>11/27/2020</a:t>
             </a:fld>
             <a:endParaRPr lang="en-US"/>
           </a:p>
@@ -4045,7 +4047,7 @@
           <a:p>
             <a:fld id="{627B7EA4-B0EA-4318-A076-3B69835E495A}" type="datetime1">
               <a:rPr lang="en-US" smtClean="0"/>
-              <a:t>11/25/2020</a:t>
+              <a:t>11/27/2020</a:t>
             </a:fld>
             <a:endParaRPr lang="en-US"/>
           </a:p>
@@ -4236,7 +4238,7 @@
           <a:p>
             <a:fld id="{7ED4FE29-361C-4DC2-A7C6-B5E089DF3A91}" type="datetime1">
               <a:rPr lang="en-US" smtClean="0"/>
-              <a:t>11/25/2020</a:t>
+              <a:t>11/27/2020</a:t>
             </a:fld>
             <a:endParaRPr lang="en-US"/>
           </a:p>
@@ -6609,7 +6611,7 @@
           <a:p>
             <a:fld id="{862788D6-C652-4921-A5E0-02F81E20745E}" type="datetime1">
               <a:rPr lang="en-US" smtClean="0"/>
-              <a:t>11/25/2020</a:t>
+              <a:t>11/27/2020</a:t>
             </a:fld>
             <a:endParaRPr lang="en-US"/>
           </a:p>
@@ -6859,7 +6861,7 @@
           <a:p>
             <a:fld id="{489C13DB-7338-4DF2-835C-1A17F38879EE}" type="datetime1">
               <a:rPr lang="en-US" smtClean="0"/>
-              <a:t>11/25/2020</a:t>
+              <a:t>11/27/2020</a:t>
             </a:fld>
             <a:endParaRPr lang="en-US"/>
           </a:p>
@@ -7245,7 +7247,7 @@
           <a:p>
             <a:fld id="{1182EF5F-566B-49EC-B494-C7B2A0F6EE3D}" type="datetime1">
               <a:rPr lang="en-US" smtClean="0"/>
-              <a:t>11/25/2020</a:t>
+              <a:t>11/27/2020</a:t>
             </a:fld>
             <a:endParaRPr lang="en-US"/>
           </a:p>
@@ -7505,7 +7507,7 @@
           <a:p>
             <a:fld id="{4F02E37B-40D6-4AF0-9DE8-D954394DFF71}" type="datetime1">
               <a:rPr lang="en-US" smtClean="0"/>
-              <a:t>11/25/2020</a:t>
+              <a:t>11/27/2020</a:t>
             </a:fld>
             <a:endParaRPr lang="en-US"/>
           </a:p>
@@ -9708,6 +9710,1999 @@
           <a:p>
             <a:r>
               <a:rPr lang="en-US" dirty="0"/>
+              <a:t>Graph Embedding Methods</a:t>
+            </a:r>
+          </a:p>
+        </p:txBody>
+      </p:sp>
+      <mc:AlternateContent xmlns:mc="http://schemas.openxmlformats.org/markup-compatibility/2006" xmlns:a14="http://schemas.microsoft.com/office/drawing/2010/main">
+        <mc:Choice Requires="a14">
+          <p:sp>
+            <p:nvSpPr>
+              <p:cNvPr id="3" name="Content Placeholder 2">
+                <a:extLst>
+                  <a:ext uri="{FF2B5EF4-FFF2-40B4-BE49-F238E27FC236}">
+                    <a16:creationId xmlns:a16="http://schemas.microsoft.com/office/drawing/2014/main" id="{5FB91C98-330A-446E-8A14-1BB70B4F3F0B}"/>
+                  </a:ext>
+                </a:extLst>
+              </p:cNvPr>
+              <p:cNvSpPr>
+                <a:spLocks noGrp="1"/>
+              </p:cNvSpPr>
+              <p:nvPr>
+                <p:ph idx="1"/>
+              </p:nvPr>
+            </p:nvSpPr>
+            <p:spPr>
+              <a:xfrm>
+                <a:off x="478369" y="962244"/>
+                <a:ext cx="11473384" cy="1613070"/>
+              </a:xfrm>
+            </p:spPr>
+            <p:txBody>
+              <a:bodyPr/>
+              <a:lstStyle/>
+              <a:p>
+                <a:r>
+                  <a:rPr lang="en-US" b="1" dirty="0"/>
+                  <a:t>Aggregation</a:t>
+                </a:r>
+                <a:r>
+                  <a:rPr lang="en-US" dirty="0"/>
+                  <a:t>: </a:t>
+                </a:r>
+              </a:p>
+              <a:p>
+                <a:endParaRPr lang="en-US" sz="1800" dirty="0">
+                  <a:effectLst/>
+                  <a:latin typeface="Cambria Math" panose="02040503050406030204" pitchFamily="18" charset="0"/>
+                </a:endParaRPr>
+              </a:p>
+              <a:p>
+                <a:pPr/>
+                <a14:m>
+                  <m:oMathPara xmlns:m="http://schemas.openxmlformats.org/officeDocument/2006/math">
+                    <m:oMathParaPr>
+                      <m:jc m:val="centerGroup"/>
+                    </m:oMathParaPr>
+                    <m:oMath xmlns:m="http://schemas.openxmlformats.org/officeDocument/2006/math">
+                      <m:r>
+                        <a:rPr lang="x-IV_mathan" sz="1800" smtClean="0">
+                          <a:effectLst/>
+                          <a:latin typeface="Cambria Math" panose="02040503050406030204" pitchFamily="18" charset="0"/>
+                        </a:rPr>
+                        <m:t>𝐸𝑚𝑏𝑒𝑑𝑑𝑖𝑛𝑔</m:t>
+                      </m:r>
+                      <m:r>
+                        <a:rPr lang="en-US" sz="1800" b="0" i="1" smtClean="0">
+                          <a:effectLst/>
+                          <a:latin typeface="Cambria Math" panose="02040503050406030204" pitchFamily="18" charset="0"/>
+                        </a:rPr>
+                        <m:t>𝑂𝑓</m:t>
+                      </m:r>
+                      <m:r>
+                        <a:rPr lang="x-IV_mathan" sz="1800">
+                          <a:effectLst/>
+                          <a:latin typeface="Cambria Math" panose="02040503050406030204" pitchFamily="18" charset="0"/>
+                        </a:rPr>
+                        <m:t>𝐷𝑜𝑐𝑢𝑚𝑒𝑛𝑡</m:t>
+                      </m:r>
+                      <m:r>
+                        <a:rPr lang="x-IV_mathan" sz="1800">
+                          <a:effectLst/>
+                          <a:latin typeface="Cambria Math" panose="02040503050406030204" pitchFamily="18" charset="0"/>
+                        </a:rPr>
+                        <m:t>=</m:t>
+                      </m:r>
+                      <m:r>
+                        <a:rPr lang="x-IV_mathan" sz="1800" i="1">
+                          <a:effectLst/>
+                          <a:latin typeface="Cambria Math" panose="02040503050406030204" pitchFamily="18" charset="0"/>
+                        </a:rPr>
+                        <m:t> </m:t>
+                      </m:r>
+                      <m:nary>
+                        <m:naryPr>
+                          <m:chr m:val="∑"/>
+                          <m:supHide m:val="on"/>
+                          <m:ctrlPr>
+                            <a:rPr lang="x-IV_mathan" sz="1800" i="1">
+                              <a:effectLst/>
+                              <a:latin typeface="Cambria Math" panose="02040503050406030204" pitchFamily="18" charset="0"/>
+                            </a:rPr>
+                          </m:ctrlPr>
+                        </m:naryPr>
+                        <m:sub>
+                          <m:r>
+                            <a:rPr lang="x-IV_mathan" sz="1800">
+                              <a:effectLst/>
+                              <a:latin typeface="Cambria Math" panose="02040503050406030204" pitchFamily="18" charset="0"/>
+                            </a:rPr>
+                            <m:t>𝑖</m:t>
+                          </m:r>
+                          <m:r>
+                            <a:rPr lang="x-IV_mathan" sz="1800">
+                              <a:effectLst/>
+                              <a:latin typeface="Cambria Math" panose="02040503050406030204" pitchFamily="18" charset="0"/>
+                            </a:rPr>
+                            <m:t>∈</m:t>
+                          </m:r>
+                          <m:r>
+                            <a:rPr lang="x-IV_mathan" sz="1800">
+                              <a:effectLst/>
+                              <a:latin typeface="Cambria Math" panose="02040503050406030204" pitchFamily="18" charset="0"/>
+                            </a:rPr>
+                            <m:t>𝑊𝑜𝑟𝑑𝑠</m:t>
+                          </m:r>
+                        </m:sub>
+                        <m:sup/>
+                        <m:e>
+                          <m:r>
+                            <a:rPr lang="x-IV_mathan" sz="1800">
+                              <a:effectLst/>
+                              <a:latin typeface="Cambria Math" panose="02040503050406030204" pitchFamily="18" charset="0"/>
+                            </a:rPr>
+                            <m:t>𝐸𝑚𝑏𝑒𝑑𝑑𝑖𝑛𝑔𝑂𝑓𝑊𝑜𝑟</m:t>
+                          </m:r>
+                          <m:sSub>
+                            <m:sSubPr>
+                              <m:ctrlPr>
+                                <a:rPr lang="x-IV_mathan" sz="1800" i="1">
+                                  <a:effectLst/>
+                                  <a:latin typeface="Cambria Math" panose="02040503050406030204" pitchFamily="18" charset="0"/>
+                                </a:rPr>
+                              </m:ctrlPr>
+                            </m:sSubPr>
+                            <m:e>
+                              <m:r>
+                                <a:rPr lang="x-IV_mathan" sz="1800">
+                                  <a:effectLst/>
+                                  <a:latin typeface="Cambria Math" panose="02040503050406030204" pitchFamily="18" charset="0"/>
+                                </a:rPr>
+                                <m:t>𝑑</m:t>
+                              </m:r>
+                            </m:e>
+                            <m:sub>
+                              <m:r>
+                                <a:rPr lang="x-IV_mathan" sz="1800">
+                                  <a:effectLst/>
+                                  <a:latin typeface="Cambria Math" panose="02040503050406030204" pitchFamily="18" charset="0"/>
+                                </a:rPr>
+                                <m:t>𝑖</m:t>
+                              </m:r>
+                            </m:sub>
+                          </m:sSub>
+                        </m:e>
+                      </m:nary>
+                    </m:oMath>
+                  </m:oMathPara>
+                </a14:m>
+                <a:endParaRPr lang="en-US" dirty="0"/>
+              </a:p>
+              <a:p>
+                <a:r>
+                  <a:rPr lang="en-US" sz="1800" dirty="0">
+                    <a:effectLst/>
+                    <a:latin typeface="Calibri" panose="020F0502020204030204" pitchFamily="34" charset="0"/>
+                  </a:rPr>
+                  <a:t>Just sum over the Node Embeddings that are in the graph/subgraph  (similar of what we have in language</a:t>
+                </a:r>
+                <a:endParaRPr lang="en-US" dirty="0"/>
+              </a:p>
+            </p:txBody>
+          </p:sp>
+        </mc:Choice>
+        <mc:Fallback xmlns="">
+          <p:sp>
+            <p:nvSpPr>
+              <p:cNvPr id="3" name="Content Placeholder 2">
+                <a:extLst>
+                  <a:ext uri="{FF2B5EF4-FFF2-40B4-BE49-F238E27FC236}">
+                    <a16:creationId xmlns:a16="http://schemas.microsoft.com/office/drawing/2014/main" id="{5FB91C98-330A-446E-8A14-1BB70B4F3F0B}"/>
+                  </a:ext>
+                </a:extLst>
+              </p:cNvPr>
+              <p:cNvSpPr>
+                <a:spLocks noGrp="1" noRot="1" noChangeAspect="1" noMove="1" noResize="1" noEditPoints="1" noAdjustHandles="1" noChangeArrowheads="1" noChangeShapeType="1" noTextEdit="1"/>
+              </p:cNvSpPr>
+              <p:nvPr>
+                <p:ph idx="1"/>
+              </p:nvPr>
+            </p:nvSpPr>
+            <p:spPr>
+              <a:xfrm>
+                <a:off x="478369" y="962244"/>
+                <a:ext cx="11473384" cy="1613070"/>
+              </a:xfrm>
+              <a:blipFill>
+                <a:blip r:embed="rId2"/>
+                <a:stretch>
+                  <a:fillRect l="-1275" t="-26136" b="-65152"/>
+                </a:stretch>
+              </a:blipFill>
+            </p:spPr>
+            <p:txBody>
+              <a:bodyPr/>
+              <a:lstStyle/>
+              <a:p>
+                <a:r>
+                  <a:rPr lang="en-US">
+                    <a:noFill/>
+                  </a:rPr>
+                  <a:t> </a:t>
+                </a:r>
+              </a:p>
+            </p:txBody>
+          </p:sp>
+        </mc:Fallback>
+      </mc:AlternateContent>
+      <p:sp>
+        <p:nvSpPr>
+          <p:cNvPr id="5" name="Content Placeholder 2">
+            <a:extLst>
+              <a:ext uri="{FF2B5EF4-FFF2-40B4-BE49-F238E27FC236}">
+                <a16:creationId xmlns:a16="http://schemas.microsoft.com/office/drawing/2014/main" id="{4ED49ECD-ADDA-4270-8F6E-61DEECE0C4EE}"/>
+              </a:ext>
+            </a:extLst>
+          </p:cNvPr>
+          <p:cNvSpPr txBox="1">
+            <a:spLocks/>
+          </p:cNvSpPr>
+          <p:nvPr/>
+        </p:nvSpPr>
+        <p:spPr bwMode="gray">
+          <a:xfrm>
+            <a:off x="478369" y="3359906"/>
+            <a:ext cx="11473384" cy="1112933"/>
+          </a:xfrm>
+          <a:prstGeom prst="rect">
+            <a:avLst/>
+          </a:prstGeom>
+        </p:spPr>
+        <p:txBody>
+          <a:bodyPr vert="horz" lIns="0" tIns="0" rIns="0" bIns="0" rtlCol="0" anchor="t" anchorCtr="0">
+            <a:spAutoFit/>
+          </a:bodyPr>
+          <a:lstStyle>
+            <a:lvl1pPr marL="0" indent="0" algn="l" defTabSz="1219170" rtl="0" eaLnBrk="1" latinLnBrk="0" hangingPunct="1">
+              <a:lnSpc>
+                <a:spcPts val="2667"/>
+              </a:lnSpc>
+              <a:spcBef>
+                <a:spcPts val="400"/>
+              </a:spcBef>
+              <a:spcAft>
+                <a:spcPts val="400"/>
+              </a:spcAft>
+              <a:buFont typeface="Arial" panose="020B0604020202020204" pitchFamily="34" charset="0"/>
+              <a:buNone/>
+              <a:defRPr sz="1867" kern="1200">
+                <a:solidFill>
+                  <a:schemeClr val="tx1"/>
+                </a:solidFill>
+                <a:latin typeface="+mn-lt"/>
+                <a:ea typeface="+mn-ea"/>
+                <a:cs typeface="+mn-cs"/>
+              </a:defRPr>
+            </a:lvl1pPr>
+            <a:lvl2pPr marL="241294" indent="-241294" algn="l" defTabSz="1219170" rtl="0" eaLnBrk="1" latinLnBrk="0" hangingPunct="1">
+              <a:lnSpc>
+                <a:spcPts val="2667"/>
+              </a:lnSpc>
+              <a:spcBef>
+                <a:spcPts val="400"/>
+              </a:spcBef>
+              <a:spcAft>
+                <a:spcPts val="400"/>
+              </a:spcAft>
+              <a:buClr>
+                <a:schemeClr val="accent1"/>
+              </a:buClr>
+              <a:buSzPct val="100000"/>
+              <a:buFont typeface="Arial" panose="020B0604020202020204" pitchFamily="34" charset="0"/>
+              <a:buChar char="■"/>
+              <a:defRPr sz="1867" kern="1200">
+                <a:solidFill>
+                  <a:schemeClr val="tx1"/>
+                </a:solidFill>
+                <a:latin typeface="+mn-lt"/>
+                <a:ea typeface="+mn-ea"/>
+                <a:cs typeface="+mn-cs"/>
+              </a:defRPr>
+            </a:lvl2pPr>
+            <a:lvl3pPr marL="479988" indent="-239994" algn="l" defTabSz="1219170" rtl="0" eaLnBrk="1" latinLnBrk="0" hangingPunct="1">
+              <a:lnSpc>
+                <a:spcPts val="2667"/>
+              </a:lnSpc>
+              <a:spcBef>
+                <a:spcPts val="400"/>
+              </a:spcBef>
+              <a:spcAft>
+                <a:spcPts val="400"/>
+              </a:spcAft>
+              <a:buClr>
+                <a:schemeClr val="accent1"/>
+              </a:buClr>
+              <a:buSzPct val="100000"/>
+              <a:buFont typeface="Arial" panose="020B0604020202020204" pitchFamily="34" charset="0"/>
+              <a:buChar char="□"/>
+              <a:defRPr sz="1867" kern="1200">
+                <a:solidFill>
+                  <a:schemeClr val="tx1"/>
+                </a:solidFill>
+                <a:latin typeface="+mn-lt"/>
+                <a:ea typeface="+mn-ea"/>
+                <a:cs typeface="+mn-cs"/>
+              </a:defRPr>
+            </a:lvl3pPr>
+            <a:lvl4pPr marL="717533" indent="-239994" algn="l" defTabSz="1219170" rtl="0" eaLnBrk="1" latinLnBrk="0" hangingPunct="1">
+              <a:lnSpc>
+                <a:spcPts val="2667"/>
+              </a:lnSpc>
+              <a:spcBef>
+                <a:spcPts val="400"/>
+              </a:spcBef>
+              <a:spcAft>
+                <a:spcPts val="400"/>
+              </a:spcAft>
+              <a:buClr>
+                <a:schemeClr val="accent1"/>
+              </a:buClr>
+              <a:buSzPct val="100000"/>
+              <a:buFont typeface="Arial" panose="020B0604020202020204" pitchFamily="34" charset="0"/>
+              <a:buChar char="–"/>
+              <a:defRPr sz="1867" kern="1200">
+                <a:solidFill>
+                  <a:schemeClr val="tx1"/>
+                </a:solidFill>
+                <a:latin typeface="+mn-lt"/>
+                <a:ea typeface="+mn-ea"/>
+                <a:cs typeface="+mn-cs"/>
+              </a:defRPr>
+            </a:lvl4pPr>
+            <a:lvl5pPr marL="359991" indent="-359991" algn="l" defTabSz="1219170" rtl="0" eaLnBrk="1" latinLnBrk="0" hangingPunct="1">
+              <a:lnSpc>
+                <a:spcPts val="2667"/>
+              </a:lnSpc>
+              <a:spcBef>
+                <a:spcPts val="400"/>
+              </a:spcBef>
+              <a:spcAft>
+                <a:spcPts val="400"/>
+              </a:spcAft>
+              <a:buClr>
+                <a:schemeClr val="accent1"/>
+              </a:buClr>
+              <a:buSzPct val="100000"/>
+              <a:buFont typeface="+mj-lt"/>
+              <a:buAutoNum type="arabicPeriod"/>
+              <a:defRPr sz="1867" kern="1200">
+                <a:solidFill>
+                  <a:schemeClr val="tx1"/>
+                </a:solidFill>
+                <a:latin typeface="+mn-lt"/>
+                <a:ea typeface="+mn-ea"/>
+                <a:cs typeface="+mn-cs"/>
+              </a:defRPr>
+            </a:lvl5pPr>
+            <a:lvl6pPr marL="719982" indent="-359991" algn="l" defTabSz="1219170" rtl="0" eaLnBrk="1" latinLnBrk="0" hangingPunct="1">
+              <a:lnSpc>
+                <a:spcPts val="2667"/>
+              </a:lnSpc>
+              <a:spcBef>
+                <a:spcPts val="400"/>
+              </a:spcBef>
+              <a:spcAft>
+                <a:spcPts val="400"/>
+              </a:spcAft>
+              <a:buClr>
+                <a:schemeClr val="accent1"/>
+              </a:buClr>
+              <a:buSzPct val="100000"/>
+              <a:buFont typeface="+mj-lt"/>
+              <a:buAutoNum type="alphaLcParenR"/>
+              <a:defRPr sz="1867" kern="1200">
+                <a:solidFill>
+                  <a:schemeClr val="tx1"/>
+                </a:solidFill>
+                <a:latin typeface="+mn-lt"/>
+                <a:ea typeface="+mn-ea"/>
+                <a:cs typeface="+mn-cs"/>
+              </a:defRPr>
+            </a:lvl6pPr>
+            <a:lvl7pPr marL="0" indent="0" algn="l" defTabSz="1219170" rtl="0" eaLnBrk="1" latinLnBrk="0" hangingPunct="1">
+              <a:lnSpc>
+                <a:spcPts val="2800"/>
+              </a:lnSpc>
+              <a:spcBef>
+                <a:spcPts val="533"/>
+              </a:spcBef>
+              <a:spcAft>
+                <a:spcPts val="533"/>
+              </a:spcAft>
+              <a:buClr>
+                <a:schemeClr val="accent1"/>
+              </a:buClr>
+              <a:buSzPct val="90000"/>
+              <a:buFont typeface="Arial" panose="020B0604020202020204" pitchFamily="34" charset="0"/>
+              <a:buNone/>
+              <a:defRPr sz="2133" kern="1200" cap="all" baseline="0">
+                <a:solidFill>
+                  <a:schemeClr val="accent1"/>
+                </a:solidFill>
+                <a:latin typeface="+mn-lt"/>
+                <a:ea typeface="+mn-ea"/>
+                <a:cs typeface="+mn-cs"/>
+              </a:defRPr>
+            </a:lvl7pPr>
+            <a:lvl8pPr marL="0" indent="0" algn="l" defTabSz="1219170" rtl="0" eaLnBrk="1" latinLnBrk="0" hangingPunct="1">
+              <a:lnSpc>
+                <a:spcPts val="2800"/>
+              </a:lnSpc>
+              <a:spcBef>
+                <a:spcPts val="533"/>
+              </a:spcBef>
+              <a:spcAft>
+                <a:spcPts val="533"/>
+              </a:spcAft>
+              <a:buFont typeface="Arial" panose="020B0604020202020204" pitchFamily="34" charset="0"/>
+              <a:buNone/>
+              <a:defRPr sz="2133" b="0" kern="1200" cap="all" baseline="0">
+                <a:solidFill>
+                  <a:schemeClr val="accent1"/>
+                </a:solidFill>
+                <a:latin typeface="+mn-lt"/>
+                <a:ea typeface="+mn-ea"/>
+                <a:cs typeface="+mn-cs"/>
+              </a:defRPr>
+            </a:lvl8pPr>
+            <a:lvl9pPr marL="0" indent="0" algn="l" defTabSz="1219170" rtl="0" eaLnBrk="1" latinLnBrk="0" hangingPunct="1">
+              <a:lnSpc>
+                <a:spcPts val="2800"/>
+              </a:lnSpc>
+              <a:spcBef>
+                <a:spcPts val="533"/>
+              </a:spcBef>
+              <a:spcAft>
+                <a:spcPts val="533"/>
+              </a:spcAft>
+              <a:buFont typeface="Arial" panose="020B0604020202020204" pitchFamily="34" charset="0"/>
+              <a:buNone/>
+              <a:defRPr sz="2133" b="0" kern="1200" cap="all" baseline="0">
+                <a:solidFill>
+                  <a:schemeClr val="accent1"/>
+                </a:solidFill>
+                <a:latin typeface="+mn-lt"/>
+                <a:ea typeface="+mn-ea"/>
+                <a:cs typeface="+mn-cs"/>
+              </a:defRPr>
+            </a:lvl9pPr>
+          </a:lstStyle>
+          <a:p>
+            <a:r>
+              <a:rPr lang="en-US" b="1" dirty="0"/>
+              <a:t>Virtual node</a:t>
+            </a:r>
+            <a:r>
+              <a:rPr lang="en-US" dirty="0"/>
+              <a:t>: </a:t>
+            </a:r>
+          </a:p>
+          <a:p>
+            <a:r>
+              <a:rPr lang="en-US" sz="1800" dirty="0">
+                <a:latin typeface="Calibri" panose="020F0502020204030204" pitchFamily="34" charset="0"/>
+              </a:rPr>
+              <a:t>Create a </a:t>
+            </a:r>
+            <a:r>
+              <a:rPr lang="en-US" sz="1800" dirty="0">
+                <a:effectLst/>
+                <a:latin typeface="Calibri" panose="020F0502020204030204" pitchFamily="34" charset="0"/>
+              </a:rPr>
+              <a:t>virtual that connects all nodes in a subgraph. Runs node embeddings for all nodes in the subgraph and the virtual node. The embedding of the virtual node will be the embedding of the subgraph.</a:t>
+            </a:r>
+            <a:endParaRPr lang="en-US" dirty="0"/>
+          </a:p>
+        </p:txBody>
+      </p:sp>
+      <p:grpSp>
+        <p:nvGrpSpPr>
+          <p:cNvPr id="6" name="Group 5">
+            <a:extLst>
+              <a:ext uri="{FF2B5EF4-FFF2-40B4-BE49-F238E27FC236}">
+                <a16:creationId xmlns:a16="http://schemas.microsoft.com/office/drawing/2014/main" id="{A7E3C851-3C87-4CF9-A21E-EAAD8E48F405}"/>
+              </a:ext>
+            </a:extLst>
+          </p:cNvPr>
+          <p:cNvGrpSpPr/>
+          <p:nvPr/>
+        </p:nvGrpSpPr>
+        <p:grpSpPr>
+          <a:xfrm>
+            <a:off x="5197254" y="4964396"/>
+            <a:ext cx="1557205" cy="1481112"/>
+            <a:chOff x="9938188" y="4606083"/>
+            <a:chExt cx="2128477" cy="2018946"/>
+          </a:xfrm>
+        </p:grpSpPr>
+        <p:sp>
+          <p:nvSpPr>
+            <p:cNvPr id="7" name="Oval 6">
+              <a:extLst>
+                <a:ext uri="{FF2B5EF4-FFF2-40B4-BE49-F238E27FC236}">
+                  <a16:creationId xmlns:a16="http://schemas.microsoft.com/office/drawing/2014/main" id="{A42F86D2-B1C2-44E2-A14C-A6CBF581B10D}"/>
+                </a:ext>
+              </a:extLst>
+            </p:cNvPr>
+            <p:cNvSpPr/>
+            <p:nvPr/>
+          </p:nvSpPr>
+          <p:spPr bwMode="gray">
+            <a:xfrm>
+              <a:off x="9938188" y="5000553"/>
+              <a:ext cx="414216" cy="414216"/>
+            </a:xfrm>
+            <a:prstGeom prst="ellipse">
+              <a:avLst/>
+            </a:prstGeom>
+            <a:solidFill>
+              <a:srgbClr val="92D050"/>
+            </a:solidFill>
+            <a:ln/>
+          </p:spPr>
+          <p:style>
+            <a:lnRef idx="2">
+              <a:schemeClr val="dk1"/>
+            </a:lnRef>
+            <a:fillRef idx="1">
+              <a:schemeClr val="lt1"/>
+            </a:fillRef>
+            <a:effectRef idx="0">
+              <a:schemeClr val="dk1"/>
+            </a:effectRef>
+            <a:fontRef idx="minor">
+              <a:schemeClr val="dk1"/>
+            </a:fontRef>
+          </p:style>
+          <p:txBody>
+            <a:bodyPr rot="0" spcFirstLastPara="0" vertOverflow="overflow" horzOverflow="overflow" vert="horz" wrap="square" lIns="108000" tIns="72000" rIns="108000" bIns="72000" numCol="1" spcCol="0" rtlCol="0" fromWordArt="0" anchor="ctr" anchorCtr="0" forceAA="0" compatLnSpc="1">
+              <a:prstTxWarp prst="textNoShape">
+                <a:avLst/>
+              </a:prstTxWarp>
+              <a:noAutofit/>
+            </a:bodyPr>
+            <a:lstStyle/>
+            <a:p>
+              <a:pPr algn="ctr">
+                <a:spcBef>
+                  <a:spcPts val="300"/>
+                </a:spcBef>
+                <a:spcAft>
+                  <a:spcPts val="300"/>
+                </a:spcAft>
+              </a:pPr>
+              <a:r>
+                <a:rPr lang="en-US" sz="1200" b="1" dirty="0">
+                  <a:solidFill>
+                    <a:schemeClr val="tx1"/>
+                  </a:solidFill>
+                </a:rPr>
+                <a:t>A</a:t>
+              </a:r>
+            </a:p>
+          </p:txBody>
+        </p:sp>
+        <p:sp>
+          <p:nvSpPr>
+            <p:cNvPr id="8" name="Oval 7">
+              <a:extLst>
+                <a:ext uri="{FF2B5EF4-FFF2-40B4-BE49-F238E27FC236}">
+                  <a16:creationId xmlns:a16="http://schemas.microsoft.com/office/drawing/2014/main" id="{CD3A7638-2158-4F28-8BA4-07391C4FB427}"/>
+                </a:ext>
+              </a:extLst>
+            </p:cNvPr>
+            <p:cNvSpPr/>
+            <p:nvPr/>
+          </p:nvSpPr>
+          <p:spPr bwMode="gray">
+            <a:xfrm>
+              <a:off x="9938188" y="5928236"/>
+              <a:ext cx="414216" cy="414216"/>
+            </a:xfrm>
+            <a:prstGeom prst="ellipse">
+              <a:avLst/>
+            </a:prstGeom>
+            <a:solidFill>
+              <a:srgbClr val="92D050"/>
+            </a:solidFill>
+            <a:ln/>
+          </p:spPr>
+          <p:style>
+            <a:lnRef idx="2">
+              <a:schemeClr val="dk1"/>
+            </a:lnRef>
+            <a:fillRef idx="1">
+              <a:schemeClr val="lt1"/>
+            </a:fillRef>
+            <a:effectRef idx="0">
+              <a:schemeClr val="dk1"/>
+            </a:effectRef>
+            <a:fontRef idx="minor">
+              <a:schemeClr val="dk1"/>
+            </a:fontRef>
+          </p:style>
+          <p:txBody>
+            <a:bodyPr rot="0" spcFirstLastPara="0" vertOverflow="overflow" horzOverflow="overflow" vert="horz" wrap="square" lIns="108000" tIns="72000" rIns="108000" bIns="72000" numCol="1" spcCol="0" rtlCol="0" fromWordArt="0" anchor="ctr" anchorCtr="0" forceAA="0" compatLnSpc="1">
+              <a:prstTxWarp prst="textNoShape">
+                <a:avLst/>
+              </a:prstTxWarp>
+              <a:noAutofit/>
+            </a:bodyPr>
+            <a:lstStyle/>
+            <a:p>
+              <a:pPr algn="ctr">
+                <a:spcBef>
+                  <a:spcPts val="300"/>
+                </a:spcBef>
+                <a:spcAft>
+                  <a:spcPts val="300"/>
+                </a:spcAft>
+              </a:pPr>
+              <a:r>
+                <a:rPr lang="en-US" sz="1200" b="1" dirty="0">
+                  <a:solidFill>
+                    <a:schemeClr val="tx1"/>
+                  </a:solidFill>
+                </a:rPr>
+                <a:t>C</a:t>
+              </a:r>
+            </a:p>
+          </p:txBody>
+        </p:sp>
+        <p:sp>
+          <p:nvSpPr>
+            <p:cNvPr id="9" name="Oval 8">
+              <a:extLst>
+                <a:ext uri="{FF2B5EF4-FFF2-40B4-BE49-F238E27FC236}">
+                  <a16:creationId xmlns:a16="http://schemas.microsoft.com/office/drawing/2014/main" id="{97D6B320-D05D-4394-B83D-4CF725E7AF6B}"/>
+                </a:ext>
+              </a:extLst>
+            </p:cNvPr>
+            <p:cNvSpPr/>
+            <p:nvPr/>
+          </p:nvSpPr>
+          <p:spPr bwMode="gray">
+            <a:xfrm>
+              <a:off x="10972096" y="5387317"/>
+              <a:ext cx="414216" cy="414216"/>
+            </a:xfrm>
+            <a:prstGeom prst="ellipse">
+              <a:avLst/>
+            </a:prstGeom>
+            <a:solidFill>
+              <a:schemeClr val="accent4">
+                <a:lumMod val="20000"/>
+                <a:lumOff val="80000"/>
+              </a:schemeClr>
+            </a:solidFill>
+            <a:ln/>
+          </p:spPr>
+          <p:style>
+            <a:lnRef idx="2">
+              <a:schemeClr val="dk1"/>
+            </a:lnRef>
+            <a:fillRef idx="1">
+              <a:schemeClr val="lt1"/>
+            </a:fillRef>
+            <a:effectRef idx="0">
+              <a:schemeClr val="dk1"/>
+            </a:effectRef>
+            <a:fontRef idx="minor">
+              <a:schemeClr val="dk1"/>
+            </a:fontRef>
+          </p:style>
+          <p:txBody>
+            <a:bodyPr rot="0" spcFirstLastPara="0" vertOverflow="overflow" horzOverflow="overflow" vert="horz" wrap="square" lIns="108000" tIns="72000" rIns="108000" bIns="72000" numCol="1" spcCol="0" rtlCol="0" fromWordArt="0" anchor="ctr" anchorCtr="0" forceAA="0" compatLnSpc="1">
+              <a:prstTxWarp prst="textNoShape">
+                <a:avLst/>
+              </a:prstTxWarp>
+              <a:noAutofit/>
+            </a:bodyPr>
+            <a:lstStyle/>
+            <a:p>
+              <a:pPr algn="ctr">
+                <a:spcBef>
+                  <a:spcPts val="300"/>
+                </a:spcBef>
+                <a:spcAft>
+                  <a:spcPts val="300"/>
+                </a:spcAft>
+              </a:pPr>
+              <a:r>
+                <a:rPr lang="en-US" sz="1200" b="1" dirty="0">
+                  <a:solidFill>
+                    <a:schemeClr val="tx1"/>
+                  </a:solidFill>
+                </a:rPr>
+                <a:t>B</a:t>
+              </a:r>
+            </a:p>
+          </p:txBody>
+        </p:sp>
+        <p:cxnSp>
+          <p:nvCxnSpPr>
+            <p:cNvPr id="10" name="Straight Arrow Connector 9">
+              <a:extLst>
+                <a:ext uri="{FF2B5EF4-FFF2-40B4-BE49-F238E27FC236}">
+                  <a16:creationId xmlns:a16="http://schemas.microsoft.com/office/drawing/2014/main" id="{C40B44DC-32C8-40E2-9795-ACA275AF6AE8}"/>
+                </a:ext>
+              </a:extLst>
+            </p:cNvPr>
+            <p:cNvCxnSpPr>
+              <a:cxnSpLocks/>
+              <a:stCxn id="7" idx="4"/>
+              <a:endCxn id="8" idx="0"/>
+            </p:cNvCxnSpPr>
+            <p:nvPr/>
+          </p:nvCxnSpPr>
+          <p:spPr bwMode="gray">
+            <a:xfrm>
+              <a:off x="10145296" y="5414769"/>
+              <a:ext cx="0" cy="513467"/>
+            </a:xfrm>
+            <a:prstGeom prst="straightConnector1">
+              <a:avLst/>
+            </a:prstGeom>
+            <a:ln w="12700">
+              <a:solidFill>
+                <a:schemeClr val="tx1"/>
+              </a:solidFill>
+              <a:headEnd type="none" w="med" len="med"/>
+              <a:tailEnd type="none" w="med" len="med"/>
+            </a:ln>
+          </p:spPr>
+          <p:style>
+            <a:lnRef idx="1">
+              <a:schemeClr val="dk1"/>
+            </a:lnRef>
+            <a:fillRef idx="0">
+              <a:schemeClr val="dk1"/>
+            </a:fillRef>
+            <a:effectRef idx="0">
+              <a:schemeClr val="dk1"/>
+            </a:effectRef>
+            <a:fontRef idx="minor">
+              <a:schemeClr val="tx1"/>
+            </a:fontRef>
+          </p:style>
+        </p:cxnSp>
+        <p:sp>
+          <p:nvSpPr>
+            <p:cNvPr id="11" name="Oval 10">
+              <a:extLst>
+                <a:ext uri="{FF2B5EF4-FFF2-40B4-BE49-F238E27FC236}">
+                  <a16:creationId xmlns:a16="http://schemas.microsoft.com/office/drawing/2014/main" id="{F7861BBB-9132-4421-8973-B4FDA29AB66E}"/>
+                </a:ext>
+              </a:extLst>
+            </p:cNvPr>
+            <p:cNvSpPr/>
+            <p:nvPr/>
+          </p:nvSpPr>
+          <p:spPr bwMode="gray">
+            <a:xfrm>
+              <a:off x="11214165" y="6210813"/>
+              <a:ext cx="414216" cy="414216"/>
+            </a:xfrm>
+            <a:prstGeom prst="ellipse">
+              <a:avLst/>
+            </a:prstGeom>
+            <a:solidFill>
+              <a:srgbClr val="92D050"/>
+            </a:solidFill>
+            <a:ln/>
+          </p:spPr>
+          <p:style>
+            <a:lnRef idx="2">
+              <a:schemeClr val="dk1"/>
+            </a:lnRef>
+            <a:fillRef idx="1">
+              <a:schemeClr val="lt1"/>
+            </a:fillRef>
+            <a:effectRef idx="0">
+              <a:schemeClr val="dk1"/>
+            </a:effectRef>
+            <a:fontRef idx="minor">
+              <a:schemeClr val="dk1"/>
+            </a:fontRef>
+          </p:style>
+          <p:txBody>
+            <a:bodyPr rot="0" spcFirstLastPara="0" vertOverflow="overflow" horzOverflow="overflow" vert="horz" wrap="square" lIns="108000" tIns="72000" rIns="108000" bIns="72000" numCol="1" spcCol="0" rtlCol="0" fromWordArt="0" anchor="ctr" anchorCtr="0" forceAA="0" compatLnSpc="1">
+              <a:prstTxWarp prst="textNoShape">
+                <a:avLst/>
+              </a:prstTxWarp>
+              <a:noAutofit/>
+            </a:bodyPr>
+            <a:lstStyle/>
+            <a:p>
+              <a:pPr algn="ctr">
+                <a:spcBef>
+                  <a:spcPts val="300"/>
+                </a:spcBef>
+                <a:spcAft>
+                  <a:spcPts val="300"/>
+                </a:spcAft>
+              </a:pPr>
+              <a:r>
+                <a:rPr lang="en-US" sz="1200" b="1" dirty="0">
+                  <a:solidFill>
+                    <a:schemeClr val="tx1"/>
+                  </a:solidFill>
+                </a:rPr>
+                <a:t>D</a:t>
+              </a:r>
+            </a:p>
+          </p:txBody>
+        </p:sp>
+        <p:sp>
+          <p:nvSpPr>
+            <p:cNvPr id="12" name="Oval 11">
+              <a:extLst>
+                <a:ext uri="{FF2B5EF4-FFF2-40B4-BE49-F238E27FC236}">
+                  <a16:creationId xmlns:a16="http://schemas.microsoft.com/office/drawing/2014/main" id="{28259FFA-DD1C-475B-9D50-F84901A3A30D}"/>
+                </a:ext>
+              </a:extLst>
+            </p:cNvPr>
+            <p:cNvSpPr/>
+            <p:nvPr/>
+          </p:nvSpPr>
+          <p:spPr bwMode="gray">
+            <a:xfrm>
+              <a:off x="11053577" y="4606083"/>
+              <a:ext cx="414216" cy="414216"/>
+            </a:xfrm>
+            <a:prstGeom prst="ellipse">
+              <a:avLst/>
+            </a:prstGeom>
+            <a:solidFill>
+              <a:schemeClr val="accent4">
+                <a:lumMod val="20000"/>
+                <a:lumOff val="80000"/>
+              </a:schemeClr>
+            </a:solidFill>
+            <a:ln/>
+          </p:spPr>
+          <p:style>
+            <a:lnRef idx="2">
+              <a:schemeClr val="dk1"/>
+            </a:lnRef>
+            <a:fillRef idx="1">
+              <a:schemeClr val="lt1"/>
+            </a:fillRef>
+            <a:effectRef idx="0">
+              <a:schemeClr val="dk1"/>
+            </a:effectRef>
+            <a:fontRef idx="minor">
+              <a:schemeClr val="dk1"/>
+            </a:fontRef>
+          </p:style>
+          <p:txBody>
+            <a:bodyPr rot="0" spcFirstLastPara="0" vertOverflow="overflow" horzOverflow="overflow" vert="horz" wrap="square" lIns="108000" tIns="72000" rIns="108000" bIns="72000" numCol="1" spcCol="0" rtlCol="0" fromWordArt="0" anchor="ctr" anchorCtr="0" forceAA="0" compatLnSpc="1">
+              <a:prstTxWarp prst="textNoShape">
+                <a:avLst/>
+              </a:prstTxWarp>
+              <a:noAutofit/>
+            </a:bodyPr>
+            <a:lstStyle/>
+            <a:p>
+              <a:pPr algn="ctr">
+                <a:spcBef>
+                  <a:spcPts val="300"/>
+                </a:spcBef>
+                <a:spcAft>
+                  <a:spcPts val="300"/>
+                </a:spcAft>
+              </a:pPr>
+              <a:r>
+                <a:rPr lang="en-US" sz="1200" b="1" dirty="0">
+                  <a:solidFill>
+                    <a:schemeClr val="tx1"/>
+                  </a:solidFill>
+                </a:rPr>
+                <a:t>E</a:t>
+              </a:r>
+            </a:p>
+          </p:txBody>
+        </p:sp>
+        <p:sp>
+          <p:nvSpPr>
+            <p:cNvPr id="13" name="Oval 12">
+              <a:extLst>
+                <a:ext uri="{FF2B5EF4-FFF2-40B4-BE49-F238E27FC236}">
+                  <a16:creationId xmlns:a16="http://schemas.microsoft.com/office/drawing/2014/main" id="{0F2ED4CB-272E-441B-86C7-0568AF00804B}"/>
+                </a:ext>
+              </a:extLst>
+            </p:cNvPr>
+            <p:cNvSpPr/>
+            <p:nvPr/>
+          </p:nvSpPr>
+          <p:spPr bwMode="gray">
+            <a:xfrm>
+              <a:off x="11652449" y="5207661"/>
+              <a:ext cx="414216" cy="414216"/>
+            </a:xfrm>
+            <a:prstGeom prst="ellipse">
+              <a:avLst/>
+            </a:prstGeom>
+            <a:solidFill>
+              <a:schemeClr val="accent4">
+                <a:lumMod val="20000"/>
+                <a:lumOff val="80000"/>
+              </a:schemeClr>
+            </a:solidFill>
+            <a:ln/>
+          </p:spPr>
+          <p:style>
+            <a:lnRef idx="2">
+              <a:schemeClr val="dk1"/>
+            </a:lnRef>
+            <a:fillRef idx="1">
+              <a:schemeClr val="lt1"/>
+            </a:fillRef>
+            <a:effectRef idx="0">
+              <a:schemeClr val="dk1"/>
+            </a:effectRef>
+            <a:fontRef idx="minor">
+              <a:schemeClr val="dk1"/>
+            </a:fontRef>
+          </p:style>
+          <p:txBody>
+            <a:bodyPr rot="0" spcFirstLastPara="0" vertOverflow="overflow" horzOverflow="overflow" vert="horz" wrap="square" lIns="108000" tIns="72000" rIns="108000" bIns="72000" numCol="1" spcCol="0" rtlCol="0" fromWordArt="0" anchor="ctr" anchorCtr="0" forceAA="0" compatLnSpc="1">
+              <a:prstTxWarp prst="textNoShape">
+                <a:avLst/>
+              </a:prstTxWarp>
+              <a:noAutofit/>
+            </a:bodyPr>
+            <a:lstStyle/>
+            <a:p>
+              <a:pPr algn="ctr">
+                <a:spcBef>
+                  <a:spcPts val="300"/>
+                </a:spcBef>
+                <a:spcAft>
+                  <a:spcPts val="300"/>
+                </a:spcAft>
+              </a:pPr>
+              <a:r>
+                <a:rPr lang="en-US" sz="1200" b="1" dirty="0">
+                  <a:solidFill>
+                    <a:schemeClr val="tx1"/>
+                  </a:solidFill>
+                </a:rPr>
+                <a:t>F</a:t>
+              </a:r>
+            </a:p>
+          </p:txBody>
+        </p:sp>
+        <p:cxnSp>
+          <p:nvCxnSpPr>
+            <p:cNvPr id="14" name="Straight Arrow Connector 13">
+              <a:extLst>
+                <a:ext uri="{FF2B5EF4-FFF2-40B4-BE49-F238E27FC236}">
+                  <a16:creationId xmlns:a16="http://schemas.microsoft.com/office/drawing/2014/main" id="{646294AF-8A66-488F-93EB-9277C71A95D3}"/>
+                </a:ext>
+              </a:extLst>
+            </p:cNvPr>
+            <p:cNvCxnSpPr>
+              <a:cxnSpLocks/>
+              <a:stCxn id="9" idx="0"/>
+              <a:endCxn id="12" idx="4"/>
+            </p:cNvCxnSpPr>
+            <p:nvPr/>
+          </p:nvCxnSpPr>
+          <p:spPr bwMode="gray">
+            <a:xfrm flipV="1">
+              <a:off x="11179204" y="5020299"/>
+              <a:ext cx="81481" cy="367018"/>
+            </a:xfrm>
+            <a:prstGeom prst="straightConnector1">
+              <a:avLst/>
+            </a:prstGeom>
+            <a:ln w="12700">
+              <a:solidFill>
+                <a:schemeClr val="tx1"/>
+              </a:solidFill>
+              <a:headEnd type="none" w="med" len="med"/>
+              <a:tailEnd type="none" w="med" len="med"/>
+            </a:ln>
+          </p:spPr>
+          <p:style>
+            <a:lnRef idx="1">
+              <a:schemeClr val="dk1"/>
+            </a:lnRef>
+            <a:fillRef idx="0">
+              <a:schemeClr val="dk1"/>
+            </a:fillRef>
+            <a:effectRef idx="0">
+              <a:schemeClr val="dk1"/>
+            </a:effectRef>
+            <a:fontRef idx="minor">
+              <a:schemeClr val="tx1"/>
+            </a:fontRef>
+          </p:style>
+        </p:cxnSp>
+        <p:cxnSp>
+          <p:nvCxnSpPr>
+            <p:cNvPr id="15" name="Straight Arrow Connector 14">
+              <a:extLst>
+                <a:ext uri="{FF2B5EF4-FFF2-40B4-BE49-F238E27FC236}">
+                  <a16:creationId xmlns:a16="http://schemas.microsoft.com/office/drawing/2014/main" id="{790B6040-7ADA-48E0-9962-7B536470FC27}"/>
+                </a:ext>
+              </a:extLst>
+            </p:cNvPr>
+            <p:cNvCxnSpPr>
+              <a:cxnSpLocks/>
+              <a:stCxn id="9" idx="7"/>
+              <a:endCxn id="13" idx="2"/>
+            </p:cNvCxnSpPr>
+            <p:nvPr/>
+          </p:nvCxnSpPr>
+          <p:spPr bwMode="gray">
+            <a:xfrm flipV="1">
+              <a:off x="11325651" y="5414769"/>
+              <a:ext cx="326798" cy="33209"/>
+            </a:xfrm>
+            <a:prstGeom prst="straightConnector1">
+              <a:avLst/>
+            </a:prstGeom>
+            <a:ln w="12700">
+              <a:solidFill>
+                <a:schemeClr val="tx1"/>
+              </a:solidFill>
+              <a:headEnd type="none" w="med" len="med"/>
+              <a:tailEnd type="none" w="med" len="med"/>
+            </a:ln>
+          </p:spPr>
+          <p:style>
+            <a:lnRef idx="1">
+              <a:schemeClr val="dk1"/>
+            </a:lnRef>
+            <a:fillRef idx="0">
+              <a:schemeClr val="dk1"/>
+            </a:fillRef>
+            <a:effectRef idx="0">
+              <a:schemeClr val="dk1"/>
+            </a:effectRef>
+            <a:fontRef idx="minor">
+              <a:schemeClr val="tx1"/>
+            </a:fontRef>
+          </p:style>
+        </p:cxnSp>
+        <p:cxnSp>
+          <p:nvCxnSpPr>
+            <p:cNvPr id="16" name="Straight Arrow Connector 15">
+              <a:extLst>
+                <a:ext uri="{FF2B5EF4-FFF2-40B4-BE49-F238E27FC236}">
+                  <a16:creationId xmlns:a16="http://schemas.microsoft.com/office/drawing/2014/main" id="{60D1952B-DBBF-4933-B6F3-9362389126EC}"/>
+                </a:ext>
+              </a:extLst>
+            </p:cNvPr>
+            <p:cNvCxnSpPr>
+              <a:cxnSpLocks/>
+              <a:stCxn id="12" idx="5"/>
+              <a:endCxn id="13" idx="1"/>
+            </p:cNvCxnSpPr>
+            <p:nvPr/>
+          </p:nvCxnSpPr>
+          <p:spPr bwMode="gray">
+            <a:xfrm>
+              <a:off x="11407132" y="4959638"/>
+              <a:ext cx="305978" cy="308684"/>
+            </a:xfrm>
+            <a:prstGeom prst="straightConnector1">
+              <a:avLst/>
+            </a:prstGeom>
+            <a:ln w="12700">
+              <a:solidFill>
+                <a:schemeClr val="tx1"/>
+              </a:solidFill>
+              <a:headEnd type="none" w="med" len="med"/>
+              <a:tailEnd type="none" w="med" len="med"/>
+            </a:ln>
+          </p:spPr>
+          <p:style>
+            <a:lnRef idx="1">
+              <a:schemeClr val="dk1"/>
+            </a:lnRef>
+            <a:fillRef idx="0">
+              <a:schemeClr val="dk1"/>
+            </a:fillRef>
+            <a:effectRef idx="0">
+              <a:schemeClr val="dk1"/>
+            </a:effectRef>
+            <a:fontRef idx="minor">
+              <a:schemeClr val="tx1"/>
+            </a:fontRef>
+          </p:style>
+        </p:cxnSp>
+        <p:cxnSp>
+          <p:nvCxnSpPr>
+            <p:cNvPr id="17" name="Straight Arrow Connector 16">
+              <a:extLst>
+                <a:ext uri="{FF2B5EF4-FFF2-40B4-BE49-F238E27FC236}">
+                  <a16:creationId xmlns:a16="http://schemas.microsoft.com/office/drawing/2014/main" id="{7F415850-9877-4E12-A1DD-CEE87AE84C06}"/>
+                </a:ext>
+              </a:extLst>
+            </p:cNvPr>
+            <p:cNvCxnSpPr>
+              <a:cxnSpLocks/>
+              <a:stCxn id="8" idx="5"/>
+              <a:endCxn id="11" idx="2"/>
+            </p:cNvCxnSpPr>
+            <p:nvPr/>
+          </p:nvCxnSpPr>
+          <p:spPr bwMode="gray">
+            <a:xfrm>
+              <a:off x="10291743" y="6281791"/>
+              <a:ext cx="922422" cy="136130"/>
+            </a:xfrm>
+            <a:prstGeom prst="straightConnector1">
+              <a:avLst/>
+            </a:prstGeom>
+            <a:ln w="12700">
+              <a:solidFill>
+                <a:schemeClr val="tx1"/>
+              </a:solidFill>
+              <a:headEnd type="none" w="med" len="med"/>
+              <a:tailEnd type="none" w="med" len="med"/>
+            </a:ln>
+          </p:spPr>
+          <p:style>
+            <a:lnRef idx="1">
+              <a:schemeClr val="dk1"/>
+            </a:lnRef>
+            <a:fillRef idx="0">
+              <a:schemeClr val="dk1"/>
+            </a:fillRef>
+            <a:effectRef idx="0">
+              <a:schemeClr val="dk1"/>
+            </a:effectRef>
+            <a:fontRef idx="minor">
+              <a:schemeClr val="tx1"/>
+            </a:fontRef>
+          </p:style>
+        </p:cxnSp>
+        <p:cxnSp>
+          <p:nvCxnSpPr>
+            <p:cNvPr id="18" name="Straight Arrow Connector 17">
+              <a:extLst>
+                <a:ext uri="{FF2B5EF4-FFF2-40B4-BE49-F238E27FC236}">
+                  <a16:creationId xmlns:a16="http://schemas.microsoft.com/office/drawing/2014/main" id="{41D1A041-FBB3-4AE7-B10E-BD6EB71CF541}"/>
+                </a:ext>
+              </a:extLst>
+            </p:cNvPr>
+            <p:cNvCxnSpPr>
+              <a:cxnSpLocks/>
+              <a:stCxn id="7" idx="5"/>
+              <a:endCxn id="11" idx="1"/>
+            </p:cNvCxnSpPr>
+            <p:nvPr/>
+          </p:nvCxnSpPr>
+          <p:spPr bwMode="gray">
+            <a:xfrm>
+              <a:off x="10291743" y="5354108"/>
+              <a:ext cx="983083" cy="917366"/>
+            </a:xfrm>
+            <a:prstGeom prst="straightConnector1">
+              <a:avLst/>
+            </a:prstGeom>
+            <a:ln w="12700">
+              <a:solidFill>
+                <a:schemeClr val="tx1"/>
+              </a:solidFill>
+              <a:headEnd type="none" w="med" len="med"/>
+              <a:tailEnd type="none" w="med" len="med"/>
+            </a:ln>
+          </p:spPr>
+          <p:style>
+            <a:lnRef idx="1">
+              <a:schemeClr val="dk1"/>
+            </a:lnRef>
+            <a:fillRef idx="0">
+              <a:schemeClr val="dk1"/>
+            </a:fillRef>
+            <a:effectRef idx="0">
+              <a:schemeClr val="dk1"/>
+            </a:effectRef>
+            <a:fontRef idx="minor">
+              <a:schemeClr val="tx1"/>
+            </a:fontRef>
+          </p:style>
+        </p:cxnSp>
+      </p:grpSp>
+      <p:sp>
+        <p:nvSpPr>
+          <p:cNvPr id="19" name="Oval 18">
+            <a:extLst>
+              <a:ext uri="{FF2B5EF4-FFF2-40B4-BE49-F238E27FC236}">
+                <a16:creationId xmlns:a16="http://schemas.microsoft.com/office/drawing/2014/main" id="{DBBD1ED8-E48E-441F-B167-EB3A2AE0A7F5}"/>
+              </a:ext>
+            </a:extLst>
+          </p:cNvPr>
+          <p:cNvSpPr/>
+          <p:nvPr/>
+        </p:nvSpPr>
+        <p:spPr bwMode="gray">
+          <a:xfrm>
+            <a:off x="4348331" y="4879110"/>
+            <a:ext cx="683322" cy="457633"/>
+          </a:xfrm>
+          <a:prstGeom prst="ellipse">
+            <a:avLst/>
+          </a:prstGeom>
+          <a:solidFill>
+            <a:srgbClr val="92D050"/>
+          </a:solidFill>
+          <a:ln/>
+        </p:spPr>
+        <p:style>
+          <a:lnRef idx="2">
+            <a:schemeClr val="dk1"/>
+          </a:lnRef>
+          <a:fillRef idx="1">
+            <a:schemeClr val="lt1"/>
+          </a:fillRef>
+          <a:effectRef idx="0">
+            <a:schemeClr val="dk1"/>
+          </a:effectRef>
+          <a:fontRef idx="minor">
+            <a:schemeClr val="dk1"/>
+          </a:fontRef>
+        </p:style>
+        <p:txBody>
+          <a:bodyPr rot="0" spcFirstLastPara="0" vertOverflow="overflow" horzOverflow="overflow" vert="horz" wrap="square" lIns="108000" tIns="72000" rIns="108000" bIns="72000" numCol="1" spcCol="0" rtlCol="0" fromWordArt="0" anchor="ctr" anchorCtr="0" forceAA="0" compatLnSpc="1">
+            <a:prstTxWarp prst="textNoShape">
+              <a:avLst/>
+            </a:prstTxWarp>
+            <a:noAutofit/>
+          </a:bodyPr>
+          <a:lstStyle/>
+          <a:p>
+            <a:pPr algn="ctr">
+              <a:spcBef>
+                <a:spcPts val="300"/>
+              </a:spcBef>
+              <a:spcAft>
+                <a:spcPts val="300"/>
+              </a:spcAft>
+            </a:pPr>
+            <a:r>
+              <a:rPr lang="en-US" sz="1200" b="1" dirty="0">
+                <a:solidFill>
+                  <a:schemeClr val="tx1"/>
+                </a:solidFill>
+              </a:rPr>
+              <a:t>V1</a:t>
+            </a:r>
+          </a:p>
+        </p:txBody>
+      </p:sp>
+      <p:sp>
+        <p:nvSpPr>
+          <p:cNvPr id="21" name="Oval 20">
+            <a:extLst>
+              <a:ext uri="{FF2B5EF4-FFF2-40B4-BE49-F238E27FC236}">
+                <a16:creationId xmlns:a16="http://schemas.microsoft.com/office/drawing/2014/main" id="{D05E1FAC-3160-4B5A-B98D-370F61D3BB88}"/>
+              </a:ext>
+            </a:extLst>
+          </p:cNvPr>
+          <p:cNvSpPr/>
+          <p:nvPr/>
+        </p:nvSpPr>
+        <p:spPr bwMode="gray">
+          <a:xfrm>
+            <a:off x="6614624" y="4551264"/>
+            <a:ext cx="683322" cy="457633"/>
+          </a:xfrm>
+          <a:prstGeom prst="ellipse">
+            <a:avLst/>
+          </a:prstGeom>
+          <a:solidFill>
+            <a:schemeClr val="accent4">
+              <a:lumMod val="20000"/>
+              <a:lumOff val="80000"/>
+            </a:schemeClr>
+          </a:solidFill>
+          <a:ln/>
+        </p:spPr>
+        <p:style>
+          <a:lnRef idx="2">
+            <a:schemeClr val="dk1"/>
+          </a:lnRef>
+          <a:fillRef idx="1">
+            <a:schemeClr val="lt1"/>
+          </a:fillRef>
+          <a:effectRef idx="0">
+            <a:schemeClr val="dk1"/>
+          </a:effectRef>
+          <a:fontRef idx="minor">
+            <a:schemeClr val="dk1"/>
+          </a:fontRef>
+        </p:style>
+        <p:txBody>
+          <a:bodyPr rot="0" spcFirstLastPara="0" vertOverflow="overflow" horzOverflow="overflow" vert="horz" wrap="square" lIns="108000" tIns="72000" rIns="108000" bIns="72000" numCol="1" spcCol="0" rtlCol="0" fromWordArt="0" anchor="ctr" anchorCtr="0" forceAA="0" compatLnSpc="1">
+            <a:prstTxWarp prst="textNoShape">
+              <a:avLst/>
+            </a:prstTxWarp>
+            <a:noAutofit/>
+          </a:bodyPr>
+          <a:lstStyle/>
+          <a:p>
+            <a:pPr algn="ctr">
+              <a:spcBef>
+                <a:spcPts val="300"/>
+              </a:spcBef>
+              <a:spcAft>
+                <a:spcPts val="300"/>
+              </a:spcAft>
+            </a:pPr>
+            <a:r>
+              <a:rPr lang="en-US" sz="1200" b="1" dirty="0">
+                <a:solidFill>
+                  <a:schemeClr val="tx1"/>
+                </a:solidFill>
+              </a:rPr>
+              <a:t>V2</a:t>
+            </a:r>
+          </a:p>
+        </p:txBody>
+      </p:sp>
+      <p:cxnSp>
+        <p:nvCxnSpPr>
+          <p:cNvPr id="23" name="Straight Connector 22">
+            <a:extLst>
+              <a:ext uri="{FF2B5EF4-FFF2-40B4-BE49-F238E27FC236}">
+                <a16:creationId xmlns:a16="http://schemas.microsoft.com/office/drawing/2014/main" id="{0E58AA22-3212-44E6-A44E-78CAA414CE06}"/>
+              </a:ext>
+            </a:extLst>
+          </p:cNvPr>
+          <p:cNvCxnSpPr>
+            <a:cxnSpLocks/>
+            <a:stCxn id="19" idx="4"/>
+            <a:endCxn id="7" idx="1"/>
+          </p:cNvCxnSpPr>
+          <p:nvPr/>
+        </p:nvCxnSpPr>
+        <p:spPr bwMode="gray">
+          <a:xfrm flipV="1">
+            <a:off x="4689992" y="5298283"/>
+            <a:ext cx="551642" cy="38460"/>
+          </a:xfrm>
+          <a:prstGeom prst="line">
+            <a:avLst/>
+          </a:prstGeom>
+          <a:ln>
+            <a:solidFill>
+              <a:schemeClr val="accent1"/>
+            </a:solidFill>
+          </a:ln>
+        </p:spPr>
+        <p:style>
+          <a:lnRef idx="1">
+            <a:schemeClr val="accent1"/>
+          </a:lnRef>
+          <a:fillRef idx="0">
+            <a:schemeClr val="accent1"/>
+          </a:fillRef>
+          <a:effectRef idx="0">
+            <a:schemeClr val="accent1"/>
+          </a:effectRef>
+          <a:fontRef idx="minor">
+            <a:schemeClr val="tx1"/>
+          </a:fontRef>
+        </p:style>
+      </p:cxnSp>
+      <p:cxnSp>
+        <p:nvCxnSpPr>
+          <p:cNvPr id="24" name="Straight Connector 23">
+            <a:extLst>
+              <a:ext uri="{FF2B5EF4-FFF2-40B4-BE49-F238E27FC236}">
+                <a16:creationId xmlns:a16="http://schemas.microsoft.com/office/drawing/2014/main" id="{8DBA0DDE-EF88-4D76-BA19-C946D0DB7A67}"/>
+              </a:ext>
+            </a:extLst>
+          </p:cNvPr>
+          <p:cNvCxnSpPr>
+            <a:cxnSpLocks/>
+            <a:stCxn id="19" idx="4"/>
+            <a:endCxn id="8" idx="1"/>
+          </p:cNvCxnSpPr>
+          <p:nvPr/>
+        </p:nvCxnSpPr>
+        <p:spPr bwMode="gray">
+          <a:xfrm>
+            <a:off x="4689992" y="5336743"/>
+            <a:ext cx="551642" cy="642094"/>
+          </a:xfrm>
+          <a:prstGeom prst="line">
+            <a:avLst/>
+          </a:prstGeom>
+          <a:ln>
+            <a:solidFill>
+              <a:schemeClr val="accent1"/>
+            </a:solidFill>
+          </a:ln>
+        </p:spPr>
+        <p:style>
+          <a:lnRef idx="1">
+            <a:schemeClr val="accent1"/>
+          </a:lnRef>
+          <a:fillRef idx="0">
+            <a:schemeClr val="accent1"/>
+          </a:fillRef>
+          <a:effectRef idx="0">
+            <a:schemeClr val="accent1"/>
+          </a:effectRef>
+          <a:fontRef idx="minor">
+            <a:schemeClr val="tx1"/>
+          </a:fontRef>
+        </p:style>
+      </p:cxnSp>
+      <p:cxnSp>
+        <p:nvCxnSpPr>
+          <p:cNvPr id="27" name="Straight Connector 26">
+            <a:extLst>
+              <a:ext uri="{FF2B5EF4-FFF2-40B4-BE49-F238E27FC236}">
+                <a16:creationId xmlns:a16="http://schemas.microsoft.com/office/drawing/2014/main" id="{07A13DA7-274D-4502-B555-D35CBF86991E}"/>
+              </a:ext>
+            </a:extLst>
+          </p:cNvPr>
+          <p:cNvCxnSpPr>
+            <a:cxnSpLocks/>
+            <a:stCxn id="19" idx="4"/>
+            <a:endCxn id="11" idx="2"/>
+          </p:cNvCxnSpPr>
+          <p:nvPr/>
+        </p:nvCxnSpPr>
+        <p:spPr bwMode="gray">
+          <a:xfrm>
+            <a:off x="4689992" y="5336743"/>
+            <a:ext cx="1440774" cy="956829"/>
+          </a:xfrm>
+          <a:prstGeom prst="line">
+            <a:avLst/>
+          </a:prstGeom>
+          <a:ln>
+            <a:solidFill>
+              <a:schemeClr val="accent1"/>
+            </a:solidFill>
+          </a:ln>
+        </p:spPr>
+        <p:style>
+          <a:lnRef idx="1">
+            <a:schemeClr val="accent1"/>
+          </a:lnRef>
+          <a:fillRef idx="0">
+            <a:schemeClr val="accent1"/>
+          </a:fillRef>
+          <a:effectRef idx="0">
+            <a:schemeClr val="accent1"/>
+          </a:effectRef>
+          <a:fontRef idx="minor">
+            <a:schemeClr val="tx1"/>
+          </a:fontRef>
+        </p:style>
+      </p:cxnSp>
+      <p:cxnSp>
+        <p:nvCxnSpPr>
+          <p:cNvPr id="31" name="Straight Connector 30">
+            <a:extLst>
+              <a:ext uri="{FF2B5EF4-FFF2-40B4-BE49-F238E27FC236}">
+                <a16:creationId xmlns:a16="http://schemas.microsoft.com/office/drawing/2014/main" id="{C6427685-EEAF-4EA4-AA6C-AAB0C3662818}"/>
+              </a:ext>
+            </a:extLst>
+          </p:cNvPr>
+          <p:cNvCxnSpPr>
+            <a:cxnSpLocks/>
+            <a:stCxn id="21" idx="3"/>
+            <a:endCxn id="12" idx="7"/>
+          </p:cNvCxnSpPr>
+          <p:nvPr/>
+        </p:nvCxnSpPr>
+        <p:spPr bwMode="gray">
+          <a:xfrm flipH="1">
+            <a:off x="6271941" y="4941878"/>
+            <a:ext cx="442753" cy="67019"/>
+          </a:xfrm>
+          <a:prstGeom prst="line">
+            <a:avLst/>
+          </a:prstGeom>
+          <a:ln>
+            <a:solidFill>
+              <a:schemeClr val="accent1"/>
+            </a:solidFill>
+          </a:ln>
+        </p:spPr>
+        <p:style>
+          <a:lnRef idx="1">
+            <a:schemeClr val="accent1"/>
+          </a:lnRef>
+          <a:fillRef idx="0">
+            <a:schemeClr val="accent1"/>
+          </a:fillRef>
+          <a:effectRef idx="0">
+            <a:schemeClr val="accent1"/>
+          </a:effectRef>
+          <a:fontRef idx="minor">
+            <a:schemeClr val="tx1"/>
+          </a:fontRef>
+        </p:style>
+      </p:cxnSp>
+      <p:cxnSp>
+        <p:nvCxnSpPr>
+          <p:cNvPr id="34" name="Straight Connector 33">
+            <a:extLst>
+              <a:ext uri="{FF2B5EF4-FFF2-40B4-BE49-F238E27FC236}">
+                <a16:creationId xmlns:a16="http://schemas.microsoft.com/office/drawing/2014/main" id="{8C495E6E-5146-4096-87F6-69411C7D1EB3}"/>
+              </a:ext>
+            </a:extLst>
+          </p:cNvPr>
+          <p:cNvCxnSpPr>
+            <a:cxnSpLocks/>
+            <a:stCxn id="21" idx="3"/>
+            <a:endCxn id="13" idx="0"/>
+          </p:cNvCxnSpPr>
+          <p:nvPr/>
+        </p:nvCxnSpPr>
+        <p:spPr bwMode="gray">
+          <a:xfrm flipH="1">
+            <a:off x="6602938" y="4941878"/>
+            <a:ext cx="111756" cy="463840"/>
+          </a:xfrm>
+          <a:prstGeom prst="line">
+            <a:avLst/>
+          </a:prstGeom>
+          <a:ln>
+            <a:solidFill>
+              <a:schemeClr val="accent1"/>
+            </a:solidFill>
+          </a:ln>
+        </p:spPr>
+        <p:style>
+          <a:lnRef idx="1">
+            <a:schemeClr val="accent1"/>
+          </a:lnRef>
+          <a:fillRef idx="0">
+            <a:schemeClr val="accent1"/>
+          </a:fillRef>
+          <a:effectRef idx="0">
+            <a:schemeClr val="accent1"/>
+          </a:effectRef>
+          <a:fontRef idx="minor">
+            <a:schemeClr val="tx1"/>
+          </a:fontRef>
+        </p:style>
+      </p:cxnSp>
+      <p:cxnSp>
+        <p:nvCxnSpPr>
+          <p:cNvPr id="39" name="Straight Connector 38">
+            <a:extLst>
+              <a:ext uri="{FF2B5EF4-FFF2-40B4-BE49-F238E27FC236}">
+                <a16:creationId xmlns:a16="http://schemas.microsoft.com/office/drawing/2014/main" id="{CFCB0CD7-AAA6-4E30-8144-693923867854}"/>
+              </a:ext>
+            </a:extLst>
+          </p:cNvPr>
+          <p:cNvCxnSpPr>
+            <a:cxnSpLocks/>
+            <a:stCxn id="21" idx="3"/>
+            <a:endCxn id="9" idx="7"/>
+          </p:cNvCxnSpPr>
+          <p:nvPr/>
+        </p:nvCxnSpPr>
+        <p:spPr bwMode="gray">
+          <a:xfrm flipH="1">
+            <a:off x="6212330" y="4941878"/>
+            <a:ext cx="502364" cy="640137"/>
+          </a:xfrm>
+          <a:prstGeom prst="line">
+            <a:avLst/>
+          </a:prstGeom>
+          <a:ln>
+            <a:solidFill>
+              <a:schemeClr val="accent1"/>
+            </a:solidFill>
+          </a:ln>
+        </p:spPr>
+        <p:style>
+          <a:lnRef idx="1">
+            <a:schemeClr val="accent1"/>
+          </a:lnRef>
+          <a:fillRef idx="0">
+            <a:schemeClr val="accent1"/>
+          </a:fillRef>
+          <a:effectRef idx="0">
+            <a:schemeClr val="accent1"/>
+          </a:effectRef>
+          <a:fontRef idx="minor">
+            <a:schemeClr val="tx1"/>
+          </a:fontRef>
+        </p:style>
+      </p:cxnSp>
+    </p:spTree>
+    <p:extLst>
+      <p:ext uri="{BB962C8B-B14F-4D97-AF65-F5344CB8AC3E}">
+        <p14:creationId xmlns:p14="http://schemas.microsoft.com/office/powerpoint/2010/main" val="1982308745"/>
+      </p:ext>
+    </p:extLst>
+  </p:cSld>
+  <p:clrMapOvr>
+    <a:masterClrMapping/>
+  </p:clrMapOvr>
+  <p:timing>
+    <p:tnLst>
+      <p:par>
+        <p:cTn id="1" dur="indefinite" restart="never" nodeType="tmRoot">
+          <p:childTnLst>
+            <p:seq concurrent="1" nextAc="seek">
+              <p:cTn id="2" dur="indefinite" nodeType="mainSeq">
+                <p:childTnLst>
+                  <p:par>
+                    <p:cTn id="3" fill="hold">
+                      <p:stCondLst>
+                        <p:cond delay="indefinite"/>
+                      </p:stCondLst>
+                      <p:childTnLst>
+                        <p:par>
+                          <p:cTn id="4" fill="hold">
+                            <p:stCondLst>
+                              <p:cond delay="0"/>
+                            </p:stCondLst>
+                            <p:childTnLst>
+                              <p:par>
+                                <p:cTn id="5" presetID="1" presetClass="entr" presetSubtype="0" fill="hold" nodeType="clickEffect">
+                                  <p:stCondLst>
+                                    <p:cond delay="0"/>
+                                  </p:stCondLst>
+                                  <p:childTnLst>
+                                    <p:set>
+                                      <p:cBhvr>
+                                        <p:cTn id="6" dur="1" fill="hold">
+                                          <p:stCondLst>
+                                            <p:cond delay="0"/>
+                                          </p:stCondLst>
+                                        </p:cTn>
+                                        <p:tgtEl>
+                                          <p:spTgt spid="6"/>
+                                        </p:tgtEl>
+                                        <p:attrNameLst>
+                                          <p:attrName>style.visibility</p:attrName>
+                                        </p:attrNameLst>
+                                      </p:cBhvr>
+                                      <p:to>
+                                        <p:strVal val="visible"/>
+                                      </p:to>
+                                    </p:set>
+                                  </p:childTnLst>
+                                </p:cTn>
+                              </p:par>
+                              <p:par>
+                                <p:cTn id="7" presetID="1" presetClass="entr" presetSubtype="0" fill="hold" grpId="0" nodeType="withEffect">
+                                  <p:stCondLst>
+                                    <p:cond delay="0"/>
+                                  </p:stCondLst>
+                                  <p:childTnLst>
+                                    <p:set>
+                                      <p:cBhvr>
+                                        <p:cTn id="8" dur="1" fill="hold">
+                                          <p:stCondLst>
+                                            <p:cond delay="0"/>
+                                          </p:stCondLst>
+                                        </p:cTn>
+                                        <p:tgtEl>
+                                          <p:spTgt spid="19"/>
+                                        </p:tgtEl>
+                                        <p:attrNameLst>
+                                          <p:attrName>style.visibility</p:attrName>
+                                        </p:attrNameLst>
+                                      </p:cBhvr>
+                                      <p:to>
+                                        <p:strVal val="visible"/>
+                                      </p:to>
+                                    </p:set>
+                                  </p:childTnLst>
+                                </p:cTn>
+                              </p:par>
+                              <p:par>
+                                <p:cTn id="9" presetID="1" presetClass="entr" presetSubtype="0" fill="hold" grpId="0" nodeType="withEffect">
+                                  <p:stCondLst>
+                                    <p:cond delay="0"/>
+                                  </p:stCondLst>
+                                  <p:childTnLst>
+                                    <p:set>
+                                      <p:cBhvr>
+                                        <p:cTn id="10" dur="1" fill="hold">
+                                          <p:stCondLst>
+                                            <p:cond delay="0"/>
+                                          </p:stCondLst>
+                                        </p:cTn>
+                                        <p:tgtEl>
+                                          <p:spTgt spid="21"/>
+                                        </p:tgtEl>
+                                        <p:attrNameLst>
+                                          <p:attrName>style.visibility</p:attrName>
+                                        </p:attrNameLst>
+                                      </p:cBhvr>
+                                      <p:to>
+                                        <p:strVal val="visible"/>
+                                      </p:to>
+                                    </p:set>
+                                  </p:childTnLst>
+                                </p:cTn>
+                              </p:par>
+                              <p:par>
+                                <p:cTn id="11" presetID="1" presetClass="entr" presetSubtype="0" fill="hold" nodeType="withEffect">
+                                  <p:stCondLst>
+                                    <p:cond delay="0"/>
+                                  </p:stCondLst>
+                                  <p:childTnLst>
+                                    <p:set>
+                                      <p:cBhvr>
+                                        <p:cTn id="12" dur="1" fill="hold">
+                                          <p:stCondLst>
+                                            <p:cond delay="0"/>
+                                          </p:stCondLst>
+                                        </p:cTn>
+                                        <p:tgtEl>
+                                          <p:spTgt spid="23"/>
+                                        </p:tgtEl>
+                                        <p:attrNameLst>
+                                          <p:attrName>style.visibility</p:attrName>
+                                        </p:attrNameLst>
+                                      </p:cBhvr>
+                                      <p:to>
+                                        <p:strVal val="visible"/>
+                                      </p:to>
+                                    </p:set>
+                                  </p:childTnLst>
+                                </p:cTn>
+                              </p:par>
+                              <p:par>
+                                <p:cTn id="13" presetID="1" presetClass="entr" presetSubtype="0" fill="hold" nodeType="withEffect">
+                                  <p:stCondLst>
+                                    <p:cond delay="0"/>
+                                  </p:stCondLst>
+                                  <p:childTnLst>
+                                    <p:set>
+                                      <p:cBhvr>
+                                        <p:cTn id="14" dur="1" fill="hold">
+                                          <p:stCondLst>
+                                            <p:cond delay="0"/>
+                                          </p:stCondLst>
+                                        </p:cTn>
+                                        <p:tgtEl>
+                                          <p:spTgt spid="24"/>
+                                        </p:tgtEl>
+                                        <p:attrNameLst>
+                                          <p:attrName>style.visibility</p:attrName>
+                                        </p:attrNameLst>
+                                      </p:cBhvr>
+                                      <p:to>
+                                        <p:strVal val="visible"/>
+                                      </p:to>
+                                    </p:set>
+                                  </p:childTnLst>
+                                </p:cTn>
+                              </p:par>
+                              <p:par>
+                                <p:cTn id="15" presetID="1" presetClass="entr" presetSubtype="0" fill="hold" nodeType="withEffect">
+                                  <p:stCondLst>
+                                    <p:cond delay="0"/>
+                                  </p:stCondLst>
+                                  <p:childTnLst>
+                                    <p:set>
+                                      <p:cBhvr>
+                                        <p:cTn id="16" dur="1" fill="hold">
+                                          <p:stCondLst>
+                                            <p:cond delay="0"/>
+                                          </p:stCondLst>
+                                        </p:cTn>
+                                        <p:tgtEl>
+                                          <p:spTgt spid="27"/>
+                                        </p:tgtEl>
+                                        <p:attrNameLst>
+                                          <p:attrName>style.visibility</p:attrName>
+                                        </p:attrNameLst>
+                                      </p:cBhvr>
+                                      <p:to>
+                                        <p:strVal val="visible"/>
+                                      </p:to>
+                                    </p:set>
+                                  </p:childTnLst>
+                                </p:cTn>
+                              </p:par>
+                              <p:par>
+                                <p:cTn id="17" presetID="1" presetClass="entr" presetSubtype="0" fill="hold" nodeType="withEffect">
+                                  <p:stCondLst>
+                                    <p:cond delay="0"/>
+                                  </p:stCondLst>
+                                  <p:childTnLst>
+                                    <p:set>
+                                      <p:cBhvr>
+                                        <p:cTn id="18" dur="1" fill="hold">
+                                          <p:stCondLst>
+                                            <p:cond delay="0"/>
+                                          </p:stCondLst>
+                                        </p:cTn>
+                                        <p:tgtEl>
+                                          <p:spTgt spid="31"/>
+                                        </p:tgtEl>
+                                        <p:attrNameLst>
+                                          <p:attrName>style.visibility</p:attrName>
+                                        </p:attrNameLst>
+                                      </p:cBhvr>
+                                      <p:to>
+                                        <p:strVal val="visible"/>
+                                      </p:to>
+                                    </p:set>
+                                  </p:childTnLst>
+                                </p:cTn>
+                              </p:par>
+                              <p:par>
+                                <p:cTn id="19" presetID="1" presetClass="entr" presetSubtype="0" fill="hold" nodeType="withEffect">
+                                  <p:stCondLst>
+                                    <p:cond delay="0"/>
+                                  </p:stCondLst>
+                                  <p:childTnLst>
+                                    <p:set>
+                                      <p:cBhvr>
+                                        <p:cTn id="20" dur="1" fill="hold">
+                                          <p:stCondLst>
+                                            <p:cond delay="0"/>
+                                          </p:stCondLst>
+                                        </p:cTn>
+                                        <p:tgtEl>
+                                          <p:spTgt spid="34"/>
+                                        </p:tgtEl>
+                                        <p:attrNameLst>
+                                          <p:attrName>style.visibility</p:attrName>
+                                        </p:attrNameLst>
+                                      </p:cBhvr>
+                                      <p:to>
+                                        <p:strVal val="visible"/>
+                                      </p:to>
+                                    </p:set>
+                                  </p:childTnLst>
+                                </p:cTn>
+                              </p:par>
+                              <p:par>
+                                <p:cTn id="21" presetID="1" presetClass="entr" presetSubtype="0" fill="hold" nodeType="withEffect">
+                                  <p:stCondLst>
+                                    <p:cond delay="0"/>
+                                  </p:stCondLst>
+                                  <p:childTnLst>
+                                    <p:set>
+                                      <p:cBhvr>
+                                        <p:cTn id="22" dur="1" fill="hold">
+                                          <p:stCondLst>
+                                            <p:cond delay="0"/>
+                                          </p:stCondLst>
+                                        </p:cTn>
+                                        <p:tgtEl>
+                                          <p:spTgt spid="39"/>
+                                        </p:tgtEl>
+                                        <p:attrNameLst>
+                                          <p:attrName>style.visibility</p:attrName>
+                                        </p:attrNameLst>
+                                      </p:cBhvr>
+                                      <p:to>
+                                        <p:strVal val="visible"/>
+                                      </p:to>
+                                    </p:set>
+                                  </p:childTnLst>
+                                </p:cTn>
+                              </p:par>
+                              <p:par>
+                                <p:cTn id="23" presetID="1" presetClass="entr" presetSubtype="0" fill="hold" grpId="0" nodeType="withEffect">
+                                  <p:stCondLst>
+                                    <p:cond delay="0"/>
+                                  </p:stCondLst>
+                                  <p:childTnLst>
+                                    <p:set>
+                                      <p:cBhvr>
+                                        <p:cTn id="24" dur="1" fill="hold">
+                                          <p:stCondLst>
+                                            <p:cond delay="0"/>
+                                          </p:stCondLst>
+                                        </p:cTn>
+                                        <p:tgtEl>
+                                          <p:spTgt spid="5"/>
+                                        </p:tgtEl>
+                                        <p:attrNameLst>
+                                          <p:attrName>style.visibility</p:attrName>
+                                        </p:attrNameLst>
+                                      </p:cBhvr>
+                                      <p:to>
+                                        <p:strVal val="visible"/>
+                                      </p:to>
+                                    </p:set>
+                                  </p:childTnLst>
+                                </p:cTn>
+                              </p:par>
+                            </p:childTnLst>
+                          </p:cTn>
+                        </p:par>
+                      </p:childTnLst>
+                    </p:cTn>
+                  </p:par>
+                </p:childTnLst>
+              </p:cTn>
+              <p:prevCondLst>
+                <p:cond evt="onPrev" delay="0">
+                  <p:tgtEl>
+                    <p:sldTgt/>
+                  </p:tgtEl>
+                </p:cond>
+              </p:prevCondLst>
+              <p:nextCondLst>
+                <p:cond evt="onNext" delay="0">
+                  <p:tgtEl>
+                    <p:sldTgt/>
+                  </p:tgtEl>
+                </p:cond>
+              </p:nextCondLst>
+            </p:seq>
+          </p:childTnLst>
+        </p:cTn>
+      </p:par>
+    </p:tnLst>
+    <p:bldLst>
+      <p:bldP spid="5" grpId="0"/>
+      <p:bldP spid="19" grpId="0" animBg="1"/>
+      <p:bldP spid="21" grpId="0" animBg="1"/>
+    </p:bldLst>
+  </p:timing>
+</p:sld>
+</file>
+
+<file path=ppt/slides/slide11.xml><?xml version="1.0" encoding="utf-8"?>
+<p:sld xmlns:a="http://schemas.openxmlformats.org/drawingml/2006/main" xmlns:r="http://schemas.openxmlformats.org/officeDocument/2006/relationships" xmlns:p="http://schemas.openxmlformats.org/presentationml/2006/main">
+  <p:cSld>
+    <p:spTree>
+      <p:nvGrpSpPr>
+        <p:cNvPr id="1" name=""/>
+        <p:cNvGrpSpPr/>
+        <p:nvPr/>
+      </p:nvGrpSpPr>
+      <p:grpSpPr>
+        <a:xfrm>
+          <a:off x="0" y="0"/>
+          <a:ext cx="0" cy="0"/>
+          <a:chOff x="0" y="0"/>
+          <a:chExt cx="0" cy="0"/>
+        </a:xfrm>
+      </p:grpSpPr>
+      <p:sp>
+        <p:nvSpPr>
+          <p:cNvPr id="2" name="Title 1">
+            <a:extLst>
+              <a:ext uri="{FF2B5EF4-FFF2-40B4-BE49-F238E27FC236}">
+                <a16:creationId xmlns:a16="http://schemas.microsoft.com/office/drawing/2014/main" id="{B313CBF4-3487-41E3-AB04-C9881D74347F}"/>
+              </a:ext>
+            </a:extLst>
+          </p:cNvPr>
+          <p:cNvSpPr>
+            <a:spLocks noGrp="1"/>
+          </p:cNvSpPr>
+          <p:nvPr>
+            <p:ph type="title"/>
+          </p:nvPr>
+        </p:nvSpPr>
+        <p:spPr/>
+        <p:txBody>
+          <a:bodyPr/>
+          <a:lstStyle/>
+          <a:p>
+            <a:r>
+              <a:rPr lang="en-US" dirty="0"/>
               <a:t>Graph Embedding Methods – Anonymous Walks</a:t>
             </a:r>
           </a:p>
@@ -9736,7 +11731,7 @@
           <a:p>
             <a:fld id="{81561042-0DC2-4A04-AA50-F6D44EB20EBA}" type="slidenum">
               <a:rPr lang="en-US" smtClean="0"/>
-              <a:t>10</a:t>
+              <a:t>11</a:t>
             </a:fld>
             <a:endParaRPr lang="en-US"/>
           </a:p>
@@ -9772,8 +11767,8 @@
           </a:prstGeom>
         </p:spPr>
       </p:pic>
-      <mc:AlternateContent xmlns:mc="http://schemas.openxmlformats.org/markup-compatibility/2006">
-        <mc:Choice xmlns:a14="http://schemas.microsoft.com/office/drawing/2010/main" Requires="a14">
+      <mc:AlternateContent xmlns:mc="http://schemas.openxmlformats.org/markup-compatibility/2006" xmlns:a14="http://schemas.microsoft.com/office/drawing/2010/main">
+        <mc:Choice Requires="a14">
           <p:sp>
             <p:nvSpPr>
               <p:cNvPr id="52" name="TextBox 51">
@@ -9852,7 +11847,7 @@
             </p:txBody>
           </p:sp>
         </mc:Choice>
-        <mc:Fallback>
+        <mc:Fallback xmlns="">
           <p:sp>
             <p:nvSpPr>
               <p:cNvPr id="52" name="TextBox 51">
@@ -10204,8 +12199,8 @@
           </a:p>
         </p:txBody>
       </p:sp>
-      <mc:AlternateContent xmlns:mc="http://schemas.openxmlformats.org/markup-compatibility/2006">
-        <mc:Choice xmlns:a14="http://schemas.microsoft.com/office/drawing/2010/main" Requires="a14">
+      <mc:AlternateContent xmlns:mc="http://schemas.openxmlformats.org/markup-compatibility/2006" xmlns:a14="http://schemas.microsoft.com/office/drawing/2010/main">
+        <mc:Choice Requires="a14">
           <p:sp>
             <p:nvSpPr>
               <p:cNvPr id="55" name="TextBox 54">
@@ -10377,7 +12372,7 @@
             </p:txBody>
           </p:sp>
         </mc:Choice>
-        <mc:Fallback>
+        <mc:Fallback xmlns="">
           <p:sp>
             <p:nvSpPr>
               <p:cNvPr id="55" name="TextBox 54">
@@ -10482,8 +12477,8 @@
           </a:prstGeom>
         </p:spPr>
       </p:pic>
-      <mc:AlternateContent xmlns:mc="http://schemas.openxmlformats.org/markup-compatibility/2006">
-        <mc:Choice xmlns:a14="http://schemas.microsoft.com/office/drawing/2010/main" Requires="a14">
+      <mc:AlternateContent xmlns:mc="http://schemas.openxmlformats.org/markup-compatibility/2006" xmlns:a14="http://schemas.microsoft.com/office/drawing/2010/main">
+        <mc:Choice Requires="a14">
           <p:sp>
             <p:nvSpPr>
               <p:cNvPr id="58" name="TextBox 57">
@@ -10585,7 +12580,7 @@
             </p:txBody>
           </p:sp>
         </mc:Choice>
-        <mc:Fallback>
+        <mc:Fallback xmlns="">
           <p:sp>
             <p:nvSpPr>
               <p:cNvPr id="58" name="TextBox 57">
@@ -10660,8 +12655,8 @@
           </a:prstGeom>
         </p:spPr>
       </p:pic>
-      <mc:AlternateContent xmlns:mc="http://schemas.openxmlformats.org/markup-compatibility/2006">
-        <mc:Choice xmlns:a14="http://schemas.microsoft.com/office/drawing/2010/main" Requires="a14">
+      <mc:AlternateContent xmlns:mc="http://schemas.openxmlformats.org/markup-compatibility/2006" xmlns:a14="http://schemas.microsoft.com/office/drawing/2010/main">
+        <mc:Choice Requires="a14">
           <p:sp>
             <p:nvSpPr>
               <p:cNvPr id="47" name="TextBox 46">
@@ -10857,7 +12852,7 @@
             </p:txBody>
           </p:sp>
         </mc:Choice>
-        <mc:Fallback>
+        <mc:Fallback xmlns="">
           <p:sp>
             <p:nvSpPr>
               <p:cNvPr id="47" name="TextBox 46">
@@ -11084,33 +13079,6 @@
                                   </p:childTnLst>
                                 </p:cTn>
                               </p:par>
-                              <p:par>
-                                <p:cTn id="11" presetID="1" presetClass="entr" presetSubtype="0" fill="hold" grpId="0" nodeType="withEffect">
-                                  <p:stCondLst>
-                                    <p:cond delay="0"/>
-                                  </p:stCondLst>
-                                  <p:childTnLst>
-                                    <p:set>
-                                      <p:cBhvr>
-                                        <p:cTn id="12" dur="1" fill="hold">
-                                          <p:stCondLst>
-                                            <p:cond delay="0"/>
-                                          </p:stCondLst>
-                                        </p:cTn>
-                                        <p:tgtEl>
-                                          <p:spTgt spid="47"/>
-                                        </p:tgtEl>
-                                        <p:attrNameLst>
-                                          <p:attrName>style.visibility</p:attrName>
-                                        </p:attrNameLst>
-                                      </p:cBhvr>
-                                      <p:to>
-                                        <p:strVal val="visible"/>
-                                      </p:to>
-                                    </p:set>
-                                  </p:childTnLst>
-                                </p:cTn>
-                              </p:par>
                             </p:childTnLst>
                           </p:cTn>
                         </p:par>
@@ -11118,26 +13086,26 @@
                     </p:cTn>
                   </p:par>
                   <p:par>
-                    <p:cTn id="13" fill="hold">
+                    <p:cTn id="11" fill="hold">
                       <p:stCondLst>
                         <p:cond delay="indefinite"/>
                       </p:stCondLst>
                       <p:childTnLst>
                         <p:par>
-                          <p:cTn id="14" fill="hold">
+                          <p:cTn id="12" fill="hold">
                             <p:stCondLst>
                               <p:cond delay="0"/>
                             </p:stCondLst>
                             <p:childTnLst>
                               <p:par>
-                                <p:cTn id="15" presetID="1" presetClass="entr" presetSubtype="0" fill="hold" grpId="0" nodeType="clickEffect">
+                                <p:cTn id="13" presetID="1" presetClass="entr" presetSubtype="0" fill="hold" grpId="0" nodeType="clickEffect">
                                   <p:stCondLst>
                                     <p:cond delay="0"/>
                                   </p:stCondLst>
                                   <p:childTnLst>
                                     <p:set>
                                       <p:cBhvr>
-                                        <p:cTn id="16" dur="1" fill="hold">
+                                        <p:cTn id="14" dur="1" fill="hold">
                                           <p:stCondLst>
                                             <p:cond delay="0"/>
                                           </p:stCondLst>
@@ -11157,14 +13125,14 @@
                                 </p:cTn>
                               </p:par>
                               <p:par>
-                                <p:cTn id="17" presetID="1" presetClass="entr" presetSubtype="0" fill="hold" grpId="0" nodeType="withEffect">
+                                <p:cTn id="15" presetID="1" presetClass="entr" presetSubtype="0" fill="hold" grpId="0" nodeType="withEffect">
                                   <p:stCondLst>
                                     <p:cond delay="0"/>
                                   </p:stCondLst>
                                   <p:childTnLst>
                                     <p:set>
                                       <p:cBhvr>
-                                        <p:cTn id="18" dur="1" fill="hold">
+                                        <p:cTn id="16" dur="1" fill="hold">
                                           <p:stCondLst>
                                             <p:cond delay="0"/>
                                           </p:stCondLst>
@@ -11184,14 +13152,14 @@
                                 </p:cTn>
                               </p:par>
                               <p:par>
-                                <p:cTn id="19" presetID="1" presetClass="entr" presetSubtype="0" fill="hold" nodeType="withEffect">
+                                <p:cTn id="17" presetID="1" presetClass="entr" presetSubtype="0" fill="hold" nodeType="withEffect">
                                   <p:stCondLst>
                                     <p:cond delay="0"/>
                                   </p:stCondLst>
                                   <p:childTnLst>
                                     <p:set>
                                       <p:cBhvr>
-                                        <p:cTn id="20" dur="1" fill="hold">
+                                        <p:cTn id="18" dur="1" fill="hold">
                                           <p:stCondLst>
                                             <p:cond delay="0"/>
                                           </p:stCondLst>
@@ -11211,14 +13179,14 @@
                                 </p:cTn>
                               </p:par>
                               <p:par>
-                                <p:cTn id="21" presetID="1" presetClass="entr" presetSubtype="0" fill="hold" grpId="0" nodeType="withEffect">
+                                <p:cTn id="19" presetID="1" presetClass="entr" presetSubtype="0" fill="hold" grpId="0" nodeType="withEffect">
                                   <p:stCondLst>
                                     <p:cond delay="0"/>
                                   </p:stCondLst>
                                   <p:childTnLst>
                                     <p:set>
                                       <p:cBhvr>
-                                        <p:cTn id="22" dur="1" fill="hold">
+                                        <p:cTn id="20" dur="1" fill="hold">
                                           <p:stCondLst>
                                             <p:cond delay="0"/>
                                           </p:stCondLst>
@@ -11238,14 +13206,14 @@
                                 </p:cTn>
                               </p:par>
                               <p:par>
-                                <p:cTn id="23" presetID="1" presetClass="entr" presetSubtype="0" fill="hold" nodeType="withEffect">
+                                <p:cTn id="21" presetID="1" presetClass="entr" presetSubtype="0" fill="hold" nodeType="withEffect">
                                   <p:stCondLst>
                                     <p:cond delay="0"/>
                                   </p:stCondLst>
                                   <p:childTnLst>
                                     <p:set>
                                       <p:cBhvr>
-                                        <p:cTn id="24" dur="1" fill="hold">
+                                        <p:cTn id="22" dur="1" fill="hold">
                                           <p:stCondLst>
                                             <p:cond delay="0"/>
                                           </p:stCondLst>
@@ -11271,32 +13239,32 @@
                     </p:cTn>
                   </p:par>
                   <p:par>
-                    <p:cTn id="25" fill="hold">
+                    <p:cTn id="23" fill="hold">
                       <p:stCondLst>
                         <p:cond delay="indefinite"/>
                       </p:stCondLst>
                       <p:childTnLst>
                         <p:par>
-                          <p:cTn id="26" fill="hold">
+                          <p:cTn id="24" fill="hold">
                             <p:stCondLst>
                               <p:cond delay="0"/>
                             </p:stCondLst>
                             <p:childTnLst>
                               <p:par>
-                                <p:cTn id="27" presetID="1" presetClass="entr" presetSubtype="0" fill="hold" nodeType="clickEffect">
+                                <p:cTn id="25" presetID="1" presetClass="entr" presetSubtype="0" fill="hold" grpId="0" nodeType="clickEffect">
                                   <p:stCondLst>
                                     <p:cond delay="0"/>
                                   </p:stCondLst>
                                   <p:childTnLst>
                                     <p:set>
                                       <p:cBhvr>
-                                        <p:cTn id="28" dur="1" fill="hold">
+                                        <p:cTn id="26" dur="1" fill="hold">
                                           <p:stCondLst>
                                             <p:cond delay="0"/>
                                           </p:stCondLst>
                                         </p:cTn>
                                         <p:tgtEl>
-                                          <p:spTgt spid="26"/>
+                                          <p:spTgt spid="43"/>
                                         </p:tgtEl>
                                         <p:attrNameLst>
                                           <p:attrName>style.visibility</p:attrName>
@@ -11316,19 +13284,46 @@
                     </p:cTn>
                   </p:par>
                   <p:par>
-                    <p:cTn id="29" fill="hold">
+                    <p:cTn id="27" fill="hold">
                       <p:stCondLst>
                         <p:cond delay="indefinite"/>
                       </p:stCondLst>
                       <p:childTnLst>
                         <p:par>
-                          <p:cTn id="30" fill="hold">
+                          <p:cTn id="28" fill="hold">
                             <p:stCondLst>
                               <p:cond delay="0"/>
                             </p:stCondLst>
                             <p:childTnLst>
                               <p:par>
-                                <p:cTn id="31" presetID="1" presetClass="entr" presetSubtype="0" fill="hold" grpId="0" nodeType="clickEffect">
+                                <p:cTn id="29" presetID="1" presetClass="entr" presetSubtype="0" fill="hold" nodeType="clickEffect">
+                                  <p:stCondLst>
+                                    <p:cond delay="0"/>
+                                  </p:stCondLst>
+                                  <p:childTnLst>
+                                    <p:set>
+                                      <p:cBhvr>
+                                        <p:cTn id="30" dur="1" fill="hold">
+                                          <p:stCondLst>
+                                            <p:cond delay="0"/>
+                                          </p:stCondLst>
+                                        </p:cTn>
+                                        <p:tgtEl>
+                                          <p:spTgt spid="26"/>
+                                        </p:tgtEl>
+                                        <p:attrNameLst>
+                                          <p:attrName>style.visibility</p:attrName>
+                                        </p:attrNameLst>
+                                      </p:cBhvr>
+                                      <p:to>
+                                        <p:strVal val="visible"/>
+                                      </p:to>
+                                    </p:set>
+                                  </p:childTnLst>
+                                </p:cTn>
+                              </p:par>
+                              <p:par>
+                                <p:cTn id="31" presetID="1" presetClass="entr" presetSubtype="0" fill="hold" grpId="0" nodeType="withEffect">
                                   <p:stCondLst>
                                     <p:cond delay="0"/>
                                   </p:stCondLst>
@@ -11341,7 +13336,7 @@
                                           </p:stCondLst>
                                         </p:cTn>
                                         <p:tgtEl>
-                                          <p:spTgt spid="43"/>
+                                          <p:spTgt spid="47"/>
                                         </p:tgtEl>
                                         <p:attrNameLst>
                                           <p:attrName>style.visibility</p:attrName>
@@ -11394,7 +13389,7 @@
 </p:sld>
 </file>
 
-<file path=ppt/slides/slide11.xml><?xml version="1.0" encoding="utf-8"?>
+<file path=ppt/slides/slide12.xml><?xml version="1.0" encoding="utf-8"?>
 <p:sld xmlns:a="http://schemas.openxmlformats.org/drawingml/2006/main" xmlns:r="http://schemas.openxmlformats.org/officeDocument/2006/relationships" xmlns:p="http://schemas.openxmlformats.org/presentationml/2006/main">
   <p:cSld>
     <p:spTree>
@@ -11845,7 +13840,7 @@
           <a:p>
             <a:fld id="{81561042-0DC2-4A04-AA50-F6D44EB20EBA}" type="slidenum">
               <a:rPr lang="en-US" smtClean="0"/>
-              <a:t>11</a:t>
+              <a:t>12</a:t>
             </a:fld>
             <a:endParaRPr lang="en-US"/>
           </a:p>
@@ -11864,7 +13859,7 @@
 </p:sld>
 </file>
 
-<file path=ppt/slides/slide12.xml><?xml version="1.0" encoding="utf-8"?>
+<file path=ppt/slides/slide13.xml><?xml version="1.0" encoding="utf-8"?>
 <p:sld xmlns:a="http://schemas.openxmlformats.org/drawingml/2006/main" xmlns:r="http://schemas.openxmlformats.org/officeDocument/2006/relationships" xmlns:p="http://schemas.openxmlformats.org/presentationml/2006/main">
   <p:cSld>
     <p:spTree>
@@ -11981,7 +13976,7 @@
                 </a:solidFill>
                 <a:latin typeface="Slack-Lato"/>
               </a:rPr>
-              <a:t>{Problem]</a:t>
+              <a:t>[Problem]</a:t>
             </a:r>
             <a:r>
               <a:rPr lang="en-US" dirty="0">
@@ -12122,7 +14117,7 @@
           <a:p>
             <a:fld id="{81561042-0DC2-4A04-AA50-F6D44EB20EBA}" type="slidenum">
               <a:rPr lang="en-US" smtClean="0"/>
-              <a:t>12</a:t>
+              <a:t>13</a:t>
             </a:fld>
             <a:endParaRPr lang="en-US"/>
           </a:p>
@@ -12141,7 +14136,7 @@
 </p:sld>
 </file>
 
-<file path=ppt/slides/slide13.xml><?xml version="1.0" encoding="utf-8"?>
+<file path=ppt/slides/slide14.xml><?xml version="1.0" encoding="utf-8"?>
 <p:sld xmlns:a="http://schemas.openxmlformats.org/drawingml/2006/main" xmlns:r="http://schemas.openxmlformats.org/officeDocument/2006/relationships" xmlns:p="http://schemas.openxmlformats.org/presentationml/2006/main">
   <p:cSld>
     <p:spTree>
@@ -12360,61 +14355,6 @@
                 <a:latin typeface="+mj-lt"/>
               </a:rPr>
               <a:t>I do not know the prediction tasks yet</a:t>
-            </a:r>
-          </a:p>
-        </p:txBody>
-      </p:sp>
-      <p:sp>
-        <p:nvSpPr>
-          <p:cNvPr id="18" name="TextBox 17">
-            <a:extLst>
-              <a:ext uri="{FF2B5EF4-FFF2-40B4-BE49-F238E27FC236}">
-                <a16:creationId xmlns:a16="http://schemas.microsoft.com/office/drawing/2014/main" id="{889FD16F-C4CD-439A-9B1B-DB8C581700D2}"/>
-              </a:ext>
-            </a:extLst>
-          </p:cNvPr>
-          <p:cNvSpPr txBox="1"/>
-          <p:nvPr/>
-        </p:nvSpPr>
-        <p:spPr bwMode="gray">
-          <a:xfrm>
-            <a:off x="82553" y="6386368"/>
-            <a:ext cx="10217055" cy="461665"/>
-          </a:xfrm>
-          <a:prstGeom prst="rect">
-            <a:avLst/>
-          </a:prstGeom>
-          <a:noFill/>
-        </p:spPr>
-        <p:txBody>
-          <a:bodyPr wrap="square">
-            <a:spAutoFit/>
-          </a:bodyPr>
-          <a:lstStyle/>
-          <a:p>
-            <a:r>
-              <a:rPr lang="en-US" sz="1200" u="sng" dirty="0"/>
-              <a:t>source</a:t>
-            </a:r>
-            <a:r>
-              <a:rPr lang="en-US" sz="1200" dirty="0"/>
-              <a:t>: Pandit, Shashank, et al. "</a:t>
-            </a:r>
-            <a:r>
-              <a:rPr lang="en-US" sz="1200" dirty="0" err="1"/>
-              <a:t>Netprobe</a:t>
-            </a:r>
-            <a:r>
-              <a:rPr lang="en-US" sz="1200" dirty="0"/>
-              <a:t>: a fast and scalable system for fraud detection in online auction networks." </a:t>
-            </a:r>
-            <a:r>
-              <a:rPr lang="en-US" sz="1200" i="1" dirty="0"/>
-              <a:t>Proceedings of the 16th international conference on World Wide Web</a:t>
-            </a:r>
-            <a:r>
-              <a:rPr lang="en-US" sz="1200" dirty="0"/>
-              <a:t>. 2007.</a:t>
             </a:r>
           </a:p>
         </p:txBody>
@@ -15194,8 +17134,8 @@
           </a:p>
         </p:txBody>
       </p:sp>
-      <mc:AlternateContent xmlns:mc="http://schemas.openxmlformats.org/markup-compatibility/2006">
-        <mc:Choice xmlns:a14="http://schemas.microsoft.com/office/drawing/2010/main" Requires="a14">
+      <mc:AlternateContent xmlns:mc="http://schemas.openxmlformats.org/markup-compatibility/2006" xmlns:a14="http://schemas.microsoft.com/office/drawing/2010/main">
+        <mc:Choice Requires="a14">
           <p:sp>
             <p:nvSpPr>
               <p:cNvPr id="6" name="TextBox 5">
@@ -15280,7 +17220,7 @@
             </p:txBody>
           </p:sp>
         </mc:Choice>
-        <mc:Fallback>
+        <mc:Fallback xmlns="">
           <p:sp>
             <p:nvSpPr>
               <p:cNvPr id="6" name="TextBox 5">
@@ -15325,8 +17265,8 @@
           </p:sp>
         </mc:Fallback>
       </mc:AlternateContent>
-      <mc:AlternateContent xmlns:mc="http://schemas.openxmlformats.org/markup-compatibility/2006">
-        <mc:Choice xmlns:a14="http://schemas.microsoft.com/office/drawing/2010/main" Requires="a14">
+      <mc:AlternateContent xmlns:mc="http://schemas.openxmlformats.org/markup-compatibility/2006" xmlns:a14="http://schemas.microsoft.com/office/drawing/2010/main">
+        <mc:Choice Requires="a14">
           <p:sp>
             <p:nvSpPr>
               <p:cNvPr id="59" name="TextBox 58">
@@ -15412,7 +17352,7 @@
             </p:txBody>
           </p:sp>
         </mc:Choice>
-        <mc:Fallback>
+        <mc:Fallback xmlns="">
           <p:sp>
             <p:nvSpPr>
               <p:cNvPr id="59" name="TextBox 58">
@@ -15522,8 +17462,8 @@
           </a:p>
         </p:txBody>
       </p:sp>
-      <mc:AlternateContent xmlns:mc="http://schemas.openxmlformats.org/markup-compatibility/2006">
-        <mc:Choice xmlns:a14="http://schemas.microsoft.com/office/drawing/2010/main" Requires="a14">
+      <mc:AlternateContent xmlns:mc="http://schemas.openxmlformats.org/markup-compatibility/2006" xmlns:a14="http://schemas.microsoft.com/office/drawing/2010/main">
+        <mc:Choice Requires="a14">
           <p:sp>
             <p:nvSpPr>
               <p:cNvPr id="60" name="TextBox 59">
@@ -15657,7 +17597,7 @@
             </p:txBody>
           </p:sp>
         </mc:Choice>
-        <mc:Fallback>
+        <mc:Fallback xmlns="">
           <p:sp>
             <p:nvSpPr>
               <p:cNvPr id="60" name="TextBox 59">
@@ -15702,8 +17642,8 @@
           </p:sp>
         </mc:Fallback>
       </mc:AlternateContent>
-      <mc:AlternateContent xmlns:mc="http://schemas.openxmlformats.org/markup-compatibility/2006">
-        <mc:Choice xmlns:a14="http://schemas.microsoft.com/office/drawing/2010/main" Requires="a14">
+      <mc:AlternateContent xmlns:mc="http://schemas.openxmlformats.org/markup-compatibility/2006" xmlns:a14="http://schemas.microsoft.com/office/drawing/2010/main">
+        <mc:Choice Requires="a14">
           <p:sp>
             <p:nvSpPr>
               <p:cNvPr id="61" name="TextBox 60">
@@ -15826,7 +17766,7 @@
             </p:txBody>
           </p:sp>
         </mc:Choice>
-        <mc:Fallback>
+        <mc:Fallback xmlns="">
           <p:sp>
             <p:nvSpPr>
               <p:cNvPr id="61" name="TextBox 60">
@@ -16331,7 +18271,7 @@
       <p:bldP spid="7" grpId="0" animBg="1"/>
       <p:bldP spid="60" grpId="0"/>
       <p:bldP spid="61" grpId="0"/>
-      <p:bldP spid="62" grpId="0"/>
+      <p:bldP spid="62" grpId="0" animBg="1"/>
     </p:bldLst>
   </p:timing>
 </p:sld>
@@ -16382,8 +18322,8 @@
           </a:p>
         </p:txBody>
       </p:sp>
-      <mc:AlternateContent xmlns:mc="http://schemas.openxmlformats.org/markup-compatibility/2006">
-        <mc:Choice xmlns:a14="http://schemas.microsoft.com/office/drawing/2010/main" Requires="a14">
+      <mc:AlternateContent xmlns:mc="http://schemas.openxmlformats.org/markup-compatibility/2006" xmlns:a14="http://schemas.microsoft.com/office/drawing/2010/main">
+        <mc:Choice Requires="a14">
           <p:sp>
             <p:nvSpPr>
               <p:cNvPr id="3" name="Content Placeholder 2">
@@ -16462,7 +18402,7 @@
             </p:txBody>
           </p:sp>
         </mc:Choice>
-        <mc:Fallback>
+        <mc:Fallback xmlns="">
           <p:sp>
             <p:nvSpPr>
               <p:cNvPr id="3" name="Content Placeholder 2">
@@ -16535,8 +18475,8 @@
           </a:p>
         </p:txBody>
       </p:sp>
-      <mc:AlternateContent xmlns:mc="http://schemas.openxmlformats.org/markup-compatibility/2006">
-        <mc:Choice xmlns:a14="http://schemas.microsoft.com/office/drawing/2010/main" Requires="a14">
+      <mc:AlternateContent xmlns:mc="http://schemas.openxmlformats.org/markup-compatibility/2006" xmlns:a14="http://schemas.microsoft.com/office/drawing/2010/main">
+        <mc:Choice Requires="a14">
           <p:sp>
             <p:nvSpPr>
               <p:cNvPr id="5" name="TextBox 4">
@@ -16739,7 +18679,7 @@
             </p:txBody>
           </p:sp>
         </mc:Choice>
-        <mc:Fallback>
+        <mc:Fallback xmlns="">
           <p:sp>
             <p:nvSpPr>
               <p:cNvPr id="5" name="TextBox 4">
@@ -18762,8 +20702,8 @@
           </a:p>
         </p:txBody>
       </p:sp>
-      <mc:AlternateContent xmlns:mc="http://schemas.openxmlformats.org/markup-compatibility/2006">
-        <mc:Choice xmlns:a14="http://schemas.microsoft.com/office/drawing/2010/main" Requires="a14">
+      <mc:AlternateContent xmlns:mc="http://schemas.openxmlformats.org/markup-compatibility/2006" xmlns:a14="http://schemas.microsoft.com/office/drawing/2010/main">
+        <mc:Choice Requires="a14">
           <p:sp>
             <p:nvSpPr>
               <p:cNvPr id="9" name="TextBox 8">
@@ -18882,7 +20822,7 @@
             </p:txBody>
           </p:sp>
         </mc:Choice>
-        <mc:Fallback>
+        <mc:Fallback xmlns="">
           <p:sp>
             <p:nvSpPr>
               <p:cNvPr id="9" name="TextBox 8">
@@ -18927,8 +20867,8 @@
           </p:sp>
         </mc:Fallback>
       </mc:AlternateContent>
-      <mc:AlternateContent xmlns:mc="http://schemas.openxmlformats.org/markup-compatibility/2006">
-        <mc:Choice xmlns:a14="http://schemas.microsoft.com/office/drawing/2010/main" Requires="a14">
+      <mc:AlternateContent xmlns:mc="http://schemas.openxmlformats.org/markup-compatibility/2006" xmlns:a14="http://schemas.microsoft.com/office/drawing/2010/main">
+        <mc:Choice Requires="a14">
           <p:sp>
             <p:nvSpPr>
               <p:cNvPr id="13" name="TextBox 12">
@@ -19030,7 +20970,7 @@
             </p:txBody>
           </p:sp>
         </mc:Choice>
-        <mc:Fallback>
+        <mc:Fallback xmlns="">
           <p:sp>
             <p:nvSpPr>
               <p:cNvPr id="13" name="TextBox 12">
@@ -19135,8 +21075,8 @@
           </a:prstGeom>
         </p:spPr>
       </p:pic>
-      <mc:AlternateContent xmlns:mc="http://schemas.openxmlformats.org/markup-compatibility/2006">
-        <mc:Choice xmlns:a14="http://schemas.microsoft.com/office/drawing/2010/main" Requires="a14">
+      <mc:AlternateContent xmlns:mc="http://schemas.openxmlformats.org/markup-compatibility/2006" xmlns:a14="http://schemas.microsoft.com/office/drawing/2010/main">
+        <mc:Choice Requires="a14">
           <p:sp>
             <p:nvSpPr>
               <p:cNvPr id="22" name="TextBox 21">
@@ -19218,7 +21158,7 @@
             </p:txBody>
           </p:sp>
         </mc:Choice>
-        <mc:Fallback>
+        <mc:Fallback xmlns="">
           <p:sp>
             <p:nvSpPr>
               <p:cNvPr id="22" name="TextBox 21">
@@ -19376,8 +21316,8 @@
           </a:fontRef>
         </p:style>
       </p:cxnSp>
-      <mc:AlternateContent xmlns:mc="http://schemas.openxmlformats.org/markup-compatibility/2006">
-        <mc:Choice xmlns:a14="http://schemas.microsoft.com/office/drawing/2010/main" Requires="a14">
+      <mc:AlternateContent xmlns:mc="http://schemas.openxmlformats.org/markup-compatibility/2006" xmlns:a14="http://schemas.microsoft.com/office/drawing/2010/main">
+        <mc:Choice Requires="a14">
           <p:sp>
             <p:nvSpPr>
               <p:cNvPr id="33" name="TextBox 32">
@@ -19459,7 +21399,7 @@
             </p:txBody>
           </p:sp>
         </mc:Choice>
-        <mc:Fallback>
+        <mc:Fallback xmlns="">
           <p:sp>
             <p:nvSpPr>
               <p:cNvPr id="33" name="TextBox 32">
@@ -19617,8 +21557,8 @@
           </a:fontRef>
         </p:style>
       </p:cxnSp>
-      <mc:AlternateContent xmlns:mc="http://schemas.openxmlformats.org/markup-compatibility/2006">
-        <mc:Choice xmlns:a14="http://schemas.microsoft.com/office/drawing/2010/main" Requires="a14">
+      <mc:AlternateContent xmlns:mc="http://schemas.openxmlformats.org/markup-compatibility/2006" xmlns:a14="http://schemas.microsoft.com/office/drawing/2010/main">
+        <mc:Choice Requires="a14">
           <p:sp>
             <p:nvSpPr>
               <p:cNvPr id="43" name="TextBox 42">
@@ -19718,7 +21658,7 @@
             </p:txBody>
           </p:sp>
         </mc:Choice>
-        <mc:Fallback>
+        <mc:Fallback xmlns="">
           <p:sp>
             <p:nvSpPr>
               <p:cNvPr id="43" name="TextBox 42">
@@ -19828,8 +21768,8 @@
           </a:p>
         </p:txBody>
       </p:sp>
-      <mc:AlternateContent xmlns:mc="http://schemas.openxmlformats.org/markup-compatibility/2006">
-        <mc:Choice xmlns:a14="http://schemas.microsoft.com/office/drawing/2010/main" Requires="a14">
+      <mc:AlternateContent xmlns:mc="http://schemas.openxmlformats.org/markup-compatibility/2006" xmlns:a14="http://schemas.microsoft.com/office/drawing/2010/main">
+        <mc:Choice Requires="a14">
           <p:sp>
             <p:nvSpPr>
               <p:cNvPr id="55" name="TextBox 54">
@@ -19965,7 +21905,7 @@
             </p:txBody>
           </p:sp>
         </mc:Choice>
-        <mc:Fallback>
+        <mc:Fallback xmlns="">
           <p:sp>
             <p:nvSpPr>
               <p:cNvPr id="55" name="TextBox 54">
@@ -20865,8 +22805,8 @@
           </a:p>
         </p:txBody>
       </p:sp>
-      <mc:AlternateContent xmlns:mc="http://schemas.openxmlformats.org/markup-compatibility/2006">
-        <mc:Choice xmlns:a14="http://schemas.microsoft.com/office/drawing/2010/main" Requires="a14">
+      <mc:AlternateContent xmlns:mc="http://schemas.openxmlformats.org/markup-compatibility/2006" xmlns:a14="http://schemas.microsoft.com/office/drawing/2010/main">
+        <mc:Choice Requires="a14">
           <p:sp>
             <p:nvSpPr>
               <p:cNvPr id="3" name="Content Placeholder 2">
@@ -20966,7 +22906,7 @@
             </p:txBody>
           </p:sp>
         </mc:Choice>
-        <mc:Fallback>
+        <mc:Fallback xmlns="">
           <p:sp>
             <p:nvSpPr>
               <p:cNvPr id="3" name="Content Placeholder 2">
@@ -24303,8 +26243,8 @@
           </a:p>
         </p:txBody>
       </p:sp>
-      <mc:AlternateContent xmlns:mc="http://schemas.openxmlformats.org/markup-compatibility/2006">
-        <mc:Choice xmlns:a14="http://schemas.microsoft.com/office/drawing/2010/main" Requires="a14">
+      <mc:AlternateContent xmlns:mc="http://schemas.openxmlformats.org/markup-compatibility/2006" xmlns:a14="http://schemas.microsoft.com/office/drawing/2010/main">
+        <mc:Choice Requires="a14">
           <p:sp>
             <p:nvSpPr>
               <p:cNvPr id="124" name="TextBox 123">
@@ -24399,7 +26339,13 @@
                                   <a:rPr lang="en-US" sz="1400" b="1" i="1" smtClean="0">
                                     <a:latin typeface="Cambria Math" panose="02040503050406030204" pitchFamily="18" charset="0"/>
                                   </a:rPr>
-                                  <m:t>𝑵𝒐𝒅𝒆𝒔</m:t>
+                                  <m:t>𝑵</m:t>
+                                </m:r>
+                                <m:r>
+                                  <a:rPr lang="en-US" sz="1400" b="1" i="1" smtClean="0">
+                                    <a:latin typeface="Cambria Math" panose="02040503050406030204" pitchFamily="18" charset="0"/>
+                                  </a:rPr>
+                                  <m:t>𝒐𝒅𝒆𝒔</m:t>
                                 </m:r>
                               </m:e>
                               <m:e>
@@ -24587,7 +26533,7 @@
             </p:txBody>
           </p:sp>
         </mc:Choice>
-        <mc:Fallback>
+        <mc:Fallback xmlns="">
           <p:sp>
             <p:nvSpPr>
               <p:cNvPr id="124" name="TextBox 123">
@@ -27020,7 +28966,7 @@
           <p:cNvPr id="2" name="Title 1">
             <a:extLst>
               <a:ext uri="{FF2B5EF4-FFF2-40B4-BE49-F238E27FC236}">
-                <a16:creationId xmlns:a16="http://schemas.microsoft.com/office/drawing/2014/main" id="{B313CBF4-3487-41E3-AB04-C9881D74347F}"/>
+                <a16:creationId xmlns:a16="http://schemas.microsoft.com/office/drawing/2014/main" id="{07BF781A-A138-4390-AD77-66637E792E6B}"/>
               </a:ext>
             </a:extLst>
           </p:cNvPr>
@@ -27037,1956 +28983,76 @@
           <a:lstStyle/>
           <a:p>
             <a:r>
-              <a:rPr lang="en-US" dirty="0"/>
-              <a:t>Graph Embedding Methods</a:t>
-            </a:r>
-          </a:p>
-        </p:txBody>
-      </p:sp>
-      <mc:AlternateContent xmlns:mc="http://schemas.openxmlformats.org/markup-compatibility/2006">
-        <mc:Choice xmlns:a14="http://schemas.microsoft.com/office/drawing/2010/main" Requires="a14">
-          <p:sp>
-            <p:nvSpPr>
-              <p:cNvPr id="3" name="Content Placeholder 2">
-                <a:extLst>
-                  <a:ext uri="{FF2B5EF4-FFF2-40B4-BE49-F238E27FC236}">
-                    <a16:creationId xmlns:a16="http://schemas.microsoft.com/office/drawing/2014/main" id="{5FB91C98-330A-446E-8A14-1BB70B4F3F0B}"/>
-                  </a:ext>
-                </a:extLst>
-              </p:cNvPr>
-              <p:cNvSpPr>
-                <a:spLocks noGrp="1"/>
-              </p:cNvSpPr>
-              <p:nvPr>
-                <p:ph idx="1"/>
-              </p:nvPr>
-            </p:nvSpPr>
-            <p:spPr>
-              <a:xfrm>
-                <a:off x="478369" y="962244"/>
-                <a:ext cx="11473384" cy="1613070"/>
-              </a:xfrm>
-            </p:spPr>
-            <p:txBody>
-              <a:bodyPr/>
-              <a:lstStyle/>
-              <a:p>
-                <a:r>
-                  <a:rPr lang="en-US" b="1" dirty="0"/>
-                  <a:t>Aggregation</a:t>
-                </a:r>
-                <a:r>
-                  <a:rPr lang="en-US" dirty="0"/>
-                  <a:t>: </a:t>
-                </a:r>
-              </a:p>
-              <a:p>
-                <a:endParaRPr lang="en-US" sz="1800" dirty="0">
-                  <a:effectLst/>
-                  <a:latin typeface="Cambria Math" panose="02040503050406030204" pitchFamily="18" charset="0"/>
-                </a:endParaRPr>
-              </a:p>
-              <a:p>
-                <a14:m>
-                  <m:oMathPara xmlns:m="http://schemas.openxmlformats.org/officeDocument/2006/math">
-                    <m:oMathParaPr>
-                      <m:jc m:val="centerGroup"/>
-                    </m:oMathParaPr>
-                    <m:oMath xmlns:m="http://schemas.openxmlformats.org/officeDocument/2006/math">
-                      <m:r>
-                        <a:rPr lang="x-IV_mathan" sz="1800" smtClean="0">
-                          <a:effectLst/>
-                          <a:latin typeface="Cambria Math" panose="02040503050406030204" pitchFamily="18" charset="0"/>
-                        </a:rPr>
-                        <m:t>𝐸𝑚𝑏𝑒𝑑𝑑𝑖𝑛𝑔</m:t>
-                      </m:r>
-                      <m:r>
-                        <a:rPr lang="en-US" sz="1800" b="0" i="1" smtClean="0">
-                          <a:effectLst/>
-                          <a:latin typeface="Cambria Math" panose="02040503050406030204" pitchFamily="18" charset="0"/>
-                        </a:rPr>
-                        <m:t>𝑂𝑓</m:t>
-                      </m:r>
-                      <m:r>
-                        <a:rPr lang="x-IV_mathan" sz="1800">
-                          <a:effectLst/>
-                          <a:latin typeface="Cambria Math" panose="02040503050406030204" pitchFamily="18" charset="0"/>
-                        </a:rPr>
-                        <m:t>𝐷𝑜𝑐𝑢𝑚𝑒𝑛𝑡</m:t>
-                      </m:r>
-                      <m:r>
-                        <a:rPr lang="x-IV_mathan" sz="1800">
-                          <a:effectLst/>
-                          <a:latin typeface="Cambria Math" panose="02040503050406030204" pitchFamily="18" charset="0"/>
-                        </a:rPr>
-                        <m:t>=</m:t>
-                      </m:r>
-                      <m:r>
-                        <a:rPr lang="x-IV_mathan" sz="1800" i="1">
-                          <a:effectLst/>
-                          <a:latin typeface="Cambria Math" panose="02040503050406030204" pitchFamily="18" charset="0"/>
-                        </a:rPr>
-                        <m:t> </m:t>
-                      </m:r>
-                      <m:nary>
-                        <m:naryPr>
-                          <m:chr m:val="∑"/>
-                          <m:supHide m:val="on"/>
-                          <m:ctrlPr>
-                            <a:rPr lang="x-IV_mathan" sz="1800" i="1">
-                              <a:effectLst/>
-                              <a:latin typeface="Cambria Math" panose="02040503050406030204" pitchFamily="18" charset="0"/>
-                            </a:rPr>
-                          </m:ctrlPr>
-                        </m:naryPr>
-                        <m:sub>
-                          <m:r>
-                            <a:rPr lang="x-IV_mathan" sz="1800">
-                              <a:effectLst/>
-                              <a:latin typeface="Cambria Math" panose="02040503050406030204" pitchFamily="18" charset="0"/>
-                            </a:rPr>
-                            <m:t>𝑖</m:t>
-                          </m:r>
-                          <m:r>
-                            <a:rPr lang="x-IV_mathan" sz="1800">
-                              <a:effectLst/>
-                              <a:latin typeface="Cambria Math" panose="02040503050406030204" pitchFamily="18" charset="0"/>
-                            </a:rPr>
-                            <m:t>∈</m:t>
-                          </m:r>
-                          <m:r>
-                            <a:rPr lang="x-IV_mathan" sz="1800">
-                              <a:effectLst/>
-                              <a:latin typeface="Cambria Math" panose="02040503050406030204" pitchFamily="18" charset="0"/>
-                            </a:rPr>
-                            <m:t>𝑊𝑜𝑟𝑑𝑠</m:t>
-                          </m:r>
-                        </m:sub>
-                        <m:sup/>
-                        <m:e>
-                          <m:r>
-                            <a:rPr lang="x-IV_mathan" sz="1800">
-                              <a:effectLst/>
-                              <a:latin typeface="Cambria Math" panose="02040503050406030204" pitchFamily="18" charset="0"/>
-                            </a:rPr>
-                            <m:t>𝐸𝑚𝑏𝑒𝑑𝑑𝑖𝑛𝑔𝑂𝑓𝑊𝑜𝑟</m:t>
-                          </m:r>
-                          <m:sSub>
-                            <m:sSubPr>
-                              <m:ctrlPr>
-                                <a:rPr lang="x-IV_mathan" sz="1800" i="1">
-                                  <a:effectLst/>
-                                  <a:latin typeface="Cambria Math" panose="02040503050406030204" pitchFamily="18" charset="0"/>
-                                </a:rPr>
-                              </m:ctrlPr>
-                            </m:sSubPr>
-                            <m:e>
-                              <m:r>
-                                <a:rPr lang="x-IV_mathan" sz="1800">
-                                  <a:effectLst/>
-                                  <a:latin typeface="Cambria Math" panose="02040503050406030204" pitchFamily="18" charset="0"/>
-                                </a:rPr>
-                                <m:t>𝑑</m:t>
-                              </m:r>
-                            </m:e>
-                            <m:sub>
-                              <m:r>
-                                <a:rPr lang="x-IV_mathan" sz="1800">
-                                  <a:effectLst/>
-                                  <a:latin typeface="Cambria Math" panose="02040503050406030204" pitchFamily="18" charset="0"/>
-                                </a:rPr>
-                                <m:t>𝑖</m:t>
-                              </m:r>
-                            </m:sub>
-                          </m:sSub>
-                        </m:e>
-                      </m:nary>
-                    </m:oMath>
-                  </m:oMathPara>
-                </a14:m>
-                <a:endParaRPr lang="en-US" dirty="0"/>
-              </a:p>
-              <a:p>
-                <a:r>
-                  <a:rPr lang="en-US" sz="1800" dirty="0">
-                    <a:effectLst/>
-                    <a:latin typeface="Calibri" panose="020F0502020204030204" pitchFamily="34" charset="0"/>
-                  </a:rPr>
-                  <a:t>Just sum over the Node Embeddings that are in the graph/subgraph  (similar of what we have in language</a:t>
-                </a:r>
-                <a:endParaRPr lang="en-US" dirty="0"/>
-              </a:p>
-            </p:txBody>
-          </p:sp>
-        </mc:Choice>
-        <mc:Fallback>
-          <p:sp>
-            <p:nvSpPr>
-              <p:cNvPr id="3" name="Content Placeholder 2">
-                <a:extLst>
-                  <a:ext uri="{FF2B5EF4-FFF2-40B4-BE49-F238E27FC236}">
-                    <a16:creationId xmlns:a16="http://schemas.microsoft.com/office/drawing/2014/main" id="{5FB91C98-330A-446E-8A14-1BB70B4F3F0B}"/>
-                  </a:ext>
-                </a:extLst>
-              </p:cNvPr>
-              <p:cNvSpPr>
-                <a:spLocks noGrp="1" noRot="1" noChangeAspect="1" noMove="1" noResize="1" noEditPoints="1" noAdjustHandles="1" noChangeArrowheads="1" noChangeShapeType="1" noTextEdit="1"/>
-              </p:cNvSpPr>
-              <p:nvPr>
-                <p:ph idx="1"/>
-              </p:nvPr>
-            </p:nvSpPr>
-            <p:spPr>
-              <a:xfrm>
-                <a:off x="478369" y="962244"/>
-                <a:ext cx="11473384" cy="1613070"/>
-              </a:xfrm>
-              <a:blipFill>
-                <a:blip r:embed="rId2"/>
-                <a:stretch>
-                  <a:fillRect l="-1275" t="-26136" b="-65152"/>
-                </a:stretch>
-              </a:blipFill>
-            </p:spPr>
-            <p:txBody>
-              <a:bodyPr/>
-              <a:lstStyle/>
-              <a:p>
-                <a:r>
-                  <a:rPr lang="en-US">
-                    <a:noFill/>
-                  </a:rPr>
-                  <a:t> </a:t>
-                </a:r>
-              </a:p>
-            </p:txBody>
-          </p:sp>
-        </mc:Fallback>
-      </mc:AlternateContent>
-      <p:sp>
-        <p:nvSpPr>
-          <p:cNvPr id="5" name="Content Placeholder 2">
-            <a:extLst>
-              <a:ext uri="{FF2B5EF4-FFF2-40B4-BE49-F238E27FC236}">
-                <a16:creationId xmlns:a16="http://schemas.microsoft.com/office/drawing/2014/main" id="{4ED49ECD-ADDA-4270-8F6E-61DEECE0C4EE}"/>
-              </a:ext>
-            </a:extLst>
-          </p:cNvPr>
-          <p:cNvSpPr txBox="1">
-            <a:spLocks/>
-          </p:cNvSpPr>
-          <p:nvPr/>
-        </p:nvSpPr>
-        <p:spPr bwMode="gray">
-          <a:xfrm>
-            <a:off x="478369" y="3359906"/>
-            <a:ext cx="11473384" cy="1112933"/>
-          </a:xfrm>
-          <a:prstGeom prst="rect">
-            <a:avLst/>
-          </a:prstGeom>
-        </p:spPr>
-        <p:txBody>
-          <a:bodyPr vert="horz" lIns="0" tIns="0" rIns="0" bIns="0" rtlCol="0" anchor="t" anchorCtr="0">
-            <a:spAutoFit/>
-          </a:bodyPr>
-          <a:lstStyle>
-            <a:lvl1pPr marL="0" indent="0" algn="l" defTabSz="1219170" rtl="0" eaLnBrk="1" latinLnBrk="0" hangingPunct="1">
-              <a:lnSpc>
-                <a:spcPts val="2667"/>
-              </a:lnSpc>
-              <a:spcBef>
-                <a:spcPts val="400"/>
-              </a:spcBef>
-              <a:spcAft>
-                <a:spcPts val="400"/>
-              </a:spcAft>
-              <a:buFont typeface="Arial" panose="020B0604020202020204" pitchFamily="34" charset="0"/>
-              <a:buNone/>
-              <a:defRPr sz="1867" kern="1200">
-                <a:solidFill>
-                  <a:schemeClr val="tx1"/>
-                </a:solidFill>
-                <a:latin typeface="+mn-lt"/>
-                <a:ea typeface="+mn-ea"/>
-                <a:cs typeface="+mn-cs"/>
-              </a:defRPr>
-            </a:lvl1pPr>
-            <a:lvl2pPr marL="241294" indent="-241294" algn="l" defTabSz="1219170" rtl="0" eaLnBrk="1" latinLnBrk="0" hangingPunct="1">
-              <a:lnSpc>
-                <a:spcPts val="2667"/>
-              </a:lnSpc>
-              <a:spcBef>
-                <a:spcPts val="400"/>
-              </a:spcBef>
-              <a:spcAft>
-                <a:spcPts val="400"/>
-              </a:spcAft>
-              <a:buClr>
-                <a:schemeClr val="accent1"/>
-              </a:buClr>
-              <a:buSzPct val="100000"/>
-              <a:buFont typeface="Arial" panose="020B0604020202020204" pitchFamily="34" charset="0"/>
-              <a:buChar char="■"/>
-              <a:defRPr sz="1867" kern="1200">
-                <a:solidFill>
-                  <a:schemeClr val="tx1"/>
-                </a:solidFill>
-                <a:latin typeface="+mn-lt"/>
-                <a:ea typeface="+mn-ea"/>
-                <a:cs typeface="+mn-cs"/>
-              </a:defRPr>
-            </a:lvl2pPr>
-            <a:lvl3pPr marL="479988" indent="-239994" algn="l" defTabSz="1219170" rtl="0" eaLnBrk="1" latinLnBrk="0" hangingPunct="1">
-              <a:lnSpc>
-                <a:spcPts val="2667"/>
-              </a:lnSpc>
-              <a:spcBef>
-                <a:spcPts val="400"/>
-              </a:spcBef>
-              <a:spcAft>
-                <a:spcPts val="400"/>
-              </a:spcAft>
-              <a:buClr>
-                <a:schemeClr val="accent1"/>
-              </a:buClr>
-              <a:buSzPct val="100000"/>
-              <a:buFont typeface="Arial" panose="020B0604020202020204" pitchFamily="34" charset="0"/>
-              <a:buChar char="□"/>
-              <a:defRPr sz="1867" kern="1200">
-                <a:solidFill>
-                  <a:schemeClr val="tx1"/>
-                </a:solidFill>
-                <a:latin typeface="+mn-lt"/>
-                <a:ea typeface="+mn-ea"/>
-                <a:cs typeface="+mn-cs"/>
-              </a:defRPr>
-            </a:lvl3pPr>
-            <a:lvl4pPr marL="717533" indent="-239994" algn="l" defTabSz="1219170" rtl="0" eaLnBrk="1" latinLnBrk="0" hangingPunct="1">
-              <a:lnSpc>
-                <a:spcPts val="2667"/>
-              </a:lnSpc>
-              <a:spcBef>
-                <a:spcPts val="400"/>
-              </a:spcBef>
-              <a:spcAft>
-                <a:spcPts val="400"/>
-              </a:spcAft>
-              <a:buClr>
-                <a:schemeClr val="accent1"/>
-              </a:buClr>
-              <a:buSzPct val="100000"/>
-              <a:buFont typeface="Arial" panose="020B0604020202020204" pitchFamily="34" charset="0"/>
-              <a:buChar char="–"/>
-              <a:defRPr sz="1867" kern="1200">
-                <a:solidFill>
-                  <a:schemeClr val="tx1"/>
-                </a:solidFill>
-                <a:latin typeface="+mn-lt"/>
-                <a:ea typeface="+mn-ea"/>
-                <a:cs typeface="+mn-cs"/>
-              </a:defRPr>
-            </a:lvl4pPr>
-            <a:lvl5pPr marL="359991" indent="-359991" algn="l" defTabSz="1219170" rtl="0" eaLnBrk="1" latinLnBrk="0" hangingPunct="1">
-              <a:lnSpc>
-                <a:spcPts val="2667"/>
-              </a:lnSpc>
-              <a:spcBef>
-                <a:spcPts val="400"/>
-              </a:spcBef>
-              <a:spcAft>
-                <a:spcPts val="400"/>
-              </a:spcAft>
-              <a:buClr>
-                <a:schemeClr val="accent1"/>
-              </a:buClr>
-              <a:buSzPct val="100000"/>
-              <a:buFont typeface="+mj-lt"/>
-              <a:buAutoNum type="arabicPeriod"/>
-              <a:defRPr sz="1867" kern="1200">
-                <a:solidFill>
-                  <a:schemeClr val="tx1"/>
-                </a:solidFill>
-                <a:latin typeface="+mn-lt"/>
-                <a:ea typeface="+mn-ea"/>
-                <a:cs typeface="+mn-cs"/>
-              </a:defRPr>
-            </a:lvl5pPr>
-            <a:lvl6pPr marL="719982" indent="-359991" algn="l" defTabSz="1219170" rtl="0" eaLnBrk="1" latinLnBrk="0" hangingPunct="1">
-              <a:lnSpc>
-                <a:spcPts val="2667"/>
-              </a:lnSpc>
-              <a:spcBef>
-                <a:spcPts val="400"/>
-              </a:spcBef>
-              <a:spcAft>
-                <a:spcPts val="400"/>
-              </a:spcAft>
-              <a:buClr>
-                <a:schemeClr val="accent1"/>
-              </a:buClr>
-              <a:buSzPct val="100000"/>
-              <a:buFont typeface="+mj-lt"/>
-              <a:buAutoNum type="alphaLcParenR"/>
-              <a:defRPr sz="1867" kern="1200">
-                <a:solidFill>
-                  <a:schemeClr val="tx1"/>
-                </a:solidFill>
-                <a:latin typeface="+mn-lt"/>
-                <a:ea typeface="+mn-ea"/>
-                <a:cs typeface="+mn-cs"/>
-              </a:defRPr>
-            </a:lvl6pPr>
-            <a:lvl7pPr marL="0" indent="0" algn="l" defTabSz="1219170" rtl="0" eaLnBrk="1" latinLnBrk="0" hangingPunct="1">
-              <a:lnSpc>
-                <a:spcPts val="2800"/>
-              </a:lnSpc>
-              <a:spcBef>
-                <a:spcPts val="533"/>
-              </a:spcBef>
-              <a:spcAft>
-                <a:spcPts val="533"/>
-              </a:spcAft>
-              <a:buClr>
-                <a:schemeClr val="accent1"/>
-              </a:buClr>
-              <a:buSzPct val="90000"/>
-              <a:buFont typeface="Arial" panose="020B0604020202020204" pitchFamily="34" charset="0"/>
-              <a:buNone/>
-              <a:defRPr sz="2133" kern="1200" cap="all" baseline="0">
-                <a:solidFill>
-                  <a:schemeClr val="accent1"/>
-                </a:solidFill>
-                <a:latin typeface="+mn-lt"/>
-                <a:ea typeface="+mn-ea"/>
-                <a:cs typeface="+mn-cs"/>
-              </a:defRPr>
-            </a:lvl7pPr>
-            <a:lvl8pPr marL="0" indent="0" algn="l" defTabSz="1219170" rtl="0" eaLnBrk="1" latinLnBrk="0" hangingPunct="1">
-              <a:lnSpc>
-                <a:spcPts val="2800"/>
-              </a:lnSpc>
-              <a:spcBef>
-                <a:spcPts val="533"/>
-              </a:spcBef>
-              <a:spcAft>
-                <a:spcPts val="533"/>
-              </a:spcAft>
-              <a:buFont typeface="Arial" panose="020B0604020202020204" pitchFamily="34" charset="0"/>
-              <a:buNone/>
-              <a:defRPr sz="2133" b="0" kern="1200" cap="all" baseline="0">
-                <a:solidFill>
-                  <a:schemeClr val="accent1"/>
-                </a:solidFill>
-                <a:latin typeface="+mn-lt"/>
-                <a:ea typeface="+mn-ea"/>
-                <a:cs typeface="+mn-cs"/>
-              </a:defRPr>
-            </a:lvl8pPr>
-            <a:lvl9pPr marL="0" indent="0" algn="l" defTabSz="1219170" rtl="0" eaLnBrk="1" latinLnBrk="0" hangingPunct="1">
-              <a:lnSpc>
-                <a:spcPts val="2800"/>
-              </a:lnSpc>
-              <a:spcBef>
-                <a:spcPts val="533"/>
-              </a:spcBef>
-              <a:spcAft>
-                <a:spcPts val="533"/>
-              </a:spcAft>
-              <a:buFont typeface="Arial" panose="020B0604020202020204" pitchFamily="34" charset="0"/>
-              <a:buNone/>
-              <a:defRPr sz="2133" b="0" kern="1200" cap="all" baseline="0">
-                <a:solidFill>
-                  <a:schemeClr val="accent1"/>
-                </a:solidFill>
-                <a:latin typeface="+mn-lt"/>
-                <a:ea typeface="+mn-ea"/>
-                <a:cs typeface="+mn-cs"/>
-              </a:defRPr>
-            </a:lvl9pPr>
-          </a:lstStyle>
-          <a:p>
-            <a:r>
-              <a:rPr lang="en-US" b="1" dirty="0"/>
-              <a:t>Virtual node</a:t>
-            </a:r>
-            <a:r>
-              <a:rPr lang="en-US" dirty="0"/>
-              <a:t>: </a:t>
-            </a:r>
-          </a:p>
-          <a:p>
-            <a:r>
-              <a:rPr lang="en-US" sz="1800" dirty="0">
-                <a:latin typeface="Calibri" panose="020F0502020204030204" pitchFamily="34" charset="0"/>
-              </a:rPr>
-              <a:t>Create a </a:t>
-            </a:r>
-            <a:r>
-              <a:rPr lang="en-US" sz="1800" dirty="0">
-                <a:effectLst/>
-                <a:latin typeface="Calibri" panose="020F0502020204030204" pitchFamily="34" charset="0"/>
-              </a:rPr>
-              <a:t>virtual that connects all nodes in a subgraph. Runs node embeddings for all nodes in the subgraph and the virtual node. The embedding of the virtual node will be the embedding of the subgraph.</a:t>
-            </a:r>
-            <a:endParaRPr lang="en-US" dirty="0"/>
-          </a:p>
-        </p:txBody>
-      </p:sp>
-      <p:grpSp>
-        <p:nvGrpSpPr>
-          <p:cNvPr id="6" name="Group 5">
-            <a:extLst>
-              <a:ext uri="{FF2B5EF4-FFF2-40B4-BE49-F238E27FC236}">
-                <a16:creationId xmlns:a16="http://schemas.microsoft.com/office/drawing/2014/main" id="{A7E3C851-3C87-4CF9-A21E-EAAD8E48F405}"/>
-              </a:ext>
-            </a:extLst>
-          </p:cNvPr>
-          <p:cNvGrpSpPr/>
-          <p:nvPr/>
-        </p:nvGrpSpPr>
-        <p:grpSpPr>
-          <a:xfrm>
-            <a:off x="5197254" y="4964396"/>
-            <a:ext cx="1557205" cy="1481112"/>
-            <a:chOff x="9938188" y="4606083"/>
-            <a:chExt cx="2128477" cy="2018946"/>
-          </a:xfrm>
-        </p:grpSpPr>
-        <p:sp>
-          <p:nvSpPr>
-            <p:cNvPr id="7" name="Oval 6">
-              <a:extLst>
-                <a:ext uri="{FF2B5EF4-FFF2-40B4-BE49-F238E27FC236}">
-                  <a16:creationId xmlns:a16="http://schemas.microsoft.com/office/drawing/2014/main" id="{A42F86D2-B1C2-44E2-A14C-A6CBF581B10D}"/>
-                </a:ext>
-              </a:extLst>
-            </p:cNvPr>
-            <p:cNvSpPr/>
-            <p:nvPr/>
-          </p:nvSpPr>
-          <p:spPr bwMode="gray">
-            <a:xfrm>
-              <a:off x="9938188" y="5000553"/>
-              <a:ext cx="414216" cy="414216"/>
-            </a:xfrm>
-            <a:prstGeom prst="ellipse">
-              <a:avLst/>
-            </a:prstGeom>
-            <a:solidFill>
-              <a:srgbClr val="92D050"/>
-            </a:solidFill>
-            <a:ln/>
-          </p:spPr>
-          <p:style>
-            <a:lnRef idx="2">
-              <a:schemeClr val="dk1"/>
-            </a:lnRef>
-            <a:fillRef idx="1">
-              <a:schemeClr val="lt1"/>
-            </a:fillRef>
-            <a:effectRef idx="0">
-              <a:schemeClr val="dk1"/>
-            </a:effectRef>
-            <a:fontRef idx="minor">
-              <a:schemeClr val="dk1"/>
-            </a:fontRef>
-          </p:style>
-          <p:txBody>
-            <a:bodyPr rot="0" spcFirstLastPara="0" vertOverflow="overflow" horzOverflow="overflow" vert="horz" wrap="square" lIns="108000" tIns="72000" rIns="108000" bIns="72000" numCol="1" spcCol="0" rtlCol="0" fromWordArt="0" anchor="ctr" anchorCtr="0" forceAA="0" compatLnSpc="1">
-              <a:prstTxWarp prst="textNoShape">
-                <a:avLst/>
-              </a:prstTxWarp>
-              <a:noAutofit/>
-            </a:bodyPr>
-            <a:lstStyle/>
-            <a:p>
-              <a:pPr algn="ctr">
-                <a:spcBef>
-                  <a:spcPts val="300"/>
-                </a:spcBef>
-                <a:spcAft>
-                  <a:spcPts val="300"/>
-                </a:spcAft>
-              </a:pPr>
-              <a:r>
-                <a:rPr lang="en-US" sz="1200" b="1" dirty="0">
-                  <a:solidFill>
-                    <a:schemeClr val="tx1"/>
-                  </a:solidFill>
-                </a:rPr>
-                <a:t>A</a:t>
-              </a:r>
-            </a:p>
-          </p:txBody>
-        </p:sp>
-        <p:sp>
-          <p:nvSpPr>
-            <p:cNvPr id="8" name="Oval 7">
-              <a:extLst>
-                <a:ext uri="{FF2B5EF4-FFF2-40B4-BE49-F238E27FC236}">
-                  <a16:creationId xmlns:a16="http://schemas.microsoft.com/office/drawing/2014/main" id="{CD3A7638-2158-4F28-8BA4-07391C4FB427}"/>
-                </a:ext>
-              </a:extLst>
-            </p:cNvPr>
-            <p:cNvSpPr/>
-            <p:nvPr/>
-          </p:nvSpPr>
-          <p:spPr bwMode="gray">
-            <a:xfrm>
-              <a:off x="9938188" y="5928236"/>
-              <a:ext cx="414216" cy="414216"/>
-            </a:xfrm>
-            <a:prstGeom prst="ellipse">
-              <a:avLst/>
-            </a:prstGeom>
-            <a:solidFill>
-              <a:srgbClr val="92D050"/>
-            </a:solidFill>
-            <a:ln/>
-          </p:spPr>
-          <p:style>
-            <a:lnRef idx="2">
-              <a:schemeClr val="dk1"/>
-            </a:lnRef>
-            <a:fillRef idx="1">
-              <a:schemeClr val="lt1"/>
-            </a:fillRef>
-            <a:effectRef idx="0">
-              <a:schemeClr val="dk1"/>
-            </a:effectRef>
-            <a:fontRef idx="minor">
-              <a:schemeClr val="dk1"/>
-            </a:fontRef>
-          </p:style>
-          <p:txBody>
-            <a:bodyPr rot="0" spcFirstLastPara="0" vertOverflow="overflow" horzOverflow="overflow" vert="horz" wrap="square" lIns="108000" tIns="72000" rIns="108000" bIns="72000" numCol="1" spcCol="0" rtlCol="0" fromWordArt="0" anchor="ctr" anchorCtr="0" forceAA="0" compatLnSpc="1">
-              <a:prstTxWarp prst="textNoShape">
-                <a:avLst/>
-              </a:prstTxWarp>
-              <a:noAutofit/>
-            </a:bodyPr>
-            <a:lstStyle/>
-            <a:p>
-              <a:pPr algn="ctr">
-                <a:spcBef>
-                  <a:spcPts val="300"/>
-                </a:spcBef>
-                <a:spcAft>
-                  <a:spcPts val="300"/>
-                </a:spcAft>
-              </a:pPr>
-              <a:r>
-                <a:rPr lang="en-US" sz="1200" b="1" dirty="0">
-                  <a:solidFill>
-                    <a:schemeClr val="tx1"/>
-                  </a:solidFill>
-                </a:rPr>
-                <a:t>C</a:t>
-              </a:r>
-            </a:p>
-          </p:txBody>
-        </p:sp>
-        <p:sp>
-          <p:nvSpPr>
-            <p:cNvPr id="9" name="Oval 8">
-              <a:extLst>
-                <a:ext uri="{FF2B5EF4-FFF2-40B4-BE49-F238E27FC236}">
-                  <a16:creationId xmlns:a16="http://schemas.microsoft.com/office/drawing/2014/main" id="{97D6B320-D05D-4394-B83D-4CF725E7AF6B}"/>
-                </a:ext>
-              </a:extLst>
-            </p:cNvPr>
-            <p:cNvSpPr/>
-            <p:nvPr/>
-          </p:nvSpPr>
-          <p:spPr bwMode="gray">
-            <a:xfrm>
-              <a:off x="10972096" y="5387317"/>
-              <a:ext cx="414216" cy="414216"/>
-            </a:xfrm>
-            <a:prstGeom prst="ellipse">
-              <a:avLst/>
-            </a:prstGeom>
-            <a:solidFill>
-              <a:schemeClr val="accent4">
-                <a:lumMod val="20000"/>
-                <a:lumOff val="80000"/>
-              </a:schemeClr>
-            </a:solidFill>
-            <a:ln/>
-          </p:spPr>
-          <p:style>
-            <a:lnRef idx="2">
-              <a:schemeClr val="dk1"/>
-            </a:lnRef>
-            <a:fillRef idx="1">
-              <a:schemeClr val="lt1"/>
-            </a:fillRef>
-            <a:effectRef idx="0">
-              <a:schemeClr val="dk1"/>
-            </a:effectRef>
-            <a:fontRef idx="minor">
-              <a:schemeClr val="dk1"/>
-            </a:fontRef>
-          </p:style>
-          <p:txBody>
-            <a:bodyPr rot="0" spcFirstLastPara="0" vertOverflow="overflow" horzOverflow="overflow" vert="horz" wrap="square" lIns="108000" tIns="72000" rIns="108000" bIns="72000" numCol="1" spcCol="0" rtlCol="0" fromWordArt="0" anchor="ctr" anchorCtr="0" forceAA="0" compatLnSpc="1">
-              <a:prstTxWarp prst="textNoShape">
-                <a:avLst/>
-              </a:prstTxWarp>
-              <a:noAutofit/>
-            </a:bodyPr>
-            <a:lstStyle/>
-            <a:p>
-              <a:pPr algn="ctr">
-                <a:spcBef>
-                  <a:spcPts val="300"/>
-                </a:spcBef>
-                <a:spcAft>
-                  <a:spcPts val="300"/>
-                </a:spcAft>
-              </a:pPr>
-              <a:r>
-                <a:rPr lang="en-US" sz="1200" b="1" dirty="0">
-                  <a:solidFill>
-                    <a:schemeClr val="tx1"/>
-                  </a:solidFill>
-                </a:rPr>
-                <a:t>B</a:t>
-              </a:r>
-            </a:p>
-          </p:txBody>
-        </p:sp>
-        <p:cxnSp>
-          <p:nvCxnSpPr>
-            <p:cNvPr id="10" name="Straight Arrow Connector 9">
-              <a:extLst>
-                <a:ext uri="{FF2B5EF4-FFF2-40B4-BE49-F238E27FC236}">
-                  <a16:creationId xmlns:a16="http://schemas.microsoft.com/office/drawing/2014/main" id="{C40B44DC-32C8-40E2-9795-ACA275AF6AE8}"/>
-                </a:ext>
-              </a:extLst>
-            </p:cNvPr>
-            <p:cNvCxnSpPr>
-              <a:cxnSpLocks/>
-              <a:stCxn id="7" idx="4"/>
-              <a:endCxn id="8" idx="0"/>
-            </p:cNvCxnSpPr>
-            <p:nvPr/>
-          </p:nvCxnSpPr>
-          <p:spPr bwMode="gray">
-            <a:xfrm>
-              <a:off x="10145296" y="5414769"/>
-              <a:ext cx="0" cy="513467"/>
-            </a:xfrm>
-            <a:prstGeom prst="straightConnector1">
-              <a:avLst/>
-            </a:prstGeom>
-            <a:ln w="12700">
-              <a:solidFill>
-                <a:schemeClr val="tx1"/>
-              </a:solidFill>
-              <a:headEnd type="none" w="med" len="med"/>
-              <a:tailEnd type="none" w="med" len="med"/>
-            </a:ln>
-          </p:spPr>
-          <p:style>
-            <a:lnRef idx="1">
-              <a:schemeClr val="dk1"/>
-            </a:lnRef>
-            <a:fillRef idx="0">
-              <a:schemeClr val="dk1"/>
-            </a:fillRef>
-            <a:effectRef idx="0">
-              <a:schemeClr val="dk1"/>
-            </a:effectRef>
-            <a:fontRef idx="minor">
-              <a:schemeClr val="tx1"/>
-            </a:fontRef>
-          </p:style>
-        </p:cxnSp>
-        <p:sp>
-          <p:nvSpPr>
-            <p:cNvPr id="11" name="Oval 10">
-              <a:extLst>
-                <a:ext uri="{FF2B5EF4-FFF2-40B4-BE49-F238E27FC236}">
-                  <a16:creationId xmlns:a16="http://schemas.microsoft.com/office/drawing/2014/main" id="{F7861BBB-9132-4421-8973-B4FDA29AB66E}"/>
-                </a:ext>
-              </a:extLst>
-            </p:cNvPr>
-            <p:cNvSpPr/>
-            <p:nvPr/>
-          </p:nvSpPr>
-          <p:spPr bwMode="gray">
-            <a:xfrm>
-              <a:off x="11214165" y="6210813"/>
-              <a:ext cx="414216" cy="414216"/>
-            </a:xfrm>
-            <a:prstGeom prst="ellipse">
-              <a:avLst/>
-            </a:prstGeom>
-            <a:solidFill>
-              <a:srgbClr val="92D050"/>
-            </a:solidFill>
-            <a:ln/>
-          </p:spPr>
-          <p:style>
-            <a:lnRef idx="2">
-              <a:schemeClr val="dk1"/>
-            </a:lnRef>
-            <a:fillRef idx="1">
-              <a:schemeClr val="lt1"/>
-            </a:fillRef>
-            <a:effectRef idx="0">
-              <a:schemeClr val="dk1"/>
-            </a:effectRef>
-            <a:fontRef idx="minor">
-              <a:schemeClr val="dk1"/>
-            </a:fontRef>
-          </p:style>
-          <p:txBody>
-            <a:bodyPr rot="0" spcFirstLastPara="0" vertOverflow="overflow" horzOverflow="overflow" vert="horz" wrap="square" lIns="108000" tIns="72000" rIns="108000" bIns="72000" numCol="1" spcCol="0" rtlCol="0" fromWordArt="0" anchor="ctr" anchorCtr="0" forceAA="0" compatLnSpc="1">
-              <a:prstTxWarp prst="textNoShape">
-                <a:avLst/>
-              </a:prstTxWarp>
-              <a:noAutofit/>
-            </a:bodyPr>
-            <a:lstStyle/>
-            <a:p>
-              <a:pPr algn="ctr">
-                <a:spcBef>
-                  <a:spcPts val="300"/>
-                </a:spcBef>
-                <a:spcAft>
-                  <a:spcPts val="300"/>
-                </a:spcAft>
-              </a:pPr>
-              <a:r>
-                <a:rPr lang="en-US" sz="1200" b="1" dirty="0">
-                  <a:solidFill>
-                    <a:schemeClr val="tx1"/>
-                  </a:solidFill>
-                </a:rPr>
-                <a:t>D</a:t>
-              </a:r>
-            </a:p>
-          </p:txBody>
-        </p:sp>
-        <p:sp>
-          <p:nvSpPr>
-            <p:cNvPr id="12" name="Oval 11">
-              <a:extLst>
-                <a:ext uri="{FF2B5EF4-FFF2-40B4-BE49-F238E27FC236}">
-                  <a16:creationId xmlns:a16="http://schemas.microsoft.com/office/drawing/2014/main" id="{28259FFA-DD1C-475B-9D50-F84901A3A30D}"/>
-                </a:ext>
-              </a:extLst>
-            </p:cNvPr>
-            <p:cNvSpPr/>
-            <p:nvPr/>
-          </p:nvSpPr>
-          <p:spPr bwMode="gray">
-            <a:xfrm>
-              <a:off x="11053577" y="4606083"/>
-              <a:ext cx="414216" cy="414216"/>
-            </a:xfrm>
-            <a:prstGeom prst="ellipse">
-              <a:avLst/>
-            </a:prstGeom>
-            <a:solidFill>
-              <a:schemeClr val="accent4">
-                <a:lumMod val="20000"/>
-                <a:lumOff val="80000"/>
-              </a:schemeClr>
-            </a:solidFill>
-            <a:ln/>
-          </p:spPr>
-          <p:style>
-            <a:lnRef idx="2">
-              <a:schemeClr val="dk1"/>
-            </a:lnRef>
-            <a:fillRef idx="1">
-              <a:schemeClr val="lt1"/>
-            </a:fillRef>
-            <a:effectRef idx="0">
-              <a:schemeClr val="dk1"/>
-            </a:effectRef>
-            <a:fontRef idx="minor">
-              <a:schemeClr val="dk1"/>
-            </a:fontRef>
-          </p:style>
-          <p:txBody>
-            <a:bodyPr rot="0" spcFirstLastPara="0" vertOverflow="overflow" horzOverflow="overflow" vert="horz" wrap="square" lIns="108000" tIns="72000" rIns="108000" bIns="72000" numCol="1" spcCol="0" rtlCol="0" fromWordArt="0" anchor="ctr" anchorCtr="0" forceAA="0" compatLnSpc="1">
-              <a:prstTxWarp prst="textNoShape">
-                <a:avLst/>
-              </a:prstTxWarp>
-              <a:noAutofit/>
-            </a:bodyPr>
-            <a:lstStyle/>
-            <a:p>
-              <a:pPr algn="ctr">
-                <a:spcBef>
-                  <a:spcPts val="300"/>
-                </a:spcBef>
-                <a:spcAft>
-                  <a:spcPts val="300"/>
-                </a:spcAft>
-              </a:pPr>
-              <a:r>
-                <a:rPr lang="en-US" sz="1200" b="1" dirty="0">
-                  <a:solidFill>
-                    <a:schemeClr val="tx1"/>
-                  </a:solidFill>
-                </a:rPr>
-                <a:t>E</a:t>
-              </a:r>
-            </a:p>
-          </p:txBody>
-        </p:sp>
-        <p:sp>
-          <p:nvSpPr>
-            <p:cNvPr id="13" name="Oval 12">
-              <a:extLst>
-                <a:ext uri="{FF2B5EF4-FFF2-40B4-BE49-F238E27FC236}">
-                  <a16:creationId xmlns:a16="http://schemas.microsoft.com/office/drawing/2014/main" id="{0F2ED4CB-272E-441B-86C7-0568AF00804B}"/>
-                </a:ext>
-              </a:extLst>
-            </p:cNvPr>
-            <p:cNvSpPr/>
-            <p:nvPr/>
-          </p:nvSpPr>
-          <p:spPr bwMode="gray">
-            <a:xfrm>
-              <a:off x="11652449" y="5207661"/>
-              <a:ext cx="414216" cy="414216"/>
-            </a:xfrm>
-            <a:prstGeom prst="ellipse">
-              <a:avLst/>
-            </a:prstGeom>
-            <a:solidFill>
-              <a:schemeClr val="accent4">
-                <a:lumMod val="20000"/>
-                <a:lumOff val="80000"/>
-              </a:schemeClr>
-            </a:solidFill>
-            <a:ln/>
-          </p:spPr>
-          <p:style>
-            <a:lnRef idx="2">
-              <a:schemeClr val="dk1"/>
-            </a:lnRef>
-            <a:fillRef idx="1">
-              <a:schemeClr val="lt1"/>
-            </a:fillRef>
-            <a:effectRef idx="0">
-              <a:schemeClr val="dk1"/>
-            </a:effectRef>
-            <a:fontRef idx="minor">
-              <a:schemeClr val="dk1"/>
-            </a:fontRef>
-          </p:style>
-          <p:txBody>
-            <a:bodyPr rot="0" spcFirstLastPara="0" vertOverflow="overflow" horzOverflow="overflow" vert="horz" wrap="square" lIns="108000" tIns="72000" rIns="108000" bIns="72000" numCol="1" spcCol="0" rtlCol="0" fromWordArt="0" anchor="ctr" anchorCtr="0" forceAA="0" compatLnSpc="1">
-              <a:prstTxWarp prst="textNoShape">
-                <a:avLst/>
-              </a:prstTxWarp>
-              <a:noAutofit/>
-            </a:bodyPr>
-            <a:lstStyle/>
-            <a:p>
-              <a:pPr algn="ctr">
-                <a:spcBef>
-                  <a:spcPts val="300"/>
-                </a:spcBef>
-                <a:spcAft>
-                  <a:spcPts val="300"/>
-                </a:spcAft>
-              </a:pPr>
-              <a:r>
-                <a:rPr lang="en-US" sz="1200" b="1" dirty="0">
-                  <a:solidFill>
-                    <a:schemeClr val="tx1"/>
-                  </a:solidFill>
-                </a:rPr>
-                <a:t>F</a:t>
-              </a:r>
-            </a:p>
-          </p:txBody>
-        </p:sp>
-        <p:cxnSp>
-          <p:nvCxnSpPr>
-            <p:cNvPr id="14" name="Straight Arrow Connector 13">
-              <a:extLst>
-                <a:ext uri="{FF2B5EF4-FFF2-40B4-BE49-F238E27FC236}">
-                  <a16:creationId xmlns:a16="http://schemas.microsoft.com/office/drawing/2014/main" id="{646294AF-8A66-488F-93EB-9277C71A95D3}"/>
-                </a:ext>
-              </a:extLst>
-            </p:cNvPr>
-            <p:cNvCxnSpPr>
-              <a:cxnSpLocks/>
-              <a:stCxn id="9" idx="0"/>
-              <a:endCxn id="12" idx="4"/>
-            </p:cNvCxnSpPr>
-            <p:nvPr/>
-          </p:nvCxnSpPr>
-          <p:spPr bwMode="gray">
-            <a:xfrm flipV="1">
-              <a:off x="11179204" y="5020299"/>
-              <a:ext cx="81481" cy="367018"/>
-            </a:xfrm>
-            <a:prstGeom prst="straightConnector1">
-              <a:avLst/>
-            </a:prstGeom>
-            <a:ln w="12700">
-              <a:solidFill>
-                <a:schemeClr val="tx1"/>
-              </a:solidFill>
-              <a:headEnd type="none" w="med" len="med"/>
-              <a:tailEnd type="none" w="med" len="med"/>
-            </a:ln>
-          </p:spPr>
-          <p:style>
-            <a:lnRef idx="1">
-              <a:schemeClr val="dk1"/>
-            </a:lnRef>
-            <a:fillRef idx="0">
-              <a:schemeClr val="dk1"/>
-            </a:fillRef>
-            <a:effectRef idx="0">
-              <a:schemeClr val="dk1"/>
-            </a:effectRef>
-            <a:fontRef idx="minor">
-              <a:schemeClr val="tx1"/>
-            </a:fontRef>
-          </p:style>
-        </p:cxnSp>
-        <p:cxnSp>
-          <p:nvCxnSpPr>
-            <p:cNvPr id="15" name="Straight Arrow Connector 14">
-              <a:extLst>
-                <a:ext uri="{FF2B5EF4-FFF2-40B4-BE49-F238E27FC236}">
-                  <a16:creationId xmlns:a16="http://schemas.microsoft.com/office/drawing/2014/main" id="{790B6040-7ADA-48E0-9962-7B536470FC27}"/>
-                </a:ext>
-              </a:extLst>
-            </p:cNvPr>
-            <p:cNvCxnSpPr>
-              <a:cxnSpLocks/>
-              <a:stCxn id="9" idx="7"/>
-              <a:endCxn id="13" idx="2"/>
-            </p:cNvCxnSpPr>
-            <p:nvPr/>
-          </p:nvCxnSpPr>
-          <p:spPr bwMode="gray">
-            <a:xfrm flipV="1">
-              <a:off x="11325651" y="5414769"/>
-              <a:ext cx="326798" cy="33209"/>
-            </a:xfrm>
-            <a:prstGeom prst="straightConnector1">
-              <a:avLst/>
-            </a:prstGeom>
-            <a:ln w="12700">
-              <a:solidFill>
-                <a:schemeClr val="tx1"/>
-              </a:solidFill>
-              <a:headEnd type="none" w="med" len="med"/>
-              <a:tailEnd type="none" w="med" len="med"/>
-            </a:ln>
-          </p:spPr>
-          <p:style>
-            <a:lnRef idx="1">
-              <a:schemeClr val="dk1"/>
-            </a:lnRef>
-            <a:fillRef idx="0">
-              <a:schemeClr val="dk1"/>
-            </a:fillRef>
-            <a:effectRef idx="0">
-              <a:schemeClr val="dk1"/>
-            </a:effectRef>
-            <a:fontRef idx="minor">
-              <a:schemeClr val="tx1"/>
-            </a:fontRef>
-          </p:style>
-        </p:cxnSp>
-        <p:cxnSp>
-          <p:nvCxnSpPr>
-            <p:cNvPr id="16" name="Straight Arrow Connector 15">
-              <a:extLst>
-                <a:ext uri="{FF2B5EF4-FFF2-40B4-BE49-F238E27FC236}">
-                  <a16:creationId xmlns:a16="http://schemas.microsoft.com/office/drawing/2014/main" id="{60D1952B-DBBF-4933-B6F3-9362389126EC}"/>
-                </a:ext>
-              </a:extLst>
-            </p:cNvPr>
-            <p:cNvCxnSpPr>
-              <a:cxnSpLocks/>
-              <a:stCxn id="12" idx="5"/>
-              <a:endCxn id="13" idx="1"/>
-            </p:cNvCxnSpPr>
-            <p:nvPr/>
-          </p:nvCxnSpPr>
-          <p:spPr bwMode="gray">
-            <a:xfrm>
-              <a:off x="11407132" y="4959638"/>
-              <a:ext cx="305978" cy="308684"/>
-            </a:xfrm>
-            <a:prstGeom prst="straightConnector1">
-              <a:avLst/>
-            </a:prstGeom>
-            <a:ln w="12700">
-              <a:solidFill>
-                <a:schemeClr val="tx1"/>
-              </a:solidFill>
-              <a:headEnd type="none" w="med" len="med"/>
-              <a:tailEnd type="none" w="med" len="med"/>
-            </a:ln>
-          </p:spPr>
-          <p:style>
-            <a:lnRef idx="1">
-              <a:schemeClr val="dk1"/>
-            </a:lnRef>
-            <a:fillRef idx="0">
-              <a:schemeClr val="dk1"/>
-            </a:fillRef>
-            <a:effectRef idx="0">
-              <a:schemeClr val="dk1"/>
-            </a:effectRef>
-            <a:fontRef idx="minor">
-              <a:schemeClr val="tx1"/>
-            </a:fontRef>
-          </p:style>
-        </p:cxnSp>
-        <p:cxnSp>
-          <p:nvCxnSpPr>
-            <p:cNvPr id="17" name="Straight Arrow Connector 16">
-              <a:extLst>
-                <a:ext uri="{FF2B5EF4-FFF2-40B4-BE49-F238E27FC236}">
-                  <a16:creationId xmlns:a16="http://schemas.microsoft.com/office/drawing/2014/main" id="{7F415850-9877-4E12-A1DD-CEE87AE84C06}"/>
-                </a:ext>
-              </a:extLst>
-            </p:cNvPr>
-            <p:cNvCxnSpPr>
-              <a:cxnSpLocks/>
-              <a:stCxn id="8" idx="5"/>
-              <a:endCxn id="11" idx="2"/>
-            </p:cNvCxnSpPr>
-            <p:nvPr/>
-          </p:nvCxnSpPr>
-          <p:spPr bwMode="gray">
-            <a:xfrm>
-              <a:off x="10291743" y="6281791"/>
-              <a:ext cx="922422" cy="136130"/>
-            </a:xfrm>
-            <a:prstGeom prst="straightConnector1">
-              <a:avLst/>
-            </a:prstGeom>
-            <a:ln w="12700">
-              <a:solidFill>
-                <a:schemeClr val="tx1"/>
-              </a:solidFill>
-              <a:headEnd type="none" w="med" len="med"/>
-              <a:tailEnd type="none" w="med" len="med"/>
-            </a:ln>
-          </p:spPr>
-          <p:style>
-            <a:lnRef idx="1">
-              <a:schemeClr val="dk1"/>
-            </a:lnRef>
-            <a:fillRef idx="0">
-              <a:schemeClr val="dk1"/>
-            </a:fillRef>
-            <a:effectRef idx="0">
-              <a:schemeClr val="dk1"/>
-            </a:effectRef>
-            <a:fontRef idx="minor">
-              <a:schemeClr val="tx1"/>
-            </a:fontRef>
-          </p:style>
-        </p:cxnSp>
-        <p:cxnSp>
-          <p:nvCxnSpPr>
-            <p:cNvPr id="18" name="Straight Arrow Connector 17">
-              <a:extLst>
-                <a:ext uri="{FF2B5EF4-FFF2-40B4-BE49-F238E27FC236}">
-                  <a16:creationId xmlns:a16="http://schemas.microsoft.com/office/drawing/2014/main" id="{41D1A041-FBB3-4AE7-B10E-BD6EB71CF541}"/>
-                </a:ext>
-              </a:extLst>
-            </p:cNvPr>
-            <p:cNvCxnSpPr>
-              <a:cxnSpLocks/>
-              <a:stCxn id="7" idx="5"/>
-              <a:endCxn id="11" idx="1"/>
-            </p:cNvCxnSpPr>
-            <p:nvPr/>
-          </p:nvCxnSpPr>
-          <p:spPr bwMode="gray">
-            <a:xfrm>
-              <a:off x="10291743" y="5354108"/>
-              <a:ext cx="983083" cy="917366"/>
-            </a:xfrm>
-            <a:prstGeom prst="straightConnector1">
-              <a:avLst/>
-            </a:prstGeom>
-            <a:ln w="12700">
-              <a:solidFill>
-                <a:schemeClr val="tx1"/>
-              </a:solidFill>
-              <a:headEnd type="none" w="med" len="med"/>
-              <a:tailEnd type="none" w="med" len="med"/>
-            </a:ln>
-          </p:spPr>
-          <p:style>
-            <a:lnRef idx="1">
-              <a:schemeClr val="dk1"/>
-            </a:lnRef>
-            <a:fillRef idx="0">
-              <a:schemeClr val="dk1"/>
-            </a:fillRef>
-            <a:effectRef idx="0">
-              <a:schemeClr val="dk1"/>
-            </a:effectRef>
-            <a:fontRef idx="minor">
-              <a:schemeClr val="tx1"/>
-            </a:fontRef>
-          </p:style>
-        </p:cxnSp>
-      </p:grpSp>
-      <p:sp>
-        <p:nvSpPr>
-          <p:cNvPr id="19" name="Oval 18">
-            <a:extLst>
-              <a:ext uri="{FF2B5EF4-FFF2-40B4-BE49-F238E27FC236}">
-                <a16:creationId xmlns:a16="http://schemas.microsoft.com/office/drawing/2014/main" id="{DBBD1ED8-E48E-441F-B167-EB3A2AE0A7F5}"/>
-              </a:ext>
-            </a:extLst>
-          </p:cNvPr>
-          <p:cNvSpPr/>
-          <p:nvPr/>
-        </p:nvSpPr>
-        <p:spPr bwMode="gray">
-          <a:xfrm>
-            <a:off x="4348331" y="4879110"/>
-            <a:ext cx="683322" cy="457633"/>
-          </a:xfrm>
-          <a:prstGeom prst="ellipse">
-            <a:avLst/>
-          </a:prstGeom>
-          <a:solidFill>
-            <a:srgbClr val="92D050"/>
-          </a:solidFill>
-          <a:ln/>
-        </p:spPr>
-        <p:style>
-          <a:lnRef idx="2">
-            <a:schemeClr val="dk1"/>
-          </a:lnRef>
-          <a:fillRef idx="1">
-            <a:schemeClr val="lt1"/>
-          </a:fillRef>
-          <a:effectRef idx="0">
-            <a:schemeClr val="dk1"/>
-          </a:effectRef>
-          <a:fontRef idx="minor">
-            <a:schemeClr val="dk1"/>
-          </a:fontRef>
-        </p:style>
-        <p:txBody>
-          <a:bodyPr rot="0" spcFirstLastPara="0" vertOverflow="overflow" horzOverflow="overflow" vert="horz" wrap="square" lIns="108000" tIns="72000" rIns="108000" bIns="72000" numCol="1" spcCol="0" rtlCol="0" fromWordArt="0" anchor="ctr" anchorCtr="0" forceAA="0" compatLnSpc="1">
-            <a:prstTxWarp prst="textNoShape">
-              <a:avLst/>
-            </a:prstTxWarp>
-            <a:noAutofit/>
-          </a:bodyPr>
-          <a:lstStyle/>
-          <a:p>
-            <a:pPr algn="ctr">
-              <a:spcBef>
-                <a:spcPts val="300"/>
-              </a:spcBef>
-              <a:spcAft>
-                <a:spcPts val="300"/>
-              </a:spcAft>
-            </a:pPr>
-            <a:r>
-              <a:rPr lang="en-US" sz="1200" b="1" dirty="0">
-                <a:solidFill>
-                  <a:schemeClr val="tx1"/>
-                </a:solidFill>
-              </a:rPr>
-              <a:t>V1</a:t>
+              <a:rPr lang="en-US"/>
+              <a:t>Softmax</a:t>
             </a:r>
           </a:p>
         </p:txBody>
       </p:sp>
       <p:sp>
         <p:nvSpPr>
-          <p:cNvPr id="21" name="Oval 20">
+          <p:cNvPr id="3" name="Content Placeholder 2">
             <a:extLst>
               <a:ext uri="{FF2B5EF4-FFF2-40B4-BE49-F238E27FC236}">
-                <a16:creationId xmlns:a16="http://schemas.microsoft.com/office/drawing/2014/main" id="{D05E1FAC-3160-4B5A-B98D-370F61D3BB88}"/>
+                <a16:creationId xmlns:a16="http://schemas.microsoft.com/office/drawing/2014/main" id="{F3B77C1C-7291-4043-B6E1-B435BCA26339}"/>
               </a:ext>
             </a:extLst>
           </p:cNvPr>
-          <p:cNvSpPr/>
-          <p:nvPr/>
+          <p:cNvSpPr>
+            <a:spLocks noGrp="1"/>
+          </p:cNvSpPr>
+          <p:nvPr>
+            <p:ph idx="1"/>
+          </p:nvPr>
         </p:nvSpPr>
-        <p:spPr bwMode="gray">
-          <a:xfrm>
-            <a:off x="6614624" y="4551264"/>
-            <a:ext cx="683322" cy="457633"/>
-          </a:xfrm>
-          <a:prstGeom prst="ellipse">
-            <a:avLst/>
-          </a:prstGeom>
-          <a:solidFill>
-            <a:schemeClr val="accent4">
-              <a:lumMod val="20000"/>
-              <a:lumOff val="80000"/>
-            </a:schemeClr>
-          </a:solidFill>
-          <a:ln/>
-        </p:spPr>
-        <p:style>
-          <a:lnRef idx="2">
-            <a:schemeClr val="dk1"/>
-          </a:lnRef>
-          <a:fillRef idx="1">
-            <a:schemeClr val="lt1"/>
-          </a:fillRef>
-          <a:effectRef idx="0">
-            <a:schemeClr val="dk1"/>
-          </a:effectRef>
-          <a:fontRef idx="minor">
-            <a:schemeClr val="dk1"/>
-          </a:fontRef>
-        </p:style>
+        <p:spPr/>
         <p:txBody>
-          <a:bodyPr rot="0" spcFirstLastPara="0" vertOverflow="overflow" horzOverflow="overflow" vert="horz" wrap="square" lIns="108000" tIns="72000" rIns="108000" bIns="72000" numCol="1" spcCol="0" rtlCol="0" fromWordArt="0" anchor="ctr" anchorCtr="0" forceAA="0" compatLnSpc="1">
-            <a:prstTxWarp prst="textNoShape">
-              <a:avLst/>
-            </a:prstTxWarp>
-            <a:noAutofit/>
-          </a:bodyPr>
+          <a:bodyPr/>
           <a:lstStyle/>
           <a:p>
-            <a:pPr algn="ctr">
-              <a:spcBef>
-                <a:spcPts val="300"/>
-              </a:spcBef>
-              <a:spcAft>
-                <a:spcPts val="300"/>
-              </a:spcAft>
-            </a:pPr>
-            <a:r>
-              <a:rPr lang="en-US" sz="1200" b="1" dirty="0">
-                <a:solidFill>
-                  <a:schemeClr val="tx1"/>
-                </a:solidFill>
-              </a:rPr>
-              <a:t>V2</a:t>
-            </a:r>
+            <a:endParaRPr lang="en-US"/>
           </a:p>
         </p:txBody>
       </p:sp>
-      <p:cxnSp>
-        <p:nvCxnSpPr>
-          <p:cNvPr id="23" name="Straight Connector 22">
+      <p:sp>
+        <p:nvSpPr>
+          <p:cNvPr id="4" name="Slide Number Placeholder 3">
             <a:extLst>
               <a:ext uri="{FF2B5EF4-FFF2-40B4-BE49-F238E27FC236}">
-                <a16:creationId xmlns:a16="http://schemas.microsoft.com/office/drawing/2014/main" id="{0E58AA22-3212-44E6-A44E-78CAA414CE06}"/>
+                <a16:creationId xmlns:a16="http://schemas.microsoft.com/office/drawing/2014/main" id="{C62167F0-CAB7-4FF1-9DB5-6D3EC5141811}"/>
               </a:ext>
             </a:extLst>
           </p:cNvPr>
-          <p:cNvCxnSpPr>
-            <a:cxnSpLocks/>
-            <a:stCxn id="19" idx="4"/>
-            <a:endCxn id="7" idx="1"/>
-          </p:cNvCxnSpPr>
-          <p:nvPr/>
-        </p:nvCxnSpPr>
-        <p:spPr bwMode="gray">
-          <a:xfrm flipV="1">
-            <a:off x="4689992" y="5298283"/>
-            <a:ext cx="551642" cy="38460"/>
-          </a:xfrm>
-          <a:prstGeom prst="line">
-            <a:avLst/>
-          </a:prstGeom>
-          <a:ln>
-            <a:solidFill>
-              <a:schemeClr val="accent1"/>
-            </a:solidFill>
-          </a:ln>
-        </p:spPr>
-        <p:style>
-          <a:lnRef idx="1">
-            <a:schemeClr val="accent1"/>
-          </a:lnRef>
-          <a:fillRef idx="0">
-            <a:schemeClr val="accent1"/>
-          </a:fillRef>
-          <a:effectRef idx="0">
-            <a:schemeClr val="accent1"/>
-          </a:effectRef>
-          <a:fontRef idx="minor">
-            <a:schemeClr val="tx1"/>
-          </a:fontRef>
-        </p:style>
-      </p:cxnSp>
-      <p:cxnSp>
-        <p:nvCxnSpPr>
-          <p:cNvPr id="24" name="Straight Connector 23">
-            <a:extLst>
-              <a:ext uri="{FF2B5EF4-FFF2-40B4-BE49-F238E27FC236}">
-                <a16:creationId xmlns:a16="http://schemas.microsoft.com/office/drawing/2014/main" id="{8DBA0DDE-EF88-4D76-BA19-C946D0DB7A67}"/>
-              </a:ext>
-            </a:extLst>
-          </p:cNvPr>
-          <p:cNvCxnSpPr>
-            <a:cxnSpLocks/>
-            <a:stCxn id="19" idx="4"/>
-            <a:endCxn id="8" idx="1"/>
-          </p:cNvCxnSpPr>
-          <p:nvPr/>
-        </p:nvCxnSpPr>
-        <p:spPr bwMode="gray">
-          <a:xfrm>
-            <a:off x="4689992" y="5336743"/>
-            <a:ext cx="551642" cy="642094"/>
-          </a:xfrm>
-          <a:prstGeom prst="line">
-            <a:avLst/>
-          </a:prstGeom>
-          <a:ln>
-            <a:solidFill>
-              <a:schemeClr val="accent1"/>
-            </a:solidFill>
-          </a:ln>
-        </p:spPr>
-        <p:style>
-          <a:lnRef idx="1">
-            <a:schemeClr val="accent1"/>
-          </a:lnRef>
-          <a:fillRef idx="0">
-            <a:schemeClr val="accent1"/>
-          </a:fillRef>
-          <a:effectRef idx="0">
-            <a:schemeClr val="accent1"/>
-          </a:effectRef>
-          <a:fontRef idx="minor">
-            <a:schemeClr val="tx1"/>
-          </a:fontRef>
-        </p:style>
-      </p:cxnSp>
-      <p:cxnSp>
-        <p:nvCxnSpPr>
-          <p:cNvPr id="27" name="Straight Connector 26">
-            <a:extLst>
-              <a:ext uri="{FF2B5EF4-FFF2-40B4-BE49-F238E27FC236}">
-                <a16:creationId xmlns:a16="http://schemas.microsoft.com/office/drawing/2014/main" id="{07A13DA7-274D-4502-B555-D35CBF86991E}"/>
-              </a:ext>
-            </a:extLst>
-          </p:cNvPr>
-          <p:cNvCxnSpPr>
-            <a:cxnSpLocks/>
-            <a:stCxn id="19" idx="4"/>
-            <a:endCxn id="11" idx="2"/>
-          </p:cNvCxnSpPr>
-          <p:nvPr/>
-        </p:nvCxnSpPr>
-        <p:spPr bwMode="gray">
-          <a:xfrm>
-            <a:off x="4689992" y="5336743"/>
-            <a:ext cx="1440774" cy="956829"/>
-          </a:xfrm>
-          <a:prstGeom prst="line">
-            <a:avLst/>
-          </a:prstGeom>
-          <a:ln>
-            <a:solidFill>
-              <a:schemeClr val="accent1"/>
-            </a:solidFill>
-          </a:ln>
-        </p:spPr>
-        <p:style>
-          <a:lnRef idx="1">
-            <a:schemeClr val="accent1"/>
-          </a:lnRef>
-          <a:fillRef idx="0">
-            <a:schemeClr val="accent1"/>
-          </a:fillRef>
-          <a:effectRef idx="0">
-            <a:schemeClr val="accent1"/>
-          </a:effectRef>
-          <a:fontRef idx="minor">
-            <a:schemeClr val="tx1"/>
-          </a:fontRef>
-        </p:style>
-      </p:cxnSp>
-      <p:cxnSp>
-        <p:nvCxnSpPr>
-          <p:cNvPr id="31" name="Straight Connector 30">
-            <a:extLst>
-              <a:ext uri="{FF2B5EF4-FFF2-40B4-BE49-F238E27FC236}">
-                <a16:creationId xmlns:a16="http://schemas.microsoft.com/office/drawing/2014/main" id="{C6427685-EEAF-4EA4-AA6C-AAB0C3662818}"/>
-              </a:ext>
-            </a:extLst>
-          </p:cNvPr>
-          <p:cNvCxnSpPr>
-            <a:cxnSpLocks/>
-            <a:stCxn id="21" idx="3"/>
-            <a:endCxn id="12" idx="7"/>
-          </p:cNvCxnSpPr>
-          <p:nvPr/>
-        </p:nvCxnSpPr>
-        <p:spPr bwMode="gray">
-          <a:xfrm flipH="1">
-            <a:off x="6271941" y="4941878"/>
-            <a:ext cx="442753" cy="67019"/>
-          </a:xfrm>
-          <a:prstGeom prst="line">
-            <a:avLst/>
-          </a:prstGeom>
-          <a:ln>
-            <a:solidFill>
-              <a:schemeClr val="accent1"/>
-            </a:solidFill>
-          </a:ln>
-        </p:spPr>
-        <p:style>
-          <a:lnRef idx="1">
-            <a:schemeClr val="accent1"/>
-          </a:lnRef>
-          <a:fillRef idx="0">
-            <a:schemeClr val="accent1"/>
-          </a:fillRef>
-          <a:effectRef idx="0">
-            <a:schemeClr val="accent1"/>
-          </a:effectRef>
-          <a:fontRef idx="minor">
-            <a:schemeClr val="tx1"/>
-          </a:fontRef>
-        </p:style>
-      </p:cxnSp>
-      <p:cxnSp>
-        <p:nvCxnSpPr>
-          <p:cNvPr id="34" name="Straight Connector 33">
-            <a:extLst>
-              <a:ext uri="{FF2B5EF4-FFF2-40B4-BE49-F238E27FC236}">
-                <a16:creationId xmlns:a16="http://schemas.microsoft.com/office/drawing/2014/main" id="{8C495E6E-5146-4096-87F6-69411C7D1EB3}"/>
-              </a:ext>
-            </a:extLst>
-          </p:cNvPr>
-          <p:cNvCxnSpPr>
-            <a:cxnSpLocks/>
-            <a:stCxn id="21" idx="3"/>
-            <a:endCxn id="13" idx="0"/>
-          </p:cNvCxnSpPr>
-          <p:nvPr/>
-        </p:nvCxnSpPr>
-        <p:spPr bwMode="gray">
-          <a:xfrm flipH="1">
-            <a:off x="6602938" y="4941878"/>
-            <a:ext cx="111756" cy="463840"/>
-          </a:xfrm>
-          <a:prstGeom prst="line">
-            <a:avLst/>
-          </a:prstGeom>
-          <a:ln>
-            <a:solidFill>
-              <a:schemeClr val="accent1"/>
-            </a:solidFill>
-          </a:ln>
-        </p:spPr>
-        <p:style>
-          <a:lnRef idx="1">
-            <a:schemeClr val="accent1"/>
-          </a:lnRef>
-          <a:fillRef idx="0">
-            <a:schemeClr val="accent1"/>
-          </a:fillRef>
-          <a:effectRef idx="0">
-            <a:schemeClr val="accent1"/>
-          </a:effectRef>
-          <a:fontRef idx="minor">
-            <a:schemeClr val="tx1"/>
-          </a:fontRef>
-        </p:style>
-      </p:cxnSp>
-      <p:cxnSp>
-        <p:nvCxnSpPr>
-          <p:cNvPr id="39" name="Straight Connector 38">
-            <a:extLst>
-              <a:ext uri="{FF2B5EF4-FFF2-40B4-BE49-F238E27FC236}">
-                <a16:creationId xmlns:a16="http://schemas.microsoft.com/office/drawing/2014/main" id="{CFCB0CD7-AAA6-4E30-8144-693923867854}"/>
-              </a:ext>
-            </a:extLst>
-          </p:cNvPr>
-          <p:cNvCxnSpPr>
-            <a:cxnSpLocks/>
-            <a:stCxn id="21" idx="3"/>
-            <a:endCxn id="9" idx="7"/>
-          </p:cNvCxnSpPr>
-          <p:nvPr/>
-        </p:nvCxnSpPr>
-        <p:spPr bwMode="gray">
-          <a:xfrm flipH="1">
-            <a:off x="6212330" y="4941878"/>
-            <a:ext cx="502364" cy="640137"/>
-          </a:xfrm>
-          <a:prstGeom prst="line">
-            <a:avLst/>
-          </a:prstGeom>
-          <a:ln>
-            <a:solidFill>
-              <a:schemeClr val="accent1"/>
-            </a:solidFill>
-          </a:ln>
-        </p:spPr>
-        <p:style>
-          <a:lnRef idx="1">
-            <a:schemeClr val="accent1"/>
-          </a:lnRef>
-          <a:fillRef idx="0">
-            <a:schemeClr val="accent1"/>
-          </a:fillRef>
-          <a:effectRef idx="0">
-            <a:schemeClr val="accent1"/>
-          </a:effectRef>
-          <a:fontRef idx="minor">
-            <a:schemeClr val="tx1"/>
-          </a:fontRef>
-        </p:style>
-      </p:cxnSp>
+          <p:cNvSpPr>
+            <a:spLocks noGrp="1"/>
+          </p:cNvSpPr>
+          <p:nvPr>
+            <p:ph type="sldNum" sz="quarter" idx="12"/>
+          </p:nvPr>
+        </p:nvSpPr>
+        <p:spPr/>
+        <p:txBody>
+          <a:bodyPr/>
+          <a:lstStyle/>
+          <a:p>
+            <a:fld id="{81561042-0DC2-4A04-AA50-F6D44EB20EBA}" type="slidenum">
+              <a:rPr lang="en-US" smtClean="0"/>
+              <a:t>9</a:t>
+            </a:fld>
+            <a:endParaRPr lang="en-US"/>
+          </a:p>
+        </p:txBody>
+      </p:sp>
     </p:spTree>
     <p:extLst>
       <p:ext uri="{BB962C8B-B14F-4D97-AF65-F5344CB8AC3E}">
-        <p14:creationId xmlns:p14="http://schemas.microsoft.com/office/powerpoint/2010/main" val="1982308745"/>
+        <p14:creationId xmlns:p14="http://schemas.microsoft.com/office/powerpoint/2010/main" val="181525900"/>
       </p:ext>
     </p:extLst>
   </p:cSld>
   <p:clrMapOvr>
     <a:masterClrMapping/>
   </p:clrMapOvr>
-  <p:timing>
-    <p:tnLst>
-      <p:par>
-        <p:cTn id="1" dur="indefinite" restart="never" nodeType="tmRoot">
-          <p:childTnLst>
-            <p:seq concurrent="1" nextAc="seek">
-              <p:cTn id="2" dur="indefinite" nodeType="mainSeq">
-                <p:childTnLst>
-                  <p:par>
-                    <p:cTn id="3" fill="hold">
-                      <p:stCondLst>
-                        <p:cond delay="indefinite"/>
-                      </p:stCondLst>
-                      <p:childTnLst>
-                        <p:par>
-                          <p:cTn id="4" fill="hold">
-                            <p:stCondLst>
-                              <p:cond delay="0"/>
-                            </p:stCondLst>
-                            <p:childTnLst>
-                              <p:par>
-                                <p:cTn id="5" presetID="1" presetClass="entr" presetSubtype="0" fill="hold" nodeType="clickEffect">
-                                  <p:stCondLst>
-                                    <p:cond delay="0"/>
-                                  </p:stCondLst>
-                                  <p:childTnLst>
-                                    <p:set>
-                                      <p:cBhvr>
-                                        <p:cTn id="6" dur="1" fill="hold">
-                                          <p:stCondLst>
-                                            <p:cond delay="0"/>
-                                          </p:stCondLst>
-                                        </p:cTn>
-                                        <p:tgtEl>
-                                          <p:spTgt spid="6"/>
-                                        </p:tgtEl>
-                                        <p:attrNameLst>
-                                          <p:attrName>style.visibility</p:attrName>
-                                        </p:attrNameLst>
-                                      </p:cBhvr>
-                                      <p:to>
-                                        <p:strVal val="visible"/>
-                                      </p:to>
-                                    </p:set>
-                                  </p:childTnLst>
-                                </p:cTn>
-                              </p:par>
-                              <p:par>
-                                <p:cTn id="7" presetID="1" presetClass="entr" presetSubtype="0" fill="hold" grpId="0" nodeType="withEffect">
-                                  <p:stCondLst>
-                                    <p:cond delay="0"/>
-                                  </p:stCondLst>
-                                  <p:childTnLst>
-                                    <p:set>
-                                      <p:cBhvr>
-                                        <p:cTn id="8" dur="1" fill="hold">
-                                          <p:stCondLst>
-                                            <p:cond delay="0"/>
-                                          </p:stCondLst>
-                                        </p:cTn>
-                                        <p:tgtEl>
-                                          <p:spTgt spid="19"/>
-                                        </p:tgtEl>
-                                        <p:attrNameLst>
-                                          <p:attrName>style.visibility</p:attrName>
-                                        </p:attrNameLst>
-                                      </p:cBhvr>
-                                      <p:to>
-                                        <p:strVal val="visible"/>
-                                      </p:to>
-                                    </p:set>
-                                  </p:childTnLst>
-                                </p:cTn>
-                              </p:par>
-                              <p:par>
-                                <p:cTn id="9" presetID="1" presetClass="entr" presetSubtype="0" fill="hold" grpId="0" nodeType="withEffect">
-                                  <p:stCondLst>
-                                    <p:cond delay="0"/>
-                                  </p:stCondLst>
-                                  <p:childTnLst>
-                                    <p:set>
-                                      <p:cBhvr>
-                                        <p:cTn id="10" dur="1" fill="hold">
-                                          <p:stCondLst>
-                                            <p:cond delay="0"/>
-                                          </p:stCondLst>
-                                        </p:cTn>
-                                        <p:tgtEl>
-                                          <p:spTgt spid="21"/>
-                                        </p:tgtEl>
-                                        <p:attrNameLst>
-                                          <p:attrName>style.visibility</p:attrName>
-                                        </p:attrNameLst>
-                                      </p:cBhvr>
-                                      <p:to>
-                                        <p:strVal val="visible"/>
-                                      </p:to>
-                                    </p:set>
-                                  </p:childTnLst>
-                                </p:cTn>
-                              </p:par>
-                              <p:par>
-                                <p:cTn id="11" presetID="1" presetClass="entr" presetSubtype="0" fill="hold" nodeType="withEffect">
-                                  <p:stCondLst>
-                                    <p:cond delay="0"/>
-                                  </p:stCondLst>
-                                  <p:childTnLst>
-                                    <p:set>
-                                      <p:cBhvr>
-                                        <p:cTn id="12" dur="1" fill="hold">
-                                          <p:stCondLst>
-                                            <p:cond delay="0"/>
-                                          </p:stCondLst>
-                                        </p:cTn>
-                                        <p:tgtEl>
-                                          <p:spTgt spid="23"/>
-                                        </p:tgtEl>
-                                        <p:attrNameLst>
-                                          <p:attrName>style.visibility</p:attrName>
-                                        </p:attrNameLst>
-                                      </p:cBhvr>
-                                      <p:to>
-                                        <p:strVal val="visible"/>
-                                      </p:to>
-                                    </p:set>
-                                  </p:childTnLst>
-                                </p:cTn>
-                              </p:par>
-                              <p:par>
-                                <p:cTn id="13" presetID="1" presetClass="entr" presetSubtype="0" fill="hold" nodeType="withEffect">
-                                  <p:stCondLst>
-                                    <p:cond delay="0"/>
-                                  </p:stCondLst>
-                                  <p:childTnLst>
-                                    <p:set>
-                                      <p:cBhvr>
-                                        <p:cTn id="14" dur="1" fill="hold">
-                                          <p:stCondLst>
-                                            <p:cond delay="0"/>
-                                          </p:stCondLst>
-                                        </p:cTn>
-                                        <p:tgtEl>
-                                          <p:spTgt spid="24"/>
-                                        </p:tgtEl>
-                                        <p:attrNameLst>
-                                          <p:attrName>style.visibility</p:attrName>
-                                        </p:attrNameLst>
-                                      </p:cBhvr>
-                                      <p:to>
-                                        <p:strVal val="visible"/>
-                                      </p:to>
-                                    </p:set>
-                                  </p:childTnLst>
-                                </p:cTn>
-                              </p:par>
-                              <p:par>
-                                <p:cTn id="15" presetID="1" presetClass="entr" presetSubtype="0" fill="hold" nodeType="withEffect">
-                                  <p:stCondLst>
-                                    <p:cond delay="0"/>
-                                  </p:stCondLst>
-                                  <p:childTnLst>
-                                    <p:set>
-                                      <p:cBhvr>
-                                        <p:cTn id="16" dur="1" fill="hold">
-                                          <p:stCondLst>
-                                            <p:cond delay="0"/>
-                                          </p:stCondLst>
-                                        </p:cTn>
-                                        <p:tgtEl>
-                                          <p:spTgt spid="27"/>
-                                        </p:tgtEl>
-                                        <p:attrNameLst>
-                                          <p:attrName>style.visibility</p:attrName>
-                                        </p:attrNameLst>
-                                      </p:cBhvr>
-                                      <p:to>
-                                        <p:strVal val="visible"/>
-                                      </p:to>
-                                    </p:set>
-                                  </p:childTnLst>
-                                </p:cTn>
-                              </p:par>
-                              <p:par>
-                                <p:cTn id="17" presetID="1" presetClass="entr" presetSubtype="0" fill="hold" nodeType="withEffect">
-                                  <p:stCondLst>
-                                    <p:cond delay="0"/>
-                                  </p:stCondLst>
-                                  <p:childTnLst>
-                                    <p:set>
-                                      <p:cBhvr>
-                                        <p:cTn id="18" dur="1" fill="hold">
-                                          <p:stCondLst>
-                                            <p:cond delay="0"/>
-                                          </p:stCondLst>
-                                        </p:cTn>
-                                        <p:tgtEl>
-                                          <p:spTgt spid="31"/>
-                                        </p:tgtEl>
-                                        <p:attrNameLst>
-                                          <p:attrName>style.visibility</p:attrName>
-                                        </p:attrNameLst>
-                                      </p:cBhvr>
-                                      <p:to>
-                                        <p:strVal val="visible"/>
-                                      </p:to>
-                                    </p:set>
-                                  </p:childTnLst>
-                                </p:cTn>
-                              </p:par>
-                              <p:par>
-                                <p:cTn id="19" presetID="1" presetClass="entr" presetSubtype="0" fill="hold" nodeType="withEffect">
-                                  <p:stCondLst>
-                                    <p:cond delay="0"/>
-                                  </p:stCondLst>
-                                  <p:childTnLst>
-                                    <p:set>
-                                      <p:cBhvr>
-                                        <p:cTn id="20" dur="1" fill="hold">
-                                          <p:stCondLst>
-                                            <p:cond delay="0"/>
-                                          </p:stCondLst>
-                                        </p:cTn>
-                                        <p:tgtEl>
-                                          <p:spTgt spid="34"/>
-                                        </p:tgtEl>
-                                        <p:attrNameLst>
-                                          <p:attrName>style.visibility</p:attrName>
-                                        </p:attrNameLst>
-                                      </p:cBhvr>
-                                      <p:to>
-                                        <p:strVal val="visible"/>
-                                      </p:to>
-                                    </p:set>
-                                  </p:childTnLst>
-                                </p:cTn>
-                              </p:par>
-                              <p:par>
-                                <p:cTn id="21" presetID="1" presetClass="entr" presetSubtype="0" fill="hold" nodeType="withEffect">
-                                  <p:stCondLst>
-                                    <p:cond delay="0"/>
-                                  </p:stCondLst>
-                                  <p:childTnLst>
-                                    <p:set>
-                                      <p:cBhvr>
-                                        <p:cTn id="22" dur="1" fill="hold">
-                                          <p:stCondLst>
-                                            <p:cond delay="0"/>
-                                          </p:stCondLst>
-                                        </p:cTn>
-                                        <p:tgtEl>
-                                          <p:spTgt spid="39"/>
-                                        </p:tgtEl>
-                                        <p:attrNameLst>
-                                          <p:attrName>style.visibility</p:attrName>
-                                        </p:attrNameLst>
-                                      </p:cBhvr>
-                                      <p:to>
-                                        <p:strVal val="visible"/>
-                                      </p:to>
-                                    </p:set>
-                                  </p:childTnLst>
-                                </p:cTn>
-                              </p:par>
-                              <p:par>
-                                <p:cTn id="23" presetID="1" presetClass="entr" presetSubtype="0" fill="hold" grpId="0" nodeType="withEffect">
-                                  <p:stCondLst>
-                                    <p:cond delay="0"/>
-                                  </p:stCondLst>
-                                  <p:childTnLst>
-                                    <p:set>
-                                      <p:cBhvr>
-                                        <p:cTn id="24" dur="1" fill="hold">
-                                          <p:stCondLst>
-                                            <p:cond delay="0"/>
-                                          </p:stCondLst>
-                                        </p:cTn>
-                                        <p:tgtEl>
-                                          <p:spTgt spid="5"/>
-                                        </p:tgtEl>
-                                        <p:attrNameLst>
-                                          <p:attrName>style.visibility</p:attrName>
-                                        </p:attrNameLst>
-                                      </p:cBhvr>
-                                      <p:to>
-                                        <p:strVal val="visible"/>
-                                      </p:to>
-                                    </p:set>
-                                  </p:childTnLst>
-                                </p:cTn>
-                              </p:par>
-                            </p:childTnLst>
-                          </p:cTn>
-                        </p:par>
-                      </p:childTnLst>
-                    </p:cTn>
-                  </p:par>
-                </p:childTnLst>
-              </p:cTn>
-              <p:prevCondLst>
-                <p:cond evt="onPrev" delay="0">
-                  <p:tgtEl>
-                    <p:sldTgt/>
-                  </p:tgtEl>
-                </p:cond>
-              </p:prevCondLst>
-              <p:nextCondLst>
-                <p:cond evt="onNext" delay="0">
-                  <p:tgtEl>
-                    <p:sldTgt/>
-                  </p:tgtEl>
-                </p:cond>
-              </p:nextCondLst>
-            </p:seq>
-          </p:childTnLst>
-        </p:cTn>
-      </p:par>
-    </p:tnLst>
-    <p:bldLst>
-      <p:bldP spid="5" grpId="0"/>
-      <p:bldP spid="19" grpId="0" animBg="1"/>
-      <p:bldP spid="21" grpId="0" animBg="1"/>
-    </p:bldLst>
-  </p:timing>
 </p:sld>
 </file>
 

</xml_diff>